<commit_message>
Mise à jour de la présentation -> diagramme
</commit_message>
<xml_diff>
--- a/Présentation.pptx
+++ b/Présentation.pptx
@@ -6,6 +6,9 @@
   </p:sldMasterIdLst>
   <p:sldIdLst>
     <p:sldId id="256" r:id="rId2"/>
+    <p:sldId id="257" r:id="rId3"/>
+    <p:sldId id="258" r:id="rId4"/>
+    <p:sldId id="259" r:id="rId5"/>
   </p:sldIdLst>
   <p:sldSz cx="12192000" cy="6858000"/>
   <p:notesSz cx="6858000" cy="9144000"/>
@@ -104,6 +107,11 @@
       </a:defRPr>
     </a:lvl9pPr>
   </p:defaultTextStyle>
+  <p:extLst>
+    <p:ext uri="{EFAFB233-063F-42B5-8137-9DF3F51BA10A}">
+      <p15:sldGuideLst xmlns:p15="http://schemas.microsoft.com/office/powerpoint/2012/main"/>
+    </p:ext>
+  </p:extLst>
 </p:presentation>
 </file>
 
@@ -157,7 +165,7 @@
           <a:noFill/>
           <a:extLst>
             <a:ext uri="{909E8E84-426E-40dd-AFC4-6F175D3DCCD1}">
-              <a14:hiddenFill xmlns:a14="http://schemas.microsoft.com/office/drawing/2010/main" xmlns="">
+              <a14:hiddenFill xmlns="" xmlns:a14="http://schemas.microsoft.com/office/drawing/2010/main">
                 <a:solidFill>
                   <a:srgbClr val="FFFFFF"/>
                 </a:solidFill>
@@ -217,7 +225,7 @@
             </a:ln>
             <a:extLst>
               <a:ext uri="{91240B29-F687-4f45-9708-019B960494DF}">
-                <a14:hiddenLine xmlns:a14="http://schemas.microsoft.com/office/drawing/2010/main" xmlns="" w="9525">
+                <a14:hiddenLine xmlns="" xmlns:a14="http://schemas.microsoft.com/office/drawing/2010/main" w="9525">
                   <a:solidFill>
                     <a:srgbClr val="000000"/>
                   </a:solidFill>
@@ -307,7 +315,7 @@
             </a:ln>
             <a:extLst>
               <a:ext uri="{91240B29-F687-4f45-9708-019B960494DF}">
-                <a14:hiddenLine xmlns:a14="http://schemas.microsoft.com/office/drawing/2010/main" xmlns="" w="9525">
+                <a14:hiddenLine xmlns="" xmlns:a14="http://schemas.microsoft.com/office/drawing/2010/main" w="9525">
                   <a:solidFill>
                     <a:srgbClr val="000000"/>
                   </a:solidFill>
@@ -397,7 +405,7 @@
             </a:ln>
             <a:extLst>
               <a:ext uri="{91240B29-F687-4f45-9708-019B960494DF}">
-                <a14:hiddenLine xmlns:a14="http://schemas.microsoft.com/office/drawing/2010/main" xmlns="" w="9525">
+                <a14:hiddenLine xmlns="" xmlns:a14="http://schemas.microsoft.com/office/drawing/2010/main" w="9525">
                   <a:solidFill>
                     <a:srgbClr val="000000"/>
                   </a:solidFill>
@@ -431,7 +439,7 @@
             </a:ln>
             <a:extLst>
               <a:ext uri="{91240B29-F687-4f45-9708-019B960494DF}">
-                <a14:hiddenLine xmlns:a14="http://schemas.microsoft.com/office/drawing/2010/main" xmlns="" w="9525">
+                <a14:hiddenLine xmlns="" xmlns:a14="http://schemas.microsoft.com/office/drawing/2010/main" w="9525">
                   <a:solidFill>
                     <a:srgbClr val="000000"/>
                   </a:solidFill>
@@ -521,7 +529,7 @@
             </a:ln>
             <a:extLst>
               <a:ext uri="{91240B29-F687-4f45-9708-019B960494DF}">
-                <a14:hiddenLine xmlns:a14="http://schemas.microsoft.com/office/drawing/2010/main" xmlns="" w="9525">
+                <a14:hiddenLine xmlns="" xmlns:a14="http://schemas.microsoft.com/office/drawing/2010/main" w="9525">
                   <a:solidFill>
                     <a:srgbClr val="000000"/>
                   </a:solidFill>
@@ -583,7 +591,7 @@
             </a:ln>
             <a:extLst>
               <a:ext uri="{91240B29-F687-4f45-9708-019B960494DF}">
-                <a14:hiddenLine xmlns:a14="http://schemas.microsoft.com/office/drawing/2010/main" xmlns="" w="9525">
+                <a14:hiddenLine xmlns="" xmlns:a14="http://schemas.microsoft.com/office/drawing/2010/main" w="9525">
                   <a:solidFill>
                     <a:srgbClr val="000000"/>
                   </a:solidFill>
@@ -645,7 +653,7 @@
             </a:ln>
             <a:extLst>
               <a:ext uri="{91240B29-F687-4f45-9708-019B960494DF}">
-                <a14:hiddenLine xmlns:a14="http://schemas.microsoft.com/office/drawing/2010/main" xmlns="" w="9525">
+                <a14:hiddenLine xmlns="" xmlns:a14="http://schemas.microsoft.com/office/drawing/2010/main" w="9525">
                   <a:solidFill>
                     <a:srgbClr val="000000"/>
                   </a:solidFill>
@@ -735,7 +743,7 @@
             </a:ln>
             <a:extLst>
               <a:ext uri="{91240B29-F687-4f45-9708-019B960494DF}">
-                <a14:hiddenLine xmlns:a14="http://schemas.microsoft.com/office/drawing/2010/main" xmlns="" w="9525">
+                <a14:hiddenLine xmlns="" xmlns:a14="http://schemas.microsoft.com/office/drawing/2010/main" w="9525">
                   <a:solidFill>
                     <a:srgbClr val="000000"/>
                   </a:solidFill>
@@ -797,7 +805,7 @@
             </a:ln>
             <a:extLst>
               <a:ext uri="{91240B29-F687-4f45-9708-019B960494DF}">
-                <a14:hiddenLine xmlns:a14="http://schemas.microsoft.com/office/drawing/2010/main" xmlns="" w="9525">
+                <a14:hiddenLine xmlns="" xmlns:a14="http://schemas.microsoft.com/office/drawing/2010/main" w="9525">
                   <a:solidFill>
                     <a:srgbClr val="000000"/>
                   </a:solidFill>
@@ -859,7 +867,7 @@
             </a:ln>
             <a:extLst>
               <a:ext uri="{91240B29-F687-4f45-9708-019B960494DF}">
-                <a14:hiddenLine xmlns:a14="http://schemas.microsoft.com/office/drawing/2010/main" xmlns="" w="9525">
+                <a14:hiddenLine xmlns="" xmlns:a14="http://schemas.microsoft.com/office/drawing/2010/main" w="9525">
                   <a:solidFill>
                     <a:srgbClr val="000000"/>
                   </a:solidFill>
@@ -949,7 +957,7 @@
             </a:ln>
             <a:extLst>
               <a:ext uri="{91240B29-F687-4f45-9708-019B960494DF}">
-                <a14:hiddenLine xmlns:a14="http://schemas.microsoft.com/office/drawing/2010/main" xmlns="" w="9525">
+                <a14:hiddenLine xmlns="" xmlns:a14="http://schemas.microsoft.com/office/drawing/2010/main" w="9525">
                   <a:solidFill>
                     <a:srgbClr val="000000"/>
                   </a:solidFill>
@@ -1039,7 +1047,7 @@
             </a:ln>
             <a:extLst>
               <a:ext uri="{91240B29-F687-4f45-9708-019B960494DF}">
-                <a14:hiddenLine xmlns:a14="http://schemas.microsoft.com/office/drawing/2010/main" xmlns="" w="9525">
+                <a14:hiddenLine xmlns="" xmlns:a14="http://schemas.microsoft.com/office/drawing/2010/main" w="9525">
                   <a:solidFill>
                     <a:srgbClr val="000000"/>
                   </a:solidFill>
@@ -1101,7 +1109,7 @@
             </a:ln>
             <a:extLst>
               <a:ext uri="{91240B29-F687-4f45-9708-019B960494DF}">
-                <a14:hiddenLine xmlns:a14="http://schemas.microsoft.com/office/drawing/2010/main" xmlns="" w="9525">
+                <a14:hiddenLine xmlns="" xmlns:a14="http://schemas.microsoft.com/office/drawing/2010/main" w="9525">
                   <a:solidFill>
                     <a:srgbClr val="000000"/>
                   </a:solidFill>
@@ -1211,7 +1219,7 @@
             </a:ln>
             <a:extLst>
               <a:ext uri="{91240B29-F687-4f45-9708-019B960494DF}">
-                <a14:hiddenLine xmlns:a14="http://schemas.microsoft.com/office/drawing/2010/main" xmlns="" w="9525">
+                <a14:hiddenLine xmlns="" xmlns:a14="http://schemas.microsoft.com/office/drawing/2010/main" w="9525">
                   <a:solidFill>
                     <a:srgbClr val="000000"/>
                   </a:solidFill>
@@ -1273,7 +1281,7 @@
             </a:ln>
             <a:extLst>
               <a:ext uri="{91240B29-F687-4f45-9708-019B960494DF}">
-                <a14:hiddenLine xmlns:a14="http://schemas.microsoft.com/office/drawing/2010/main" xmlns="" w="9525">
+                <a14:hiddenLine xmlns="" xmlns:a14="http://schemas.microsoft.com/office/drawing/2010/main" w="9525">
                   <a:solidFill>
                     <a:srgbClr val="000000"/>
                   </a:solidFill>
@@ -1363,7 +1371,7 @@
             </a:ln>
             <a:extLst>
               <a:ext uri="{91240B29-F687-4f45-9708-019B960494DF}">
-                <a14:hiddenLine xmlns:a14="http://schemas.microsoft.com/office/drawing/2010/main" xmlns="" w="9525">
+                <a14:hiddenLine xmlns="" xmlns:a14="http://schemas.microsoft.com/office/drawing/2010/main" w="9525">
                   <a:solidFill>
                     <a:srgbClr val="000000"/>
                   </a:solidFill>
@@ -1453,7 +1461,7 @@
             </a:ln>
             <a:extLst>
               <a:ext uri="{91240B29-F687-4f45-9708-019B960494DF}">
-                <a14:hiddenLine xmlns:a14="http://schemas.microsoft.com/office/drawing/2010/main" xmlns="" w="9525">
+                <a14:hiddenLine xmlns="" xmlns:a14="http://schemas.microsoft.com/office/drawing/2010/main" w="9525">
                   <a:solidFill>
                     <a:srgbClr val="000000"/>
                   </a:solidFill>
@@ -1515,7 +1523,7 @@
             </a:ln>
             <a:extLst>
               <a:ext uri="{91240B29-F687-4f45-9708-019B960494DF}">
-                <a14:hiddenLine xmlns:a14="http://schemas.microsoft.com/office/drawing/2010/main" xmlns="" w="9525">
+                <a14:hiddenLine xmlns="" xmlns:a14="http://schemas.microsoft.com/office/drawing/2010/main" w="9525">
                   <a:solidFill>
                     <a:srgbClr val="000000"/>
                   </a:solidFill>
@@ -1605,7 +1613,7 @@
             </a:ln>
             <a:extLst>
               <a:ext uri="{91240B29-F687-4f45-9708-019B960494DF}">
-                <a14:hiddenLine xmlns:a14="http://schemas.microsoft.com/office/drawing/2010/main" xmlns="" w="9525">
+                <a14:hiddenLine xmlns="" xmlns:a14="http://schemas.microsoft.com/office/drawing/2010/main" w="9525">
                   <a:solidFill>
                     <a:srgbClr val="000000"/>
                   </a:solidFill>
@@ -1695,7 +1703,7 @@
             </a:ln>
             <a:extLst>
               <a:ext uri="{91240B29-F687-4f45-9708-019B960494DF}">
-                <a14:hiddenLine xmlns:a14="http://schemas.microsoft.com/office/drawing/2010/main" xmlns="" w="9525">
+                <a14:hiddenLine xmlns="" xmlns:a14="http://schemas.microsoft.com/office/drawing/2010/main" w="9525">
                   <a:solidFill>
                     <a:srgbClr val="000000"/>
                   </a:solidFill>
@@ -1751,7 +1759,7 @@
             </a:ln>
             <a:extLst>
               <a:ext uri="{91240B29-F687-4f45-9708-019B960494DF}">
-                <a14:hiddenLine xmlns:a14="http://schemas.microsoft.com/office/drawing/2010/main" xmlns="" w="9525">
+                <a14:hiddenLine xmlns="" xmlns:a14="http://schemas.microsoft.com/office/drawing/2010/main" w="9525">
                   <a:solidFill>
                     <a:srgbClr val="000000"/>
                   </a:solidFill>
@@ -1841,7 +1849,7 @@
             </a:ln>
             <a:extLst>
               <a:ext uri="{91240B29-F687-4f45-9708-019B960494DF}">
-                <a14:hiddenLine xmlns:a14="http://schemas.microsoft.com/office/drawing/2010/main" xmlns="" w="9525">
+                <a14:hiddenLine xmlns="" xmlns:a14="http://schemas.microsoft.com/office/drawing/2010/main" w="9525">
                   <a:solidFill>
                     <a:srgbClr val="000000"/>
                   </a:solidFill>
@@ -1897,7 +1905,7 @@
             </a:ln>
             <a:extLst>
               <a:ext uri="{91240B29-F687-4f45-9708-019B960494DF}">
-                <a14:hiddenLine xmlns:a14="http://schemas.microsoft.com/office/drawing/2010/main" xmlns="" w="9525">
+                <a14:hiddenLine xmlns="" xmlns:a14="http://schemas.microsoft.com/office/drawing/2010/main" w="9525">
                   <a:solidFill>
                     <a:srgbClr val="000000"/>
                   </a:solidFill>
@@ -1987,7 +1995,7 @@
             </a:ln>
             <a:extLst>
               <a:ext uri="{91240B29-F687-4f45-9708-019B960494DF}">
-                <a14:hiddenLine xmlns:a14="http://schemas.microsoft.com/office/drawing/2010/main" xmlns="" w="9525">
+                <a14:hiddenLine xmlns="" xmlns:a14="http://schemas.microsoft.com/office/drawing/2010/main" w="9525">
                   <a:solidFill>
                     <a:srgbClr val="000000"/>
                   </a:solidFill>
@@ -2055,7 +2063,7 @@
             </a:ln>
             <a:extLst>
               <a:ext uri="{91240B29-F687-4f45-9708-019B960494DF}">
-                <a14:hiddenLine xmlns:a14="http://schemas.microsoft.com/office/drawing/2010/main" xmlns="" w="9525">
+                <a14:hiddenLine xmlns="" xmlns:a14="http://schemas.microsoft.com/office/drawing/2010/main" w="9525">
                   <a:solidFill>
                     <a:srgbClr val="000000"/>
                   </a:solidFill>
@@ -2145,7 +2153,7 @@
             </a:ln>
             <a:extLst>
               <a:ext uri="{91240B29-F687-4f45-9708-019B960494DF}">
-                <a14:hiddenLine xmlns:a14="http://schemas.microsoft.com/office/drawing/2010/main" xmlns="" w="9525">
+                <a14:hiddenLine xmlns="" xmlns:a14="http://schemas.microsoft.com/office/drawing/2010/main" w="9525">
                   <a:solidFill>
                     <a:srgbClr val="000000"/>
                   </a:solidFill>
@@ -2213,7 +2221,7 @@
             </a:ln>
             <a:extLst>
               <a:ext uri="{91240B29-F687-4f45-9708-019B960494DF}">
-                <a14:hiddenLine xmlns:a14="http://schemas.microsoft.com/office/drawing/2010/main" xmlns="" w="9525">
+                <a14:hiddenLine xmlns="" xmlns:a14="http://schemas.microsoft.com/office/drawing/2010/main" w="9525">
                   <a:solidFill>
                     <a:srgbClr val="000000"/>
                   </a:solidFill>
@@ -2303,7 +2311,7 @@
             </a:ln>
             <a:extLst>
               <a:ext uri="{91240B29-F687-4f45-9708-019B960494DF}">
-                <a14:hiddenLine xmlns:a14="http://schemas.microsoft.com/office/drawing/2010/main" xmlns="" w="9525">
+                <a14:hiddenLine xmlns="" xmlns:a14="http://schemas.microsoft.com/office/drawing/2010/main" w="9525">
                   <a:solidFill>
                     <a:srgbClr val="000000"/>
                   </a:solidFill>
@@ -2337,7 +2345,7 @@
             </a:ln>
             <a:extLst>
               <a:ext uri="{91240B29-F687-4f45-9708-019B960494DF}">
-                <a14:hiddenLine xmlns:a14="http://schemas.microsoft.com/office/drawing/2010/main" xmlns="" w="9525">
+                <a14:hiddenLine xmlns="" xmlns:a14="http://schemas.microsoft.com/office/drawing/2010/main" w="9525">
                   <a:solidFill>
                     <a:srgbClr val="000000"/>
                   </a:solidFill>
@@ -2427,7 +2435,7 @@
             </a:ln>
             <a:extLst>
               <a:ext uri="{91240B29-F687-4f45-9708-019B960494DF}">
-                <a14:hiddenLine xmlns:a14="http://schemas.microsoft.com/office/drawing/2010/main" xmlns="" w="9525">
+                <a14:hiddenLine xmlns="" xmlns:a14="http://schemas.microsoft.com/office/drawing/2010/main" w="9525">
                   <a:solidFill>
                     <a:srgbClr val="000000"/>
                   </a:solidFill>
@@ -2489,7 +2497,7 @@
             </a:ln>
             <a:extLst>
               <a:ext uri="{91240B29-F687-4f45-9708-019B960494DF}">
-                <a14:hiddenLine xmlns:a14="http://schemas.microsoft.com/office/drawing/2010/main" xmlns="" w="9525">
+                <a14:hiddenLine xmlns="" xmlns:a14="http://schemas.microsoft.com/office/drawing/2010/main" w="9525">
                   <a:solidFill>
                     <a:srgbClr val="000000"/>
                   </a:solidFill>
@@ -2551,7 +2559,7 @@
             </a:ln>
             <a:extLst>
               <a:ext uri="{91240B29-F687-4f45-9708-019B960494DF}">
-                <a14:hiddenLine xmlns:a14="http://schemas.microsoft.com/office/drawing/2010/main" xmlns="" w="9525">
+                <a14:hiddenLine xmlns="" xmlns:a14="http://schemas.microsoft.com/office/drawing/2010/main" w="9525">
                   <a:solidFill>
                     <a:srgbClr val="000000"/>
                   </a:solidFill>
@@ -2641,7 +2649,7 @@
             </a:ln>
             <a:extLst>
               <a:ext uri="{91240B29-F687-4f45-9708-019B960494DF}">
-                <a14:hiddenLine xmlns:a14="http://schemas.microsoft.com/office/drawing/2010/main" xmlns="" w="9525">
+                <a14:hiddenLine xmlns="" xmlns:a14="http://schemas.microsoft.com/office/drawing/2010/main" w="9525">
                   <a:solidFill>
                     <a:srgbClr val="000000"/>
                   </a:solidFill>
@@ -2709,7 +2717,7 @@
             </a:ln>
             <a:extLst>
               <a:ext uri="{91240B29-F687-4f45-9708-019B960494DF}">
-                <a14:hiddenLine xmlns:a14="http://schemas.microsoft.com/office/drawing/2010/main" xmlns="" w="9525">
+                <a14:hiddenLine xmlns="" xmlns:a14="http://schemas.microsoft.com/office/drawing/2010/main" w="9525">
                   <a:solidFill>
                     <a:srgbClr val="000000"/>
                   </a:solidFill>
@@ -2771,7 +2779,7 @@
             </a:ln>
             <a:extLst>
               <a:ext uri="{91240B29-F687-4f45-9708-019B960494DF}">
-                <a14:hiddenLine xmlns:a14="http://schemas.microsoft.com/office/drawing/2010/main" xmlns="" w="9525">
+                <a14:hiddenLine xmlns="" xmlns:a14="http://schemas.microsoft.com/office/drawing/2010/main" w="9525">
                   <a:solidFill>
                     <a:srgbClr val="000000"/>
                   </a:solidFill>
@@ -2861,7 +2869,7 @@
             </a:ln>
             <a:extLst>
               <a:ext uri="{91240B29-F687-4f45-9708-019B960494DF}">
-                <a14:hiddenLine xmlns:a14="http://schemas.microsoft.com/office/drawing/2010/main" xmlns="" w="9525">
+                <a14:hiddenLine xmlns="" xmlns:a14="http://schemas.microsoft.com/office/drawing/2010/main" w="9525">
                   <a:solidFill>
                     <a:srgbClr val="000000"/>
                   </a:solidFill>
@@ -2923,7 +2931,7 @@
             </a:ln>
             <a:extLst>
               <a:ext uri="{91240B29-F687-4f45-9708-019B960494DF}">
-                <a14:hiddenLine xmlns:a14="http://schemas.microsoft.com/office/drawing/2010/main" xmlns="" w="9525">
+                <a14:hiddenLine xmlns="" xmlns:a14="http://schemas.microsoft.com/office/drawing/2010/main" w="9525">
                   <a:solidFill>
                     <a:srgbClr val="000000"/>
                   </a:solidFill>
@@ -3013,7 +3021,7 @@
             </a:ln>
             <a:extLst>
               <a:ext uri="{91240B29-F687-4f45-9708-019B960494DF}">
-                <a14:hiddenLine xmlns:a14="http://schemas.microsoft.com/office/drawing/2010/main" xmlns="" w="9525">
+                <a14:hiddenLine xmlns="" xmlns:a14="http://schemas.microsoft.com/office/drawing/2010/main" w="9525">
                   <a:solidFill>
                     <a:srgbClr val="000000"/>
                   </a:solidFill>
@@ -3075,7 +3083,7 @@
             </a:ln>
             <a:extLst>
               <a:ext uri="{91240B29-F687-4f45-9708-019B960494DF}">
-                <a14:hiddenLine xmlns:a14="http://schemas.microsoft.com/office/drawing/2010/main" xmlns="" w="9525">
+                <a14:hiddenLine xmlns="" xmlns:a14="http://schemas.microsoft.com/office/drawing/2010/main" w="9525">
                   <a:solidFill>
                     <a:srgbClr val="000000"/>
                   </a:solidFill>
@@ -3165,7 +3173,7 @@
             </a:ln>
             <a:extLst>
               <a:ext uri="{91240B29-F687-4f45-9708-019B960494DF}">
-                <a14:hiddenLine xmlns:a14="http://schemas.microsoft.com/office/drawing/2010/main" xmlns="" w="9525">
+                <a14:hiddenLine xmlns="" xmlns:a14="http://schemas.microsoft.com/office/drawing/2010/main" w="9525">
                   <a:solidFill>
                     <a:srgbClr val="000000"/>
                   </a:solidFill>
@@ -3199,7 +3207,7 @@
             </a:ln>
             <a:extLst>
               <a:ext uri="{91240B29-F687-4f45-9708-019B960494DF}">
-                <a14:hiddenLine xmlns:a14="http://schemas.microsoft.com/office/drawing/2010/main" xmlns="" w="9525">
+                <a14:hiddenLine xmlns="" xmlns:a14="http://schemas.microsoft.com/office/drawing/2010/main" w="9525">
                   <a:solidFill>
                     <a:srgbClr val="000000"/>
                   </a:solidFill>
@@ -3264,7 +3272,7 @@
             </a:ln>
             <a:extLst>
               <a:ext uri="{91240B29-F687-4f45-9708-019B960494DF}">
-                <a14:hiddenLine xmlns:a14="http://schemas.microsoft.com/office/drawing/2010/main" xmlns="" w="9525">
+                <a14:hiddenLine xmlns="" xmlns:a14="http://schemas.microsoft.com/office/drawing/2010/main" w="9525">
                   <a:solidFill>
                     <a:srgbClr val="000000"/>
                   </a:solidFill>
@@ -3354,7 +3362,7 @@
             </a:ln>
             <a:extLst>
               <a:ext uri="{91240B29-F687-4f45-9708-019B960494DF}">
-                <a14:hiddenLine xmlns:a14="http://schemas.microsoft.com/office/drawing/2010/main" xmlns="" w="9525">
+                <a14:hiddenLine xmlns="" xmlns:a14="http://schemas.microsoft.com/office/drawing/2010/main" w="9525">
                   <a:solidFill>
                     <a:srgbClr val="000000"/>
                   </a:solidFill>
@@ -3416,7 +3424,7 @@
             </a:ln>
             <a:extLst>
               <a:ext uri="{91240B29-F687-4f45-9708-019B960494DF}">
-                <a14:hiddenLine xmlns:a14="http://schemas.microsoft.com/office/drawing/2010/main" xmlns="" w="9525">
+                <a14:hiddenLine xmlns="" xmlns:a14="http://schemas.microsoft.com/office/drawing/2010/main" w="9525">
                   <a:solidFill>
                     <a:srgbClr val="000000"/>
                   </a:solidFill>
@@ -3506,7 +3514,7 @@
             </a:ln>
             <a:extLst>
               <a:ext uri="{91240B29-F687-4f45-9708-019B960494DF}">
-                <a14:hiddenLine xmlns:a14="http://schemas.microsoft.com/office/drawing/2010/main" xmlns="" w="9525">
+                <a14:hiddenLine xmlns="" xmlns:a14="http://schemas.microsoft.com/office/drawing/2010/main" w="9525">
                   <a:solidFill>
                     <a:srgbClr val="000000"/>
                   </a:solidFill>
@@ -3596,7 +3604,7 @@
             </a:ln>
             <a:extLst>
               <a:ext uri="{91240B29-F687-4f45-9708-019B960494DF}">
-                <a14:hiddenLine xmlns:a14="http://schemas.microsoft.com/office/drawing/2010/main" xmlns="" w="9525">
+                <a14:hiddenLine xmlns="" xmlns:a14="http://schemas.microsoft.com/office/drawing/2010/main" w="9525">
                   <a:solidFill>
                     <a:srgbClr val="000000"/>
                   </a:solidFill>
@@ -3661,7 +3669,7 @@
             </a:ln>
             <a:extLst>
               <a:ext uri="{91240B29-F687-4f45-9708-019B960494DF}">
-                <a14:hiddenLine xmlns:a14="http://schemas.microsoft.com/office/drawing/2010/main" xmlns="" w="9525">
+                <a14:hiddenLine xmlns="" xmlns:a14="http://schemas.microsoft.com/office/drawing/2010/main" w="9525">
                   <a:solidFill>
                     <a:srgbClr val="000000"/>
                   </a:solidFill>
@@ -3723,7 +3731,7 @@
             </a:ln>
             <a:extLst>
               <a:ext uri="{91240B29-F687-4f45-9708-019B960494DF}">
-                <a14:hiddenLine xmlns:a14="http://schemas.microsoft.com/office/drawing/2010/main" xmlns="" w="9525">
+                <a14:hiddenLine xmlns="" xmlns:a14="http://schemas.microsoft.com/office/drawing/2010/main" w="9525">
                   <a:solidFill>
                     <a:srgbClr val="000000"/>
                   </a:solidFill>
@@ -3813,7 +3821,7 @@
             </a:ln>
             <a:extLst>
               <a:ext uri="{91240B29-F687-4f45-9708-019B960494DF}">
-                <a14:hiddenLine xmlns:a14="http://schemas.microsoft.com/office/drawing/2010/main" xmlns="" w="9525">
+                <a14:hiddenLine xmlns="" xmlns:a14="http://schemas.microsoft.com/office/drawing/2010/main" w="9525">
                   <a:solidFill>
                     <a:srgbClr val="000000"/>
                   </a:solidFill>
@@ -3903,7 +3911,7 @@
             </a:ln>
             <a:extLst>
               <a:ext uri="{91240B29-F687-4f45-9708-019B960494DF}">
-                <a14:hiddenLine xmlns:a14="http://schemas.microsoft.com/office/drawing/2010/main" xmlns="" w="9525">
+                <a14:hiddenLine xmlns="" xmlns:a14="http://schemas.microsoft.com/office/drawing/2010/main" w="9525">
                   <a:solidFill>
                     <a:srgbClr val="000000"/>
                   </a:solidFill>
@@ -3965,7 +3973,7 @@
             </a:ln>
             <a:extLst>
               <a:ext uri="{91240B29-F687-4f45-9708-019B960494DF}">
-                <a14:hiddenLine xmlns:a14="http://schemas.microsoft.com/office/drawing/2010/main" xmlns="" w="9525">
+                <a14:hiddenLine xmlns="" xmlns:a14="http://schemas.microsoft.com/office/drawing/2010/main" w="9525">
                   <a:solidFill>
                     <a:srgbClr val="000000"/>
                   </a:solidFill>
@@ -4085,7 +4093,7 @@
             </a:ln>
             <a:extLst>
               <a:ext uri="{91240B29-F687-4f45-9708-019B960494DF}">
-                <a14:hiddenLine xmlns:a14="http://schemas.microsoft.com/office/drawing/2010/main" xmlns="" w="9525">
+                <a14:hiddenLine xmlns="" xmlns:a14="http://schemas.microsoft.com/office/drawing/2010/main" w="9525">
                   <a:solidFill>
                     <a:srgbClr val="000000"/>
                   </a:solidFill>
@@ -4153,7 +4161,7 @@
             </a:ln>
             <a:extLst>
               <a:ext uri="{91240B29-F687-4f45-9708-019B960494DF}">
-                <a14:hiddenLine xmlns:a14="http://schemas.microsoft.com/office/drawing/2010/main" xmlns="" w="9525">
+                <a14:hiddenLine xmlns="" xmlns:a14="http://schemas.microsoft.com/office/drawing/2010/main" w="9525">
                   <a:solidFill>
                     <a:srgbClr val="000000"/>
                   </a:solidFill>
@@ -4243,7 +4251,7 @@
             </a:ln>
             <a:extLst>
               <a:ext uri="{91240B29-F687-4f45-9708-019B960494DF}">
-                <a14:hiddenLine xmlns:a14="http://schemas.microsoft.com/office/drawing/2010/main" xmlns="" w="9525">
+                <a14:hiddenLine xmlns="" xmlns:a14="http://schemas.microsoft.com/office/drawing/2010/main" w="9525">
                   <a:solidFill>
                     <a:srgbClr val="000000"/>
                   </a:solidFill>
@@ -8965,7 +8973,7 @@
           <a:noFill/>
           <a:extLst>
             <a:ext uri="{909E8E84-426E-40dd-AFC4-6F175D3DCCD1}">
-              <a14:hiddenFill xmlns:a14="http://schemas.microsoft.com/office/drawing/2010/main" xmlns="">
+              <a14:hiddenFill xmlns="" xmlns:a14="http://schemas.microsoft.com/office/drawing/2010/main">
                 <a:solidFill>
                   <a:srgbClr val="FFFFFF"/>
                 </a:solidFill>
@@ -9039,7 +9047,7 @@
               </a:ln>
               <a:extLst>
                 <a:ext uri="{91240B29-F687-4f45-9708-019B960494DF}">
-                  <a14:hiddenLine xmlns:a14="http://schemas.microsoft.com/office/drawing/2010/main" xmlns="" w="9525">
+                  <a14:hiddenLine xmlns="" xmlns:a14="http://schemas.microsoft.com/office/drawing/2010/main" w="9525">
                     <a:solidFill>
                       <a:srgbClr val="000000"/>
                     </a:solidFill>
@@ -9129,7 +9137,7 @@
               </a:ln>
               <a:extLst>
                 <a:ext uri="{91240B29-F687-4f45-9708-019B960494DF}">
-                  <a14:hiddenLine xmlns:a14="http://schemas.microsoft.com/office/drawing/2010/main" xmlns="" w="9525">
+                  <a14:hiddenLine xmlns="" xmlns:a14="http://schemas.microsoft.com/office/drawing/2010/main" w="9525">
                     <a:solidFill>
                       <a:srgbClr val="000000"/>
                     </a:solidFill>
@@ -9219,7 +9227,7 @@
               </a:ln>
               <a:extLst>
                 <a:ext uri="{91240B29-F687-4f45-9708-019B960494DF}">
-                  <a14:hiddenLine xmlns:a14="http://schemas.microsoft.com/office/drawing/2010/main" xmlns="" w="9525">
+                  <a14:hiddenLine xmlns="" xmlns:a14="http://schemas.microsoft.com/office/drawing/2010/main" w="9525">
                     <a:solidFill>
                       <a:srgbClr val="000000"/>
                     </a:solidFill>
@@ -9281,7 +9289,7 @@
               </a:ln>
               <a:extLst>
                 <a:ext uri="{91240B29-F687-4f45-9708-019B960494DF}">
-                  <a14:hiddenLine xmlns:a14="http://schemas.microsoft.com/office/drawing/2010/main" xmlns="" w="9525">
+                  <a14:hiddenLine xmlns="" xmlns:a14="http://schemas.microsoft.com/office/drawing/2010/main" w="9525">
                     <a:solidFill>
                       <a:srgbClr val="000000"/>
                     </a:solidFill>
@@ -9371,7 +9379,7 @@
               </a:ln>
               <a:extLst>
                 <a:ext uri="{91240B29-F687-4f45-9708-019B960494DF}">
-                  <a14:hiddenLine xmlns:a14="http://schemas.microsoft.com/office/drawing/2010/main" xmlns="" w="9525">
+                  <a14:hiddenLine xmlns="" xmlns:a14="http://schemas.microsoft.com/office/drawing/2010/main" w="9525">
                     <a:solidFill>
                       <a:srgbClr val="000000"/>
                     </a:solidFill>
@@ -9433,7 +9441,7 @@
               </a:ln>
               <a:extLst>
                 <a:ext uri="{91240B29-F687-4f45-9708-019B960494DF}">
-                  <a14:hiddenLine xmlns:a14="http://schemas.microsoft.com/office/drawing/2010/main" xmlns="" w="9525">
+                  <a14:hiddenLine xmlns="" xmlns:a14="http://schemas.microsoft.com/office/drawing/2010/main" w="9525">
                     <a:solidFill>
                       <a:srgbClr val="000000"/>
                     </a:solidFill>
@@ -9495,7 +9503,7 @@
               </a:ln>
               <a:extLst>
                 <a:ext uri="{91240B29-F687-4f45-9708-019B960494DF}">
-                  <a14:hiddenLine xmlns:a14="http://schemas.microsoft.com/office/drawing/2010/main" xmlns="" w="9525">
+                  <a14:hiddenLine xmlns="" xmlns:a14="http://schemas.microsoft.com/office/drawing/2010/main" w="9525">
                     <a:solidFill>
                       <a:srgbClr val="000000"/>
                     </a:solidFill>
@@ -9585,7 +9593,7 @@
               </a:ln>
               <a:extLst>
                 <a:ext uri="{91240B29-F687-4f45-9708-019B960494DF}">
-                  <a14:hiddenLine xmlns:a14="http://schemas.microsoft.com/office/drawing/2010/main" xmlns="" w="9525">
+                  <a14:hiddenLine xmlns="" xmlns:a14="http://schemas.microsoft.com/office/drawing/2010/main" w="9525">
                     <a:solidFill>
                       <a:srgbClr val="000000"/>
                     </a:solidFill>
@@ -9675,7 +9683,7 @@
               </a:ln>
               <a:extLst>
                 <a:ext uri="{91240B29-F687-4f45-9708-019B960494DF}">
-                  <a14:hiddenLine xmlns:a14="http://schemas.microsoft.com/office/drawing/2010/main" xmlns="" w="9525">
+                  <a14:hiddenLine xmlns="" xmlns:a14="http://schemas.microsoft.com/office/drawing/2010/main" w="9525">
                     <a:solidFill>
                       <a:srgbClr val="000000"/>
                     </a:solidFill>
@@ -9737,7 +9745,7 @@
               </a:ln>
               <a:extLst>
                 <a:ext uri="{91240B29-F687-4f45-9708-019B960494DF}">
-                  <a14:hiddenLine xmlns:a14="http://schemas.microsoft.com/office/drawing/2010/main" xmlns="" w="9525">
+                  <a14:hiddenLine xmlns="" xmlns:a14="http://schemas.microsoft.com/office/drawing/2010/main" w="9525">
                     <a:solidFill>
                       <a:srgbClr val="000000"/>
                     </a:solidFill>
@@ -9847,7 +9855,7 @@
               </a:ln>
               <a:extLst>
                 <a:ext uri="{91240B29-F687-4f45-9708-019B960494DF}">
-                  <a14:hiddenLine xmlns:a14="http://schemas.microsoft.com/office/drawing/2010/main" xmlns="" w="9525">
+                  <a14:hiddenLine xmlns="" xmlns:a14="http://schemas.microsoft.com/office/drawing/2010/main" w="9525">
                     <a:solidFill>
                       <a:srgbClr val="000000"/>
                     </a:solidFill>
@@ -9931,7 +9939,7 @@
               </a:ln>
               <a:extLst>
                 <a:ext uri="{91240B29-F687-4f45-9708-019B960494DF}">
-                  <a14:hiddenLine xmlns:a14="http://schemas.microsoft.com/office/drawing/2010/main" xmlns="" w="9525">
+                  <a14:hiddenLine xmlns="" xmlns:a14="http://schemas.microsoft.com/office/drawing/2010/main" w="9525">
                     <a:solidFill>
                       <a:srgbClr val="000000"/>
                     </a:solidFill>
@@ -9993,7 +10001,7 @@
               </a:ln>
               <a:extLst>
                 <a:ext uri="{91240B29-F687-4f45-9708-019B960494DF}">
-                  <a14:hiddenLine xmlns:a14="http://schemas.microsoft.com/office/drawing/2010/main" xmlns="" w="9525">
+                  <a14:hiddenLine xmlns="" xmlns:a14="http://schemas.microsoft.com/office/drawing/2010/main" w="9525">
                     <a:solidFill>
                       <a:srgbClr val="000000"/>
                     </a:solidFill>
@@ -10055,7 +10063,7 @@
               </a:ln>
               <a:extLst>
                 <a:ext uri="{91240B29-F687-4f45-9708-019B960494DF}">
-                  <a14:hiddenLine xmlns:a14="http://schemas.microsoft.com/office/drawing/2010/main" xmlns="" w="9525">
+                  <a14:hiddenLine xmlns="" xmlns:a14="http://schemas.microsoft.com/office/drawing/2010/main" w="9525">
                     <a:solidFill>
                       <a:srgbClr val="000000"/>
                     </a:solidFill>
@@ -10145,7 +10153,7 @@
               </a:ln>
               <a:extLst>
                 <a:ext uri="{91240B29-F687-4f45-9708-019B960494DF}">
-                  <a14:hiddenLine xmlns:a14="http://schemas.microsoft.com/office/drawing/2010/main" xmlns="" w="9525">
+                  <a14:hiddenLine xmlns="" xmlns:a14="http://schemas.microsoft.com/office/drawing/2010/main" w="9525">
                     <a:solidFill>
                       <a:srgbClr val="000000"/>
                     </a:solidFill>
@@ -10179,7 +10187,7 @@
               </a:ln>
               <a:extLst>
                 <a:ext uri="{91240B29-F687-4f45-9708-019B960494DF}">
-                  <a14:hiddenLine xmlns:a14="http://schemas.microsoft.com/office/drawing/2010/main" xmlns="" w="9525">
+                  <a14:hiddenLine xmlns="" xmlns:a14="http://schemas.microsoft.com/office/drawing/2010/main" w="9525">
                     <a:solidFill>
                       <a:srgbClr val="000000"/>
                     </a:solidFill>
@@ -10244,7 +10252,7 @@
               </a:ln>
               <a:extLst>
                 <a:ext uri="{91240B29-F687-4f45-9708-019B960494DF}">
-                  <a14:hiddenLine xmlns:a14="http://schemas.microsoft.com/office/drawing/2010/main" xmlns="" w="9525">
+                  <a14:hiddenLine xmlns="" xmlns:a14="http://schemas.microsoft.com/office/drawing/2010/main" w="9525">
                     <a:solidFill>
                       <a:srgbClr val="000000"/>
                     </a:solidFill>
@@ -10334,7 +10342,7 @@
               </a:ln>
               <a:extLst>
                 <a:ext uri="{91240B29-F687-4f45-9708-019B960494DF}">
-                  <a14:hiddenLine xmlns:a14="http://schemas.microsoft.com/office/drawing/2010/main" xmlns="" w="9525">
+                  <a14:hiddenLine xmlns="" xmlns:a14="http://schemas.microsoft.com/office/drawing/2010/main" w="9525">
                     <a:solidFill>
                       <a:srgbClr val="000000"/>
                     </a:solidFill>
@@ -10396,7 +10404,7 @@
               </a:ln>
               <a:extLst>
                 <a:ext uri="{91240B29-F687-4f45-9708-019B960494DF}">
-                  <a14:hiddenLine xmlns:a14="http://schemas.microsoft.com/office/drawing/2010/main" xmlns="" w="9525">
+                  <a14:hiddenLine xmlns="" xmlns:a14="http://schemas.microsoft.com/office/drawing/2010/main" w="9525">
                     <a:solidFill>
                       <a:srgbClr val="000000"/>
                     </a:solidFill>
@@ -10486,7 +10494,7 @@
               </a:ln>
               <a:extLst>
                 <a:ext uri="{91240B29-F687-4f45-9708-019B960494DF}">
-                  <a14:hiddenLine xmlns:a14="http://schemas.microsoft.com/office/drawing/2010/main" xmlns="" w="9525">
+                  <a14:hiddenLine xmlns="" xmlns:a14="http://schemas.microsoft.com/office/drawing/2010/main" w="9525">
                     <a:solidFill>
                       <a:srgbClr val="000000"/>
                     </a:solidFill>
@@ -10551,7 +10559,7 @@
               </a:ln>
               <a:extLst>
                 <a:ext uri="{91240B29-F687-4f45-9708-019B960494DF}">
-                  <a14:hiddenLine xmlns:a14="http://schemas.microsoft.com/office/drawing/2010/main" xmlns="" w="9525">
+                  <a14:hiddenLine xmlns="" xmlns:a14="http://schemas.microsoft.com/office/drawing/2010/main" w="9525">
                     <a:solidFill>
                       <a:srgbClr val="000000"/>
                     </a:solidFill>
@@ -10613,7 +10621,7 @@
               </a:ln>
               <a:extLst>
                 <a:ext uri="{91240B29-F687-4f45-9708-019B960494DF}">
-                  <a14:hiddenLine xmlns:a14="http://schemas.microsoft.com/office/drawing/2010/main" xmlns="" w="9525">
+                  <a14:hiddenLine xmlns="" xmlns:a14="http://schemas.microsoft.com/office/drawing/2010/main" w="9525">
                     <a:solidFill>
                       <a:srgbClr val="000000"/>
                     </a:solidFill>
@@ -10703,7 +10711,7 @@
               </a:ln>
               <a:extLst>
                 <a:ext uri="{91240B29-F687-4f45-9708-019B960494DF}">
-                  <a14:hiddenLine xmlns:a14="http://schemas.microsoft.com/office/drawing/2010/main" xmlns="" w="9525">
+                  <a14:hiddenLine xmlns="" xmlns:a14="http://schemas.microsoft.com/office/drawing/2010/main" w="9525">
                     <a:solidFill>
                       <a:srgbClr val="000000"/>
                     </a:solidFill>
@@ -10793,7 +10801,7 @@
               </a:ln>
               <a:extLst>
                 <a:ext uri="{91240B29-F687-4f45-9708-019B960494DF}">
-                  <a14:hiddenLine xmlns:a14="http://schemas.microsoft.com/office/drawing/2010/main" xmlns="" w="9525">
+                  <a14:hiddenLine xmlns="" xmlns:a14="http://schemas.microsoft.com/office/drawing/2010/main" w="9525">
                     <a:solidFill>
                       <a:srgbClr val="000000"/>
                     </a:solidFill>
@@ -10858,7 +10866,7 @@
               </a:ln>
               <a:extLst>
                 <a:ext uri="{91240B29-F687-4f45-9708-019B960494DF}">
-                  <a14:hiddenLine xmlns:a14="http://schemas.microsoft.com/office/drawing/2010/main" xmlns="" w="9525">
+                  <a14:hiddenLine xmlns="" xmlns:a14="http://schemas.microsoft.com/office/drawing/2010/main" w="9525">
                     <a:solidFill>
                       <a:srgbClr val="000000"/>
                     </a:solidFill>
@@ -10978,7 +10986,7 @@
               </a:ln>
               <a:extLst>
                 <a:ext uri="{91240B29-F687-4f45-9708-019B960494DF}">
-                  <a14:hiddenLine xmlns:a14="http://schemas.microsoft.com/office/drawing/2010/main" xmlns="" w="9525">
+                  <a14:hiddenLine xmlns="" xmlns:a14="http://schemas.microsoft.com/office/drawing/2010/main" w="9525">
                     <a:solidFill>
                       <a:srgbClr val="000000"/>
                     </a:solidFill>
@@ -11076,7 +11084,7 @@
               </a:ln>
               <a:extLst>
                 <a:ext uri="{91240B29-F687-4f45-9708-019B960494DF}">
-                  <a14:hiddenLine xmlns:a14="http://schemas.microsoft.com/office/drawing/2010/main" xmlns="" w="9525">
+                  <a14:hiddenLine xmlns="" xmlns:a14="http://schemas.microsoft.com/office/drawing/2010/main" w="9525">
                     <a:solidFill>
                       <a:srgbClr val="000000"/>
                     </a:solidFill>
@@ -11191,7 +11199,7 @@
               </a:ln>
               <a:extLst>
                 <a:ext uri="{91240B29-F687-4f45-9708-019B960494DF}">
-                  <a14:hiddenLine xmlns:a14="http://schemas.microsoft.com/office/drawing/2010/main" xmlns="" w="9525">
+                  <a14:hiddenLine xmlns="" xmlns:a14="http://schemas.microsoft.com/office/drawing/2010/main" w="9525">
                     <a:solidFill>
                       <a:srgbClr val="000000"/>
                     </a:solidFill>
@@ -11281,7 +11289,7 @@
               </a:ln>
               <a:extLst>
                 <a:ext uri="{91240B29-F687-4f45-9708-019B960494DF}">
-                  <a14:hiddenLine xmlns:a14="http://schemas.microsoft.com/office/drawing/2010/main" xmlns="" w="9525">
+                  <a14:hiddenLine xmlns="" xmlns:a14="http://schemas.microsoft.com/office/drawing/2010/main" w="9525">
                     <a:solidFill>
                       <a:srgbClr val="000000"/>
                     </a:solidFill>
@@ -11346,7 +11354,7 @@
               </a:ln>
               <a:extLst>
                 <a:ext uri="{91240B29-F687-4f45-9708-019B960494DF}">
-                  <a14:hiddenLine xmlns:a14="http://schemas.microsoft.com/office/drawing/2010/main" xmlns="" w="9525">
+                  <a14:hiddenLine xmlns="" xmlns:a14="http://schemas.microsoft.com/office/drawing/2010/main" w="9525">
                     <a:solidFill>
                       <a:srgbClr val="000000"/>
                     </a:solidFill>
@@ -11436,7 +11444,7 @@
               </a:ln>
               <a:extLst>
                 <a:ext uri="{91240B29-F687-4f45-9708-019B960494DF}">
-                  <a14:hiddenLine xmlns:a14="http://schemas.microsoft.com/office/drawing/2010/main" xmlns="" w="9525">
+                  <a14:hiddenLine xmlns="" xmlns:a14="http://schemas.microsoft.com/office/drawing/2010/main" w="9525">
                     <a:solidFill>
                       <a:srgbClr val="000000"/>
                     </a:solidFill>
@@ -11504,7 +11512,7 @@
               </a:ln>
               <a:extLst>
                 <a:ext uri="{91240B29-F687-4f45-9708-019B960494DF}">
-                  <a14:hiddenLine xmlns:a14="http://schemas.microsoft.com/office/drawing/2010/main" xmlns="" w="9525">
+                  <a14:hiddenLine xmlns="" xmlns:a14="http://schemas.microsoft.com/office/drawing/2010/main" w="9525">
                     <a:solidFill>
                       <a:srgbClr val="000000"/>
                     </a:solidFill>
@@ -11594,7 +11602,7 @@
               </a:ln>
               <a:extLst>
                 <a:ext uri="{91240B29-F687-4f45-9708-019B960494DF}">
-                  <a14:hiddenLine xmlns:a14="http://schemas.microsoft.com/office/drawing/2010/main" xmlns="" w="9525">
+                  <a14:hiddenLine xmlns="" xmlns:a14="http://schemas.microsoft.com/office/drawing/2010/main" w="9525">
                     <a:solidFill>
                       <a:srgbClr val="000000"/>
                     </a:solidFill>
@@ -11662,7 +11670,7 @@
               </a:ln>
               <a:extLst>
                 <a:ext uri="{91240B29-F687-4f45-9708-019B960494DF}">
-                  <a14:hiddenLine xmlns:a14="http://schemas.microsoft.com/office/drawing/2010/main" xmlns="" w="9525">
+                  <a14:hiddenLine xmlns="" xmlns:a14="http://schemas.microsoft.com/office/drawing/2010/main" w="9525">
                     <a:solidFill>
                       <a:srgbClr val="000000"/>
                     </a:solidFill>
@@ -11752,7 +11760,7 @@
               </a:ln>
               <a:extLst>
                 <a:ext uri="{91240B29-F687-4f45-9708-019B960494DF}">
-                  <a14:hiddenLine xmlns:a14="http://schemas.microsoft.com/office/drawing/2010/main" xmlns="" w="9525">
+                  <a14:hiddenLine xmlns="" xmlns:a14="http://schemas.microsoft.com/office/drawing/2010/main" w="9525">
                     <a:solidFill>
                       <a:srgbClr val="000000"/>
                     </a:solidFill>
@@ -11786,7 +11794,7 @@
               </a:ln>
               <a:extLst>
                 <a:ext uri="{91240B29-F687-4f45-9708-019B960494DF}">
-                  <a14:hiddenLine xmlns:a14="http://schemas.microsoft.com/office/drawing/2010/main" xmlns="" w="9525">
+                  <a14:hiddenLine xmlns="" xmlns:a14="http://schemas.microsoft.com/office/drawing/2010/main" w="9525">
                     <a:solidFill>
                       <a:srgbClr val="000000"/>
                     </a:solidFill>
@@ -12466,6 +12474,2386 @@
 </p:sld>
 </file>
 
+<file path=ppt/slides/slide2.xml><?xml version="1.0" encoding="utf-8"?>
+<p:sld xmlns:a="http://schemas.openxmlformats.org/drawingml/2006/main" xmlns:r="http://schemas.openxmlformats.org/officeDocument/2006/relationships" xmlns:p="http://schemas.openxmlformats.org/presentationml/2006/main">
+  <p:cSld>
+    <p:spTree>
+      <p:nvGrpSpPr>
+        <p:cNvPr id="1" name=""/>
+        <p:cNvGrpSpPr/>
+        <p:nvPr/>
+      </p:nvGrpSpPr>
+      <p:grpSpPr>
+        <a:xfrm>
+          <a:off x="0" y="0"/>
+          <a:ext cx="0" cy="0"/>
+          <a:chOff x="0" y="0"/>
+          <a:chExt cx="0" cy="0"/>
+        </a:xfrm>
+      </p:grpSpPr>
+      <p:sp>
+        <p:nvSpPr>
+          <p:cNvPr id="2" name="Titre 1"/>
+          <p:cNvSpPr>
+            <a:spLocks noGrp="1"/>
+          </p:cNvSpPr>
+          <p:nvPr>
+            <p:ph type="title"/>
+          </p:nvPr>
+        </p:nvSpPr>
+        <p:spPr/>
+        <p:txBody>
+          <a:bodyPr/>
+          <a:lstStyle/>
+          <a:p>
+            <a:r>
+              <a:rPr lang="fr-FR" dirty="0" smtClean="0"/>
+              <a:t>Présentation</a:t>
+            </a:r>
+            <a:endParaRPr lang="fr-FR" dirty="0"/>
+          </a:p>
+        </p:txBody>
+      </p:sp>
+      <p:sp>
+        <p:nvSpPr>
+          <p:cNvPr id="3" name="Espace réservé du contenu 2"/>
+          <p:cNvSpPr>
+            <a:spLocks noGrp="1"/>
+          </p:cNvSpPr>
+          <p:nvPr>
+            <p:ph idx="1"/>
+          </p:nvPr>
+        </p:nvSpPr>
+        <p:spPr/>
+        <p:txBody>
+          <a:bodyPr/>
+          <a:lstStyle/>
+          <a:p>
+            <a:r>
+              <a:rPr lang="fr-FR" dirty="0" smtClean="0"/>
+              <a:t>Objectifs</a:t>
+            </a:r>
+          </a:p>
+          <a:p>
+            <a:r>
+              <a:rPr lang="fr-FR" dirty="0" smtClean="0"/>
+              <a:t>Diagrammes de cas d’usage</a:t>
+            </a:r>
+          </a:p>
+          <a:p>
+            <a:r>
+              <a:rPr lang="fr-FR" dirty="0" smtClean="0"/>
+              <a:t>User stories</a:t>
+            </a:r>
+          </a:p>
+          <a:p>
+            <a:r>
+              <a:rPr lang="fr-FR" dirty="0" smtClean="0"/>
+              <a:t>Maquettes fonctionnelles</a:t>
+            </a:r>
+          </a:p>
+          <a:p>
+            <a:r>
+              <a:rPr lang="fr-FR" dirty="0" smtClean="0"/>
+              <a:t>Kanban</a:t>
+            </a:r>
+          </a:p>
+        </p:txBody>
+      </p:sp>
+    </p:spTree>
+    <p:extLst>
+      <p:ext uri="{BB962C8B-B14F-4D97-AF65-F5344CB8AC3E}">
+        <p14:creationId xmlns:p14="http://schemas.microsoft.com/office/powerpoint/2010/main" val="3578640393"/>
+      </p:ext>
+    </p:extLst>
+  </p:cSld>
+  <p:clrMapOvr>
+    <a:masterClrMapping/>
+  </p:clrMapOvr>
+  <p:timing>
+    <p:tnLst>
+      <p:par>
+        <p:cTn id="1" dur="indefinite" restart="never" nodeType="tmRoot">
+          <p:childTnLst>
+            <p:seq concurrent="1" nextAc="seek">
+              <p:cTn id="2" dur="indefinite" nodeType="mainSeq">
+                <p:childTnLst>
+                  <p:par>
+                    <p:cTn id="3" fill="hold">
+                      <p:stCondLst>
+                        <p:cond delay="indefinite"/>
+                        <p:cond evt="onBegin" delay="0">
+                          <p:tn val="2"/>
+                        </p:cond>
+                      </p:stCondLst>
+                      <p:childTnLst>
+                        <p:par>
+                          <p:cTn id="4" fill="hold">
+                            <p:stCondLst>
+                              <p:cond delay="0"/>
+                            </p:stCondLst>
+                            <p:childTnLst>
+                              <p:par>
+                                <p:cTn id="5" presetID="10" presetClass="entr" presetSubtype="0" fill="hold" grpId="0" nodeType="afterEffect">
+                                  <p:stCondLst>
+                                    <p:cond delay="0"/>
+                                  </p:stCondLst>
+                                  <p:childTnLst>
+                                    <p:set>
+                                      <p:cBhvr>
+                                        <p:cTn id="6" dur="1" fill="hold">
+                                          <p:stCondLst>
+                                            <p:cond delay="0"/>
+                                          </p:stCondLst>
+                                        </p:cTn>
+                                        <p:tgtEl>
+                                          <p:spTgt spid="3">
+                                            <p:txEl>
+                                              <p:pRg st="0" end="0"/>
+                                            </p:txEl>
+                                          </p:spTgt>
+                                        </p:tgtEl>
+                                        <p:attrNameLst>
+                                          <p:attrName>style.visibility</p:attrName>
+                                        </p:attrNameLst>
+                                      </p:cBhvr>
+                                      <p:to>
+                                        <p:strVal val="visible"/>
+                                      </p:to>
+                                    </p:set>
+                                    <p:animEffect transition="in" filter="fade">
+                                      <p:cBhvr>
+                                        <p:cTn id="7" dur="500"/>
+                                        <p:tgtEl>
+                                          <p:spTgt spid="3">
+                                            <p:txEl>
+                                              <p:pRg st="0" end="0"/>
+                                            </p:txEl>
+                                          </p:spTgt>
+                                        </p:tgtEl>
+                                      </p:cBhvr>
+                                    </p:animEffect>
+                                  </p:childTnLst>
+                                </p:cTn>
+                              </p:par>
+                            </p:childTnLst>
+                          </p:cTn>
+                        </p:par>
+                        <p:par>
+                          <p:cTn id="8" fill="hold">
+                            <p:stCondLst>
+                              <p:cond delay="500"/>
+                            </p:stCondLst>
+                            <p:childTnLst>
+                              <p:par>
+                                <p:cTn id="9" presetID="10" presetClass="entr" presetSubtype="0" fill="hold" grpId="0" nodeType="afterEffect">
+                                  <p:stCondLst>
+                                    <p:cond delay="0"/>
+                                  </p:stCondLst>
+                                  <p:childTnLst>
+                                    <p:set>
+                                      <p:cBhvr>
+                                        <p:cTn id="10" dur="1" fill="hold">
+                                          <p:stCondLst>
+                                            <p:cond delay="0"/>
+                                          </p:stCondLst>
+                                        </p:cTn>
+                                        <p:tgtEl>
+                                          <p:spTgt spid="3">
+                                            <p:txEl>
+                                              <p:pRg st="1" end="1"/>
+                                            </p:txEl>
+                                          </p:spTgt>
+                                        </p:tgtEl>
+                                        <p:attrNameLst>
+                                          <p:attrName>style.visibility</p:attrName>
+                                        </p:attrNameLst>
+                                      </p:cBhvr>
+                                      <p:to>
+                                        <p:strVal val="visible"/>
+                                      </p:to>
+                                    </p:set>
+                                    <p:animEffect transition="in" filter="fade">
+                                      <p:cBhvr>
+                                        <p:cTn id="11" dur="500"/>
+                                        <p:tgtEl>
+                                          <p:spTgt spid="3">
+                                            <p:txEl>
+                                              <p:pRg st="1" end="1"/>
+                                            </p:txEl>
+                                          </p:spTgt>
+                                        </p:tgtEl>
+                                      </p:cBhvr>
+                                    </p:animEffect>
+                                  </p:childTnLst>
+                                </p:cTn>
+                              </p:par>
+                            </p:childTnLst>
+                          </p:cTn>
+                        </p:par>
+                        <p:par>
+                          <p:cTn id="12" fill="hold">
+                            <p:stCondLst>
+                              <p:cond delay="1000"/>
+                            </p:stCondLst>
+                            <p:childTnLst>
+                              <p:par>
+                                <p:cTn id="13" presetID="10" presetClass="entr" presetSubtype="0" fill="hold" grpId="0" nodeType="afterEffect">
+                                  <p:stCondLst>
+                                    <p:cond delay="0"/>
+                                  </p:stCondLst>
+                                  <p:childTnLst>
+                                    <p:set>
+                                      <p:cBhvr>
+                                        <p:cTn id="14" dur="1" fill="hold">
+                                          <p:stCondLst>
+                                            <p:cond delay="0"/>
+                                          </p:stCondLst>
+                                        </p:cTn>
+                                        <p:tgtEl>
+                                          <p:spTgt spid="3">
+                                            <p:txEl>
+                                              <p:pRg st="2" end="2"/>
+                                            </p:txEl>
+                                          </p:spTgt>
+                                        </p:tgtEl>
+                                        <p:attrNameLst>
+                                          <p:attrName>style.visibility</p:attrName>
+                                        </p:attrNameLst>
+                                      </p:cBhvr>
+                                      <p:to>
+                                        <p:strVal val="visible"/>
+                                      </p:to>
+                                    </p:set>
+                                    <p:animEffect transition="in" filter="fade">
+                                      <p:cBhvr>
+                                        <p:cTn id="15" dur="500"/>
+                                        <p:tgtEl>
+                                          <p:spTgt spid="3">
+                                            <p:txEl>
+                                              <p:pRg st="2" end="2"/>
+                                            </p:txEl>
+                                          </p:spTgt>
+                                        </p:tgtEl>
+                                      </p:cBhvr>
+                                    </p:animEffect>
+                                  </p:childTnLst>
+                                </p:cTn>
+                              </p:par>
+                            </p:childTnLst>
+                          </p:cTn>
+                        </p:par>
+                        <p:par>
+                          <p:cTn id="16" fill="hold">
+                            <p:stCondLst>
+                              <p:cond delay="1500"/>
+                            </p:stCondLst>
+                            <p:childTnLst>
+                              <p:par>
+                                <p:cTn id="17" presetID="10" presetClass="entr" presetSubtype="0" fill="hold" grpId="0" nodeType="afterEffect">
+                                  <p:stCondLst>
+                                    <p:cond delay="0"/>
+                                  </p:stCondLst>
+                                  <p:childTnLst>
+                                    <p:set>
+                                      <p:cBhvr>
+                                        <p:cTn id="18" dur="1" fill="hold">
+                                          <p:stCondLst>
+                                            <p:cond delay="0"/>
+                                          </p:stCondLst>
+                                        </p:cTn>
+                                        <p:tgtEl>
+                                          <p:spTgt spid="3">
+                                            <p:txEl>
+                                              <p:pRg st="3" end="3"/>
+                                            </p:txEl>
+                                          </p:spTgt>
+                                        </p:tgtEl>
+                                        <p:attrNameLst>
+                                          <p:attrName>style.visibility</p:attrName>
+                                        </p:attrNameLst>
+                                      </p:cBhvr>
+                                      <p:to>
+                                        <p:strVal val="visible"/>
+                                      </p:to>
+                                    </p:set>
+                                    <p:animEffect transition="in" filter="fade">
+                                      <p:cBhvr>
+                                        <p:cTn id="19" dur="500"/>
+                                        <p:tgtEl>
+                                          <p:spTgt spid="3">
+                                            <p:txEl>
+                                              <p:pRg st="3" end="3"/>
+                                            </p:txEl>
+                                          </p:spTgt>
+                                        </p:tgtEl>
+                                      </p:cBhvr>
+                                    </p:animEffect>
+                                  </p:childTnLst>
+                                </p:cTn>
+                              </p:par>
+                            </p:childTnLst>
+                          </p:cTn>
+                        </p:par>
+                        <p:par>
+                          <p:cTn id="20" fill="hold">
+                            <p:stCondLst>
+                              <p:cond delay="2000"/>
+                            </p:stCondLst>
+                            <p:childTnLst>
+                              <p:par>
+                                <p:cTn id="21" presetID="10" presetClass="entr" presetSubtype="0" fill="hold" grpId="0" nodeType="afterEffect">
+                                  <p:stCondLst>
+                                    <p:cond delay="0"/>
+                                  </p:stCondLst>
+                                  <p:childTnLst>
+                                    <p:set>
+                                      <p:cBhvr>
+                                        <p:cTn id="22" dur="1" fill="hold">
+                                          <p:stCondLst>
+                                            <p:cond delay="0"/>
+                                          </p:stCondLst>
+                                        </p:cTn>
+                                        <p:tgtEl>
+                                          <p:spTgt spid="3">
+                                            <p:txEl>
+                                              <p:pRg st="4" end="4"/>
+                                            </p:txEl>
+                                          </p:spTgt>
+                                        </p:tgtEl>
+                                        <p:attrNameLst>
+                                          <p:attrName>style.visibility</p:attrName>
+                                        </p:attrNameLst>
+                                      </p:cBhvr>
+                                      <p:to>
+                                        <p:strVal val="visible"/>
+                                      </p:to>
+                                    </p:set>
+                                    <p:animEffect transition="in" filter="fade">
+                                      <p:cBhvr>
+                                        <p:cTn id="23" dur="500"/>
+                                        <p:tgtEl>
+                                          <p:spTgt spid="3">
+                                            <p:txEl>
+                                              <p:pRg st="4" end="4"/>
+                                            </p:txEl>
+                                          </p:spTgt>
+                                        </p:tgtEl>
+                                      </p:cBhvr>
+                                    </p:animEffect>
+                                  </p:childTnLst>
+                                </p:cTn>
+                              </p:par>
+                            </p:childTnLst>
+                          </p:cTn>
+                        </p:par>
+                      </p:childTnLst>
+                    </p:cTn>
+                  </p:par>
+                </p:childTnLst>
+              </p:cTn>
+              <p:prevCondLst>
+                <p:cond evt="onPrev" delay="0">
+                  <p:tgtEl>
+                    <p:sldTgt/>
+                  </p:tgtEl>
+                </p:cond>
+              </p:prevCondLst>
+              <p:nextCondLst>
+                <p:cond evt="onNext" delay="0">
+                  <p:tgtEl>
+                    <p:sldTgt/>
+                  </p:tgtEl>
+                </p:cond>
+              </p:nextCondLst>
+            </p:seq>
+          </p:childTnLst>
+        </p:cTn>
+      </p:par>
+    </p:tnLst>
+    <p:bldLst>
+      <p:bldP spid="3" grpId="0" build="p"/>
+    </p:bldLst>
+  </p:timing>
+</p:sld>
+</file>
+
+<file path=ppt/slides/slide3.xml><?xml version="1.0" encoding="utf-8"?>
+<p:sld xmlns:a="http://schemas.openxmlformats.org/drawingml/2006/main" xmlns:r="http://schemas.openxmlformats.org/officeDocument/2006/relationships" xmlns:p="http://schemas.openxmlformats.org/presentationml/2006/main">
+  <p:cSld>
+    <p:spTree>
+      <p:nvGrpSpPr>
+        <p:cNvPr id="1" name=""/>
+        <p:cNvGrpSpPr/>
+        <p:nvPr/>
+      </p:nvGrpSpPr>
+      <p:grpSpPr>
+        <a:xfrm>
+          <a:off x="0" y="0"/>
+          <a:ext cx="0" cy="0"/>
+          <a:chOff x="0" y="0"/>
+          <a:chExt cx="0" cy="0"/>
+        </a:xfrm>
+      </p:grpSpPr>
+      <p:sp>
+        <p:nvSpPr>
+          <p:cNvPr id="2" name="Titre 1"/>
+          <p:cNvSpPr>
+            <a:spLocks noGrp="1"/>
+          </p:cNvSpPr>
+          <p:nvPr>
+            <p:ph type="title"/>
+          </p:nvPr>
+        </p:nvSpPr>
+        <p:spPr/>
+        <p:txBody>
+          <a:bodyPr/>
+          <a:lstStyle/>
+          <a:p>
+            <a:r>
+              <a:rPr lang="fr-FR" dirty="0" smtClean="0"/>
+              <a:t>objectifs</a:t>
+            </a:r>
+            <a:endParaRPr lang="fr-FR" dirty="0"/>
+          </a:p>
+        </p:txBody>
+      </p:sp>
+      <p:sp>
+        <p:nvSpPr>
+          <p:cNvPr id="3" name="Espace réservé du contenu 2"/>
+          <p:cNvSpPr>
+            <a:spLocks noGrp="1"/>
+          </p:cNvSpPr>
+          <p:nvPr>
+            <p:ph idx="1"/>
+          </p:nvPr>
+        </p:nvSpPr>
+        <p:spPr/>
+        <p:txBody>
+          <a:bodyPr>
+            <a:normAutofit fontScale="85000" lnSpcReduction="10000"/>
+          </a:bodyPr>
+          <a:lstStyle/>
+          <a:p>
+            <a:pPr marL="0" indent="0">
+              <a:buNone/>
+            </a:pPr>
+            <a:r>
+              <a:rPr lang="fr-FR" dirty="0" err="1" smtClean="0"/>
+              <a:t>Learn@Home</a:t>
+            </a:r>
+            <a:r>
+              <a:rPr lang="fr-FR" dirty="0" smtClean="0"/>
+              <a:t> veut, par le biais d’un site web, mettre en relation des élèves en difficulté avec des tuteurs bénévoles, pour leur permettent d’obtenir un soutien scolaire, où qu’ils se trouvent. Pour faciliter la communication, le site web devra être composé des pages suivantes : </a:t>
+            </a:r>
+          </a:p>
+          <a:p>
+            <a:pPr>
+              <a:buFontTx/>
+              <a:buChar char="-"/>
+            </a:pPr>
+            <a:r>
+              <a:rPr lang="fr-FR" dirty="0" smtClean="0"/>
+              <a:t>Page de connexion </a:t>
+            </a:r>
+          </a:p>
+          <a:p>
+            <a:pPr>
+              <a:buFontTx/>
+              <a:buChar char="-"/>
+            </a:pPr>
+            <a:r>
+              <a:rPr lang="fr-FR" dirty="0" smtClean="0"/>
+              <a:t>Page tableau de bord</a:t>
+            </a:r>
+          </a:p>
+          <a:p>
+            <a:pPr>
+              <a:buFontTx/>
+              <a:buChar char="-"/>
+            </a:pPr>
+            <a:r>
+              <a:rPr lang="fr-FR" dirty="0" smtClean="0"/>
+              <a:t>Page interface de chat</a:t>
+            </a:r>
+          </a:p>
+          <a:p>
+            <a:pPr>
+              <a:buFontTx/>
+              <a:buChar char="-"/>
+            </a:pPr>
+            <a:r>
+              <a:rPr lang="fr-FR" dirty="0" smtClean="0"/>
+              <a:t>Page calendrier</a:t>
+            </a:r>
+          </a:p>
+          <a:p>
+            <a:pPr>
+              <a:buFontTx/>
+              <a:buChar char="-"/>
+            </a:pPr>
+            <a:r>
+              <a:rPr lang="fr-FR" dirty="0" smtClean="0"/>
+              <a:t>Page gestion des tâches</a:t>
+            </a:r>
+          </a:p>
+          <a:p>
+            <a:pPr marL="0" indent="0">
+              <a:buNone/>
+            </a:pPr>
+            <a:endParaRPr lang="fr-FR" dirty="0"/>
+          </a:p>
+        </p:txBody>
+      </p:sp>
+      <p:sp>
+        <p:nvSpPr>
+          <p:cNvPr id="5" name="ZoneTexte 4"/>
+          <p:cNvSpPr txBox="1"/>
+          <p:nvPr/>
+        </p:nvSpPr>
+        <p:spPr>
+          <a:xfrm>
+            <a:off x="5374432" y="3981060"/>
+            <a:ext cx="5495697" cy="923330"/>
+          </a:xfrm>
+          <a:prstGeom prst="rect">
+            <a:avLst/>
+          </a:prstGeom>
+          <a:noFill/>
+          <a:ln>
+            <a:noFill/>
+          </a:ln>
+          <a:effectLst>
+            <a:outerShdw blurRad="225425" dist="50800" dir="5220000" algn="ctr">
+              <a:srgbClr val="000000">
+                <a:alpha val="33000"/>
+              </a:srgbClr>
+            </a:outerShdw>
+          </a:effectLst>
+          <a:scene3d>
+            <a:camera prst="perspectiveFront" fov="3300000">
+              <a:rot lat="486000" lon="19530000" rev="174000"/>
+            </a:camera>
+            <a:lightRig rig="harsh" dir="t">
+              <a:rot lat="0" lon="0" rev="3000000"/>
+            </a:lightRig>
+          </a:scene3d>
+          <a:sp3d extrusionH="254000" contourW="19050">
+            <a:bevelT w="82550" h="44450" prst="angle"/>
+            <a:bevelB w="82550" h="44450" prst="angle"/>
+            <a:contourClr>
+              <a:srgbClr val="FFFFFF"/>
+            </a:contourClr>
+          </a:sp3d>
+        </p:spPr>
+        <p:txBody>
+          <a:bodyPr wrap="square" rtlCol="0">
+            <a:spAutoFit/>
+          </a:bodyPr>
+          <a:lstStyle/>
+          <a:p>
+            <a:pPr marL="285750" indent="-285750">
+              <a:buFontTx/>
+              <a:buChar char="-"/>
+            </a:pPr>
+            <a:r>
+              <a:rPr lang="fr-FR" dirty="0" smtClean="0"/>
+              <a:t>Permettre à un élève ou un bénévole de se connecter</a:t>
+            </a:r>
+          </a:p>
+          <a:p>
+            <a:pPr marL="285750" indent="-285750">
+              <a:buFontTx/>
+              <a:buChar char="-"/>
+            </a:pPr>
+            <a:r>
+              <a:rPr lang="fr-FR" dirty="0" smtClean="0"/>
+              <a:t>Réinitialiser un mot de passe oublié</a:t>
+            </a:r>
+          </a:p>
+          <a:p>
+            <a:pPr marL="285750" indent="-285750">
+              <a:buFontTx/>
+              <a:buChar char="-"/>
+            </a:pPr>
+            <a:r>
+              <a:rPr lang="fr-FR" dirty="0" smtClean="0"/>
+              <a:t>Créer un nouveau compte</a:t>
+            </a:r>
+            <a:endParaRPr lang="fr-FR" dirty="0"/>
+          </a:p>
+        </p:txBody>
+      </p:sp>
+      <p:sp>
+        <p:nvSpPr>
+          <p:cNvPr id="6" name="ZoneTexte 5"/>
+          <p:cNvSpPr txBox="1"/>
+          <p:nvPr/>
+        </p:nvSpPr>
+        <p:spPr>
+          <a:xfrm>
+            <a:off x="5374432" y="3497066"/>
+            <a:ext cx="5495697" cy="2585323"/>
+          </a:xfrm>
+          <a:prstGeom prst="rect">
+            <a:avLst/>
+          </a:prstGeom>
+          <a:noFill/>
+          <a:ln>
+            <a:noFill/>
+          </a:ln>
+          <a:effectLst>
+            <a:outerShdw blurRad="225425" dist="50800" dir="5220000" algn="ctr">
+              <a:srgbClr val="000000">
+                <a:alpha val="33000"/>
+              </a:srgbClr>
+            </a:outerShdw>
+          </a:effectLst>
+          <a:scene3d>
+            <a:camera prst="perspectiveFront" fov="3300000">
+              <a:rot lat="486000" lon="19530000" rev="174000"/>
+            </a:camera>
+            <a:lightRig rig="harsh" dir="t">
+              <a:rot lat="0" lon="0" rev="3000000"/>
+            </a:lightRig>
+          </a:scene3d>
+          <a:sp3d extrusionH="254000" contourW="19050">
+            <a:bevelT w="82550" h="44450" prst="angle"/>
+            <a:bevelB w="82550" h="44450" prst="angle"/>
+            <a:contourClr>
+              <a:srgbClr val="FFFFFF"/>
+            </a:contourClr>
+          </a:sp3d>
+        </p:spPr>
+        <p:txBody>
+          <a:bodyPr wrap="square" rtlCol="0">
+            <a:spAutoFit/>
+          </a:bodyPr>
+          <a:lstStyle/>
+          <a:p>
+            <a:pPr marL="285750" indent="-285750">
+              <a:buFontTx/>
+              <a:buChar char="-"/>
+            </a:pPr>
+            <a:r>
+              <a:rPr lang="fr-FR" dirty="0" smtClean="0"/>
+              <a:t>Page principale du site : affichage des derniers évènements (nouveaux messages, tâches et éléments de calendrier à venir)</a:t>
+            </a:r>
+          </a:p>
+          <a:p>
+            <a:pPr marL="285750" indent="-285750">
+              <a:buFontTx/>
+              <a:buChar char="-"/>
+            </a:pPr>
+            <a:r>
+              <a:rPr lang="fr-FR" dirty="0" smtClean="0"/>
+              <a:t>Lien vers l’interface de chat </a:t>
+            </a:r>
+          </a:p>
+          <a:p>
+            <a:pPr marL="285750" indent="-285750">
+              <a:buFontTx/>
+              <a:buChar char="-"/>
+            </a:pPr>
+            <a:r>
+              <a:rPr lang="fr-FR" dirty="0" smtClean="0"/>
+              <a:t>Lien vers le calendrier</a:t>
+            </a:r>
+          </a:p>
+          <a:p>
+            <a:pPr marL="285750" indent="-285750">
+              <a:buFontTx/>
+              <a:buChar char="-"/>
+            </a:pPr>
+            <a:r>
+              <a:rPr lang="fr-FR" dirty="0" smtClean="0"/>
+              <a:t>Lien vers la gestion des tâches</a:t>
+            </a:r>
+          </a:p>
+          <a:p>
+            <a:pPr marL="285750" indent="-285750">
+              <a:buFontTx/>
+              <a:buChar char="-"/>
+            </a:pPr>
+            <a:r>
+              <a:rPr lang="fr-FR" dirty="0" smtClean="0"/>
+              <a:t>Lien vers la gestion du profil – prise en compte des informations et photo de profil</a:t>
+            </a:r>
+          </a:p>
+          <a:p>
+            <a:pPr marL="285750" indent="-285750">
+              <a:buFontTx/>
+              <a:buChar char="-"/>
+            </a:pPr>
+            <a:r>
+              <a:rPr lang="fr-FR" dirty="0" smtClean="0"/>
+              <a:t>Déconnexion</a:t>
+            </a:r>
+          </a:p>
+        </p:txBody>
+      </p:sp>
+      <p:sp>
+        <p:nvSpPr>
+          <p:cNvPr id="7" name="ZoneTexte 6"/>
+          <p:cNvSpPr txBox="1"/>
+          <p:nvPr/>
+        </p:nvSpPr>
+        <p:spPr>
+          <a:xfrm>
+            <a:off x="5374432" y="3759876"/>
+            <a:ext cx="5495697" cy="2031325"/>
+          </a:xfrm>
+          <a:prstGeom prst="rect">
+            <a:avLst/>
+          </a:prstGeom>
+          <a:noFill/>
+          <a:ln>
+            <a:noFill/>
+          </a:ln>
+          <a:effectLst>
+            <a:outerShdw blurRad="225425" dist="50800" dir="5220000" algn="ctr">
+              <a:srgbClr val="000000">
+                <a:alpha val="33000"/>
+              </a:srgbClr>
+            </a:outerShdw>
+          </a:effectLst>
+          <a:scene3d>
+            <a:camera prst="perspectiveFront" fov="3300000">
+              <a:rot lat="486000" lon="19530000" rev="174000"/>
+            </a:camera>
+            <a:lightRig rig="harsh" dir="t">
+              <a:rot lat="0" lon="0" rev="3000000"/>
+            </a:lightRig>
+          </a:scene3d>
+          <a:sp3d extrusionH="254000" contourW="19050">
+            <a:bevelT w="82550" h="44450" prst="angle"/>
+            <a:bevelB w="82550" h="44450" prst="angle"/>
+            <a:contourClr>
+              <a:srgbClr val="FFFFFF"/>
+            </a:contourClr>
+          </a:sp3d>
+        </p:spPr>
+        <p:txBody>
+          <a:bodyPr wrap="square" rtlCol="0">
+            <a:spAutoFit/>
+          </a:bodyPr>
+          <a:lstStyle/>
+          <a:p>
+            <a:pPr marL="285750" indent="-285750">
+              <a:buFontTx/>
+              <a:buChar char="-"/>
+            </a:pPr>
+            <a:r>
+              <a:rPr lang="fr-FR" dirty="0" smtClean="0"/>
+              <a:t>Page de chat intégrant un système de discussion instantanée</a:t>
+            </a:r>
+          </a:p>
+          <a:p>
+            <a:pPr marL="285750" indent="-285750">
+              <a:buFontTx/>
+              <a:buChar char="-"/>
+            </a:pPr>
+            <a:r>
+              <a:rPr lang="fr-FR" dirty="0" smtClean="0"/>
+              <a:t>Accession à l’historique des conversations</a:t>
+            </a:r>
+          </a:p>
+          <a:p>
+            <a:pPr marL="285750" indent="-285750">
+              <a:buFontTx/>
+              <a:buChar char="-"/>
+            </a:pPr>
+            <a:r>
+              <a:rPr lang="fr-FR" dirty="0" smtClean="0"/>
+              <a:t>Affichage des photos de profil</a:t>
+            </a:r>
+          </a:p>
+          <a:p>
+            <a:pPr marL="285750" indent="-285750">
+              <a:buFontTx/>
+              <a:buChar char="-"/>
+            </a:pPr>
+            <a:r>
+              <a:rPr lang="fr-FR" dirty="0" smtClean="0"/>
+              <a:t>Indicateur de nouveaux messages</a:t>
+            </a:r>
+          </a:p>
+          <a:p>
+            <a:pPr marL="285750" indent="-285750">
+              <a:buFontTx/>
+              <a:buChar char="-"/>
+            </a:pPr>
+            <a:r>
+              <a:rPr lang="fr-FR" dirty="0" smtClean="0"/>
+              <a:t>Horodatage des messages</a:t>
+            </a:r>
+          </a:p>
+          <a:p>
+            <a:pPr marL="285750" indent="-285750">
+              <a:buFontTx/>
+              <a:buChar char="-"/>
+            </a:pPr>
+            <a:r>
+              <a:rPr lang="fr-FR" dirty="0" smtClean="0"/>
+              <a:t>Gestion des contacts</a:t>
+            </a:r>
+          </a:p>
+        </p:txBody>
+      </p:sp>
+      <p:sp>
+        <p:nvSpPr>
+          <p:cNvPr id="8" name="ZoneTexte 7"/>
+          <p:cNvSpPr txBox="1"/>
+          <p:nvPr/>
+        </p:nvSpPr>
+        <p:spPr>
+          <a:xfrm>
+            <a:off x="5374432" y="3742777"/>
+            <a:ext cx="5495697" cy="2031325"/>
+          </a:xfrm>
+          <a:prstGeom prst="rect">
+            <a:avLst/>
+          </a:prstGeom>
+          <a:noFill/>
+          <a:ln>
+            <a:noFill/>
+          </a:ln>
+          <a:effectLst>
+            <a:outerShdw blurRad="225425" dist="50800" dir="5220000" algn="ctr">
+              <a:srgbClr val="000000">
+                <a:alpha val="33000"/>
+              </a:srgbClr>
+            </a:outerShdw>
+          </a:effectLst>
+          <a:scene3d>
+            <a:camera prst="perspectiveFront" fov="3300000">
+              <a:rot lat="486000" lon="19530000" rev="174000"/>
+            </a:camera>
+            <a:lightRig rig="harsh" dir="t">
+              <a:rot lat="0" lon="0" rev="3000000"/>
+            </a:lightRig>
+          </a:scene3d>
+          <a:sp3d extrusionH="254000" contourW="19050">
+            <a:bevelT w="82550" h="44450" prst="angle"/>
+            <a:bevelB w="82550" h="44450" prst="angle"/>
+            <a:contourClr>
+              <a:srgbClr val="FFFFFF"/>
+            </a:contourClr>
+          </a:sp3d>
+        </p:spPr>
+        <p:txBody>
+          <a:bodyPr wrap="square" rtlCol="0">
+            <a:spAutoFit/>
+          </a:bodyPr>
+          <a:lstStyle/>
+          <a:p>
+            <a:pPr marL="285750" indent="-285750">
+              <a:buFontTx/>
+              <a:buChar char="-"/>
+            </a:pPr>
+            <a:r>
+              <a:rPr lang="fr-FR" dirty="0" smtClean="0"/>
+              <a:t>Page de calendrier classique</a:t>
+            </a:r>
+          </a:p>
+          <a:p>
+            <a:pPr marL="285750" indent="-285750">
+              <a:buFontTx/>
+              <a:buChar char="-"/>
+            </a:pPr>
+            <a:r>
+              <a:rPr lang="fr-FR" dirty="0" smtClean="0"/>
+              <a:t>Affichage des évènements et rendez-vous de l’utilisateur</a:t>
+            </a:r>
+          </a:p>
+          <a:p>
+            <a:pPr marL="285750" indent="-285750">
+              <a:buFontTx/>
+              <a:buChar char="-"/>
+            </a:pPr>
+            <a:r>
+              <a:rPr lang="fr-FR" dirty="0" smtClean="0"/>
+              <a:t>Ajout/suppression d’élément de calendrier par l’utilisateur pour lui-même</a:t>
+            </a:r>
+          </a:p>
+          <a:p>
+            <a:pPr marL="285750" indent="-285750">
+              <a:buFontTx/>
+              <a:buChar char="-"/>
+            </a:pPr>
+            <a:r>
+              <a:rPr lang="fr-FR" dirty="0" smtClean="0"/>
+              <a:t>Ajout/suppression d’élément de calendrier des élèves par le tuteur</a:t>
+            </a:r>
+          </a:p>
+        </p:txBody>
+      </p:sp>
+      <p:sp>
+        <p:nvSpPr>
+          <p:cNvPr id="10" name="ZoneTexte 9"/>
+          <p:cNvSpPr txBox="1"/>
+          <p:nvPr/>
+        </p:nvSpPr>
+        <p:spPr>
+          <a:xfrm>
+            <a:off x="5374432" y="3874947"/>
+            <a:ext cx="5495697" cy="1477328"/>
+          </a:xfrm>
+          <a:prstGeom prst="rect">
+            <a:avLst/>
+          </a:prstGeom>
+          <a:noFill/>
+          <a:ln>
+            <a:noFill/>
+          </a:ln>
+          <a:effectLst>
+            <a:outerShdw blurRad="225425" dist="50800" dir="5220000" algn="ctr">
+              <a:srgbClr val="000000">
+                <a:alpha val="33000"/>
+              </a:srgbClr>
+            </a:outerShdw>
+          </a:effectLst>
+          <a:scene3d>
+            <a:camera prst="perspectiveFront" fov="3300000">
+              <a:rot lat="486000" lon="19530000" rev="174000"/>
+            </a:camera>
+            <a:lightRig rig="harsh" dir="t">
+              <a:rot lat="0" lon="0" rev="3000000"/>
+            </a:lightRig>
+          </a:scene3d>
+          <a:sp3d extrusionH="254000" contourW="19050">
+            <a:bevelT w="82550" h="44450" prst="angle"/>
+            <a:bevelB w="82550" h="44450" prst="angle"/>
+            <a:contourClr>
+              <a:srgbClr val="FFFFFF"/>
+            </a:contourClr>
+          </a:sp3d>
+        </p:spPr>
+        <p:txBody>
+          <a:bodyPr wrap="square" rtlCol="0">
+            <a:spAutoFit/>
+          </a:bodyPr>
+          <a:lstStyle/>
+          <a:p>
+            <a:pPr marL="285750" indent="-285750">
+              <a:buFontTx/>
+              <a:buChar char="-"/>
+            </a:pPr>
+            <a:r>
+              <a:rPr lang="fr-FR" dirty="0" smtClean="0"/>
+              <a:t>Affichage des tâches de l’utilisateur</a:t>
+            </a:r>
+          </a:p>
+          <a:p>
+            <a:pPr marL="285750" indent="-285750">
+              <a:buFontTx/>
+              <a:buChar char="-"/>
+            </a:pPr>
+            <a:r>
+              <a:rPr lang="fr-FR" dirty="0" smtClean="0"/>
+              <a:t>Ajout/suppression de tâches par l’utilisateur pour lui-même</a:t>
+            </a:r>
+          </a:p>
+          <a:p>
+            <a:pPr marL="285750" indent="-285750">
+              <a:buFontTx/>
+              <a:buChar char="-"/>
+            </a:pPr>
+            <a:r>
+              <a:rPr lang="fr-FR" dirty="0" smtClean="0"/>
+              <a:t>Ajout/suppression de tâches pour les élèves par le tuteur</a:t>
+            </a:r>
+          </a:p>
+        </p:txBody>
+      </p:sp>
+    </p:spTree>
+    <p:extLst>
+      <p:ext uri="{BB962C8B-B14F-4D97-AF65-F5344CB8AC3E}">
+        <p14:creationId xmlns:p14="http://schemas.microsoft.com/office/powerpoint/2010/main" val="400682276"/>
+      </p:ext>
+    </p:extLst>
+  </p:cSld>
+  <p:clrMapOvr>
+    <a:masterClrMapping/>
+  </p:clrMapOvr>
+  <p:timing>
+    <p:tnLst>
+      <p:par>
+        <p:cTn id="1" dur="indefinite" restart="never" nodeType="tmRoot">
+          <p:childTnLst>
+            <p:seq concurrent="1" nextAc="seek">
+              <p:cTn id="2" dur="indefinite" nodeType="mainSeq">
+                <p:childTnLst>
+                  <p:par>
+                    <p:cTn id="3" fill="hold">
+                      <p:stCondLst>
+                        <p:cond delay="indefinite"/>
+                        <p:cond evt="onBegin" delay="0">
+                          <p:tn val="2"/>
+                        </p:cond>
+                      </p:stCondLst>
+                      <p:childTnLst>
+                        <p:par>
+                          <p:cTn id="4" fill="hold">
+                            <p:stCondLst>
+                              <p:cond delay="0"/>
+                            </p:stCondLst>
+                            <p:childTnLst>
+                              <p:par>
+                                <p:cTn id="5" presetID="10" presetClass="entr" presetSubtype="0" fill="hold" grpId="0" nodeType="afterEffect">
+                                  <p:stCondLst>
+                                    <p:cond delay="0"/>
+                                  </p:stCondLst>
+                                  <p:childTnLst>
+                                    <p:set>
+                                      <p:cBhvr>
+                                        <p:cTn id="6" dur="1" fill="hold">
+                                          <p:stCondLst>
+                                            <p:cond delay="0"/>
+                                          </p:stCondLst>
+                                        </p:cTn>
+                                        <p:tgtEl>
+                                          <p:spTgt spid="3">
+                                            <p:txEl>
+                                              <p:pRg st="0" end="0"/>
+                                            </p:txEl>
+                                          </p:spTgt>
+                                        </p:tgtEl>
+                                        <p:attrNameLst>
+                                          <p:attrName>style.visibility</p:attrName>
+                                        </p:attrNameLst>
+                                      </p:cBhvr>
+                                      <p:to>
+                                        <p:strVal val="visible"/>
+                                      </p:to>
+                                    </p:set>
+                                    <p:animEffect transition="in" filter="fade">
+                                      <p:cBhvr>
+                                        <p:cTn id="7" dur="500"/>
+                                        <p:tgtEl>
+                                          <p:spTgt spid="3">
+                                            <p:txEl>
+                                              <p:pRg st="0" end="0"/>
+                                            </p:txEl>
+                                          </p:spTgt>
+                                        </p:tgtEl>
+                                      </p:cBhvr>
+                                    </p:animEffect>
+                                  </p:childTnLst>
+                                </p:cTn>
+                              </p:par>
+                            </p:childTnLst>
+                          </p:cTn>
+                        </p:par>
+                        <p:par>
+                          <p:cTn id="8" fill="hold">
+                            <p:stCondLst>
+                              <p:cond delay="500"/>
+                            </p:stCondLst>
+                            <p:childTnLst>
+                              <p:par>
+                                <p:cTn id="9" presetID="10" presetClass="entr" presetSubtype="0" fill="hold" grpId="0" nodeType="afterEffect">
+                                  <p:stCondLst>
+                                    <p:cond delay="0"/>
+                                  </p:stCondLst>
+                                  <p:childTnLst>
+                                    <p:set>
+                                      <p:cBhvr>
+                                        <p:cTn id="10" dur="1" fill="hold">
+                                          <p:stCondLst>
+                                            <p:cond delay="0"/>
+                                          </p:stCondLst>
+                                        </p:cTn>
+                                        <p:tgtEl>
+                                          <p:spTgt spid="3">
+                                            <p:txEl>
+                                              <p:pRg st="1" end="1"/>
+                                            </p:txEl>
+                                          </p:spTgt>
+                                        </p:tgtEl>
+                                        <p:attrNameLst>
+                                          <p:attrName>style.visibility</p:attrName>
+                                        </p:attrNameLst>
+                                      </p:cBhvr>
+                                      <p:to>
+                                        <p:strVal val="visible"/>
+                                      </p:to>
+                                    </p:set>
+                                    <p:animEffect transition="in" filter="fade">
+                                      <p:cBhvr>
+                                        <p:cTn id="11" dur="500"/>
+                                        <p:tgtEl>
+                                          <p:spTgt spid="3">
+                                            <p:txEl>
+                                              <p:pRg st="1" end="1"/>
+                                            </p:txEl>
+                                          </p:spTgt>
+                                        </p:tgtEl>
+                                      </p:cBhvr>
+                                    </p:animEffect>
+                                  </p:childTnLst>
+                                </p:cTn>
+                              </p:par>
+                            </p:childTnLst>
+                          </p:cTn>
+                        </p:par>
+                        <p:par>
+                          <p:cTn id="12" fill="hold">
+                            <p:stCondLst>
+                              <p:cond delay="1000"/>
+                            </p:stCondLst>
+                            <p:childTnLst>
+                              <p:par>
+                                <p:cTn id="13" presetID="10" presetClass="entr" presetSubtype="0" fill="hold" grpId="0" nodeType="afterEffect">
+                                  <p:stCondLst>
+                                    <p:cond delay="0"/>
+                                  </p:stCondLst>
+                                  <p:childTnLst>
+                                    <p:set>
+                                      <p:cBhvr>
+                                        <p:cTn id="14" dur="1" fill="hold">
+                                          <p:stCondLst>
+                                            <p:cond delay="0"/>
+                                          </p:stCondLst>
+                                        </p:cTn>
+                                        <p:tgtEl>
+                                          <p:spTgt spid="3">
+                                            <p:txEl>
+                                              <p:pRg st="2" end="2"/>
+                                            </p:txEl>
+                                          </p:spTgt>
+                                        </p:tgtEl>
+                                        <p:attrNameLst>
+                                          <p:attrName>style.visibility</p:attrName>
+                                        </p:attrNameLst>
+                                      </p:cBhvr>
+                                      <p:to>
+                                        <p:strVal val="visible"/>
+                                      </p:to>
+                                    </p:set>
+                                    <p:animEffect transition="in" filter="fade">
+                                      <p:cBhvr>
+                                        <p:cTn id="15" dur="500"/>
+                                        <p:tgtEl>
+                                          <p:spTgt spid="3">
+                                            <p:txEl>
+                                              <p:pRg st="2" end="2"/>
+                                            </p:txEl>
+                                          </p:spTgt>
+                                        </p:tgtEl>
+                                      </p:cBhvr>
+                                    </p:animEffect>
+                                  </p:childTnLst>
+                                </p:cTn>
+                              </p:par>
+                            </p:childTnLst>
+                          </p:cTn>
+                        </p:par>
+                        <p:par>
+                          <p:cTn id="16" fill="hold">
+                            <p:stCondLst>
+                              <p:cond delay="1500"/>
+                            </p:stCondLst>
+                            <p:childTnLst>
+                              <p:par>
+                                <p:cTn id="17" presetID="10" presetClass="entr" presetSubtype="0" fill="hold" grpId="0" nodeType="afterEffect">
+                                  <p:stCondLst>
+                                    <p:cond delay="0"/>
+                                  </p:stCondLst>
+                                  <p:childTnLst>
+                                    <p:set>
+                                      <p:cBhvr>
+                                        <p:cTn id="18" dur="1" fill="hold">
+                                          <p:stCondLst>
+                                            <p:cond delay="0"/>
+                                          </p:stCondLst>
+                                        </p:cTn>
+                                        <p:tgtEl>
+                                          <p:spTgt spid="3">
+                                            <p:txEl>
+                                              <p:pRg st="3" end="3"/>
+                                            </p:txEl>
+                                          </p:spTgt>
+                                        </p:tgtEl>
+                                        <p:attrNameLst>
+                                          <p:attrName>style.visibility</p:attrName>
+                                        </p:attrNameLst>
+                                      </p:cBhvr>
+                                      <p:to>
+                                        <p:strVal val="visible"/>
+                                      </p:to>
+                                    </p:set>
+                                    <p:animEffect transition="in" filter="fade">
+                                      <p:cBhvr>
+                                        <p:cTn id="19" dur="500"/>
+                                        <p:tgtEl>
+                                          <p:spTgt spid="3">
+                                            <p:txEl>
+                                              <p:pRg st="3" end="3"/>
+                                            </p:txEl>
+                                          </p:spTgt>
+                                        </p:tgtEl>
+                                      </p:cBhvr>
+                                    </p:animEffect>
+                                  </p:childTnLst>
+                                </p:cTn>
+                              </p:par>
+                            </p:childTnLst>
+                          </p:cTn>
+                        </p:par>
+                        <p:par>
+                          <p:cTn id="20" fill="hold">
+                            <p:stCondLst>
+                              <p:cond delay="2000"/>
+                            </p:stCondLst>
+                            <p:childTnLst>
+                              <p:par>
+                                <p:cTn id="21" presetID="10" presetClass="entr" presetSubtype="0" fill="hold" grpId="0" nodeType="afterEffect">
+                                  <p:stCondLst>
+                                    <p:cond delay="0"/>
+                                  </p:stCondLst>
+                                  <p:childTnLst>
+                                    <p:set>
+                                      <p:cBhvr>
+                                        <p:cTn id="22" dur="1" fill="hold">
+                                          <p:stCondLst>
+                                            <p:cond delay="0"/>
+                                          </p:stCondLst>
+                                        </p:cTn>
+                                        <p:tgtEl>
+                                          <p:spTgt spid="3">
+                                            <p:txEl>
+                                              <p:pRg st="4" end="4"/>
+                                            </p:txEl>
+                                          </p:spTgt>
+                                        </p:tgtEl>
+                                        <p:attrNameLst>
+                                          <p:attrName>style.visibility</p:attrName>
+                                        </p:attrNameLst>
+                                      </p:cBhvr>
+                                      <p:to>
+                                        <p:strVal val="visible"/>
+                                      </p:to>
+                                    </p:set>
+                                    <p:animEffect transition="in" filter="fade">
+                                      <p:cBhvr>
+                                        <p:cTn id="23" dur="500"/>
+                                        <p:tgtEl>
+                                          <p:spTgt spid="3">
+                                            <p:txEl>
+                                              <p:pRg st="4" end="4"/>
+                                            </p:txEl>
+                                          </p:spTgt>
+                                        </p:tgtEl>
+                                      </p:cBhvr>
+                                    </p:animEffect>
+                                  </p:childTnLst>
+                                </p:cTn>
+                              </p:par>
+                            </p:childTnLst>
+                          </p:cTn>
+                        </p:par>
+                        <p:par>
+                          <p:cTn id="24" fill="hold">
+                            <p:stCondLst>
+                              <p:cond delay="2500"/>
+                            </p:stCondLst>
+                            <p:childTnLst>
+                              <p:par>
+                                <p:cTn id="25" presetID="10" presetClass="entr" presetSubtype="0" fill="hold" grpId="0" nodeType="afterEffect">
+                                  <p:stCondLst>
+                                    <p:cond delay="0"/>
+                                  </p:stCondLst>
+                                  <p:childTnLst>
+                                    <p:set>
+                                      <p:cBhvr>
+                                        <p:cTn id="26" dur="1" fill="hold">
+                                          <p:stCondLst>
+                                            <p:cond delay="0"/>
+                                          </p:stCondLst>
+                                        </p:cTn>
+                                        <p:tgtEl>
+                                          <p:spTgt spid="3">
+                                            <p:txEl>
+                                              <p:pRg st="5" end="5"/>
+                                            </p:txEl>
+                                          </p:spTgt>
+                                        </p:tgtEl>
+                                        <p:attrNameLst>
+                                          <p:attrName>style.visibility</p:attrName>
+                                        </p:attrNameLst>
+                                      </p:cBhvr>
+                                      <p:to>
+                                        <p:strVal val="visible"/>
+                                      </p:to>
+                                    </p:set>
+                                    <p:animEffect transition="in" filter="fade">
+                                      <p:cBhvr>
+                                        <p:cTn id="27" dur="500"/>
+                                        <p:tgtEl>
+                                          <p:spTgt spid="3">
+                                            <p:txEl>
+                                              <p:pRg st="5" end="5"/>
+                                            </p:txEl>
+                                          </p:spTgt>
+                                        </p:tgtEl>
+                                      </p:cBhvr>
+                                    </p:animEffect>
+                                  </p:childTnLst>
+                                </p:cTn>
+                              </p:par>
+                            </p:childTnLst>
+                          </p:cTn>
+                        </p:par>
+                      </p:childTnLst>
+                    </p:cTn>
+                  </p:par>
+                  <p:par>
+                    <p:cTn id="28" fill="hold">
+                      <p:stCondLst>
+                        <p:cond delay="indefinite"/>
+                      </p:stCondLst>
+                      <p:childTnLst>
+                        <p:par>
+                          <p:cTn id="29" fill="hold">
+                            <p:stCondLst>
+                              <p:cond delay="0"/>
+                            </p:stCondLst>
+                            <p:childTnLst>
+                              <p:par>
+                                <p:cTn id="30" presetID="1" presetClass="entr" presetSubtype="0" fill="hold" grpId="0" nodeType="clickEffect">
+                                  <p:stCondLst>
+                                    <p:cond delay="0"/>
+                                  </p:stCondLst>
+                                  <p:childTnLst>
+                                    <p:set>
+                                      <p:cBhvr>
+                                        <p:cTn id="31" dur="1" fill="hold">
+                                          <p:stCondLst>
+                                            <p:cond delay="0"/>
+                                          </p:stCondLst>
+                                        </p:cTn>
+                                        <p:tgtEl>
+                                          <p:spTgt spid="5"/>
+                                        </p:tgtEl>
+                                        <p:attrNameLst>
+                                          <p:attrName>style.visibility</p:attrName>
+                                        </p:attrNameLst>
+                                      </p:cBhvr>
+                                      <p:to>
+                                        <p:strVal val="visible"/>
+                                      </p:to>
+                                    </p:set>
+                                  </p:childTnLst>
+                                </p:cTn>
+                              </p:par>
+                            </p:childTnLst>
+                          </p:cTn>
+                        </p:par>
+                      </p:childTnLst>
+                    </p:cTn>
+                  </p:par>
+                  <p:par>
+                    <p:cTn id="32" fill="hold">
+                      <p:stCondLst>
+                        <p:cond delay="indefinite"/>
+                      </p:stCondLst>
+                      <p:childTnLst>
+                        <p:par>
+                          <p:cTn id="33" fill="hold">
+                            <p:stCondLst>
+                              <p:cond delay="0"/>
+                            </p:stCondLst>
+                            <p:childTnLst>
+                              <p:par>
+                                <p:cTn id="34" presetID="1" presetClass="exit" presetSubtype="0" fill="hold" grpId="1" nodeType="clickEffect">
+                                  <p:stCondLst>
+                                    <p:cond delay="0"/>
+                                  </p:stCondLst>
+                                  <p:childTnLst>
+                                    <p:set>
+                                      <p:cBhvr>
+                                        <p:cTn id="35" dur="1" fill="hold">
+                                          <p:stCondLst>
+                                            <p:cond delay="0"/>
+                                          </p:stCondLst>
+                                        </p:cTn>
+                                        <p:tgtEl>
+                                          <p:spTgt spid="5"/>
+                                        </p:tgtEl>
+                                        <p:attrNameLst>
+                                          <p:attrName>style.visibility</p:attrName>
+                                        </p:attrNameLst>
+                                      </p:cBhvr>
+                                      <p:to>
+                                        <p:strVal val="hidden"/>
+                                      </p:to>
+                                    </p:set>
+                                  </p:childTnLst>
+                                </p:cTn>
+                              </p:par>
+                            </p:childTnLst>
+                          </p:cTn>
+                        </p:par>
+                        <p:par>
+                          <p:cTn id="36" fill="hold">
+                            <p:stCondLst>
+                              <p:cond delay="0"/>
+                            </p:stCondLst>
+                            <p:childTnLst>
+                              <p:par>
+                                <p:cTn id="37" presetID="1" presetClass="entr" presetSubtype="0" fill="hold" grpId="0" nodeType="afterEffect">
+                                  <p:stCondLst>
+                                    <p:cond delay="0"/>
+                                  </p:stCondLst>
+                                  <p:childTnLst>
+                                    <p:set>
+                                      <p:cBhvr>
+                                        <p:cTn id="38" dur="1" fill="hold">
+                                          <p:stCondLst>
+                                            <p:cond delay="0"/>
+                                          </p:stCondLst>
+                                        </p:cTn>
+                                        <p:tgtEl>
+                                          <p:spTgt spid="6"/>
+                                        </p:tgtEl>
+                                        <p:attrNameLst>
+                                          <p:attrName>style.visibility</p:attrName>
+                                        </p:attrNameLst>
+                                      </p:cBhvr>
+                                      <p:to>
+                                        <p:strVal val="visible"/>
+                                      </p:to>
+                                    </p:set>
+                                  </p:childTnLst>
+                                </p:cTn>
+                              </p:par>
+                            </p:childTnLst>
+                          </p:cTn>
+                        </p:par>
+                      </p:childTnLst>
+                    </p:cTn>
+                  </p:par>
+                  <p:par>
+                    <p:cTn id="39" fill="hold">
+                      <p:stCondLst>
+                        <p:cond delay="indefinite"/>
+                      </p:stCondLst>
+                      <p:childTnLst>
+                        <p:par>
+                          <p:cTn id="40" fill="hold">
+                            <p:stCondLst>
+                              <p:cond delay="0"/>
+                            </p:stCondLst>
+                            <p:childTnLst>
+                              <p:par>
+                                <p:cTn id="41" presetID="1" presetClass="exit" presetSubtype="0" fill="hold" grpId="1" nodeType="clickEffect">
+                                  <p:stCondLst>
+                                    <p:cond delay="0"/>
+                                  </p:stCondLst>
+                                  <p:childTnLst>
+                                    <p:set>
+                                      <p:cBhvr>
+                                        <p:cTn id="42" dur="1" fill="hold">
+                                          <p:stCondLst>
+                                            <p:cond delay="0"/>
+                                          </p:stCondLst>
+                                        </p:cTn>
+                                        <p:tgtEl>
+                                          <p:spTgt spid="6"/>
+                                        </p:tgtEl>
+                                        <p:attrNameLst>
+                                          <p:attrName>style.visibility</p:attrName>
+                                        </p:attrNameLst>
+                                      </p:cBhvr>
+                                      <p:to>
+                                        <p:strVal val="hidden"/>
+                                      </p:to>
+                                    </p:set>
+                                  </p:childTnLst>
+                                </p:cTn>
+                              </p:par>
+                            </p:childTnLst>
+                          </p:cTn>
+                        </p:par>
+                        <p:par>
+                          <p:cTn id="43" fill="hold">
+                            <p:stCondLst>
+                              <p:cond delay="0"/>
+                            </p:stCondLst>
+                            <p:childTnLst>
+                              <p:par>
+                                <p:cTn id="44" presetID="1" presetClass="entr" presetSubtype="0" fill="hold" grpId="0" nodeType="afterEffect">
+                                  <p:stCondLst>
+                                    <p:cond delay="0"/>
+                                  </p:stCondLst>
+                                  <p:childTnLst>
+                                    <p:set>
+                                      <p:cBhvr>
+                                        <p:cTn id="45" dur="1" fill="hold">
+                                          <p:stCondLst>
+                                            <p:cond delay="0"/>
+                                          </p:stCondLst>
+                                        </p:cTn>
+                                        <p:tgtEl>
+                                          <p:spTgt spid="7"/>
+                                        </p:tgtEl>
+                                        <p:attrNameLst>
+                                          <p:attrName>style.visibility</p:attrName>
+                                        </p:attrNameLst>
+                                      </p:cBhvr>
+                                      <p:to>
+                                        <p:strVal val="visible"/>
+                                      </p:to>
+                                    </p:set>
+                                  </p:childTnLst>
+                                </p:cTn>
+                              </p:par>
+                            </p:childTnLst>
+                          </p:cTn>
+                        </p:par>
+                      </p:childTnLst>
+                    </p:cTn>
+                  </p:par>
+                  <p:par>
+                    <p:cTn id="46" fill="hold">
+                      <p:stCondLst>
+                        <p:cond delay="indefinite"/>
+                      </p:stCondLst>
+                      <p:childTnLst>
+                        <p:par>
+                          <p:cTn id="47" fill="hold">
+                            <p:stCondLst>
+                              <p:cond delay="0"/>
+                            </p:stCondLst>
+                            <p:childTnLst>
+                              <p:par>
+                                <p:cTn id="48" presetID="1" presetClass="exit" presetSubtype="0" fill="hold" grpId="1" nodeType="clickEffect">
+                                  <p:stCondLst>
+                                    <p:cond delay="0"/>
+                                  </p:stCondLst>
+                                  <p:childTnLst>
+                                    <p:set>
+                                      <p:cBhvr>
+                                        <p:cTn id="49" dur="1" fill="hold">
+                                          <p:stCondLst>
+                                            <p:cond delay="0"/>
+                                          </p:stCondLst>
+                                        </p:cTn>
+                                        <p:tgtEl>
+                                          <p:spTgt spid="7"/>
+                                        </p:tgtEl>
+                                        <p:attrNameLst>
+                                          <p:attrName>style.visibility</p:attrName>
+                                        </p:attrNameLst>
+                                      </p:cBhvr>
+                                      <p:to>
+                                        <p:strVal val="hidden"/>
+                                      </p:to>
+                                    </p:set>
+                                  </p:childTnLst>
+                                </p:cTn>
+                              </p:par>
+                            </p:childTnLst>
+                          </p:cTn>
+                        </p:par>
+                        <p:par>
+                          <p:cTn id="50" fill="hold">
+                            <p:stCondLst>
+                              <p:cond delay="0"/>
+                            </p:stCondLst>
+                            <p:childTnLst>
+                              <p:par>
+                                <p:cTn id="51" presetID="1" presetClass="entr" presetSubtype="0" fill="hold" grpId="0" nodeType="afterEffect">
+                                  <p:stCondLst>
+                                    <p:cond delay="0"/>
+                                  </p:stCondLst>
+                                  <p:childTnLst>
+                                    <p:set>
+                                      <p:cBhvr>
+                                        <p:cTn id="52" dur="1" fill="hold">
+                                          <p:stCondLst>
+                                            <p:cond delay="0"/>
+                                          </p:stCondLst>
+                                        </p:cTn>
+                                        <p:tgtEl>
+                                          <p:spTgt spid="8"/>
+                                        </p:tgtEl>
+                                        <p:attrNameLst>
+                                          <p:attrName>style.visibility</p:attrName>
+                                        </p:attrNameLst>
+                                      </p:cBhvr>
+                                      <p:to>
+                                        <p:strVal val="visible"/>
+                                      </p:to>
+                                    </p:set>
+                                  </p:childTnLst>
+                                </p:cTn>
+                              </p:par>
+                            </p:childTnLst>
+                          </p:cTn>
+                        </p:par>
+                      </p:childTnLst>
+                    </p:cTn>
+                  </p:par>
+                  <p:par>
+                    <p:cTn id="53" fill="hold">
+                      <p:stCondLst>
+                        <p:cond delay="indefinite"/>
+                      </p:stCondLst>
+                      <p:childTnLst>
+                        <p:par>
+                          <p:cTn id="54" fill="hold">
+                            <p:stCondLst>
+                              <p:cond delay="0"/>
+                            </p:stCondLst>
+                            <p:childTnLst>
+                              <p:par>
+                                <p:cTn id="55" presetID="1" presetClass="exit" presetSubtype="0" fill="hold" grpId="1" nodeType="clickEffect">
+                                  <p:stCondLst>
+                                    <p:cond delay="0"/>
+                                  </p:stCondLst>
+                                  <p:childTnLst>
+                                    <p:set>
+                                      <p:cBhvr>
+                                        <p:cTn id="56" dur="1" fill="hold">
+                                          <p:stCondLst>
+                                            <p:cond delay="0"/>
+                                          </p:stCondLst>
+                                        </p:cTn>
+                                        <p:tgtEl>
+                                          <p:spTgt spid="8"/>
+                                        </p:tgtEl>
+                                        <p:attrNameLst>
+                                          <p:attrName>style.visibility</p:attrName>
+                                        </p:attrNameLst>
+                                      </p:cBhvr>
+                                      <p:to>
+                                        <p:strVal val="hidden"/>
+                                      </p:to>
+                                    </p:set>
+                                  </p:childTnLst>
+                                </p:cTn>
+                              </p:par>
+                            </p:childTnLst>
+                          </p:cTn>
+                        </p:par>
+                        <p:par>
+                          <p:cTn id="57" fill="hold">
+                            <p:stCondLst>
+                              <p:cond delay="0"/>
+                            </p:stCondLst>
+                            <p:childTnLst>
+                              <p:par>
+                                <p:cTn id="58" presetID="1" presetClass="entr" presetSubtype="0" fill="hold" grpId="0" nodeType="afterEffect">
+                                  <p:stCondLst>
+                                    <p:cond delay="0"/>
+                                  </p:stCondLst>
+                                  <p:childTnLst>
+                                    <p:set>
+                                      <p:cBhvr>
+                                        <p:cTn id="59" dur="1" fill="hold">
+                                          <p:stCondLst>
+                                            <p:cond delay="0"/>
+                                          </p:stCondLst>
+                                        </p:cTn>
+                                        <p:tgtEl>
+                                          <p:spTgt spid="10"/>
+                                        </p:tgtEl>
+                                        <p:attrNameLst>
+                                          <p:attrName>style.visibility</p:attrName>
+                                        </p:attrNameLst>
+                                      </p:cBhvr>
+                                      <p:to>
+                                        <p:strVal val="visible"/>
+                                      </p:to>
+                                    </p:set>
+                                  </p:childTnLst>
+                                </p:cTn>
+                              </p:par>
+                            </p:childTnLst>
+                          </p:cTn>
+                        </p:par>
+                      </p:childTnLst>
+                    </p:cTn>
+                  </p:par>
+                </p:childTnLst>
+              </p:cTn>
+              <p:prevCondLst>
+                <p:cond evt="onPrev" delay="0">
+                  <p:tgtEl>
+                    <p:sldTgt/>
+                  </p:tgtEl>
+                </p:cond>
+              </p:prevCondLst>
+              <p:nextCondLst>
+                <p:cond evt="onNext" delay="0">
+                  <p:tgtEl>
+                    <p:sldTgt/>
+                  </p:tgtEl>
+                </p:cond>
+              </p:nextCondLst>
+            </p:seq>
+          </p:childTnLst>
+        </p:cTn>
+      </p:par>
+    </p:tnLst>
+    <p:bldLst>
+      <p:bldP spid="3" grpId="0" uiExpand="1" build="p"/>
+      <p:bldP spid="5" grpId="0"/>
+      <p:bldP spid="5" grpId="1"/>
+      <p:bldP spid="6" grpId="0"/>
+      <p:bldP spid="6" grpId="1"/>
+      <p:bldP spid="7" grpId="0"/>
+      <p:bldP spid="7" grpId="1"/>
+      <p:bldP spid="8" grpId="0"/>
+      <p:bldP spid="8" grpId="1"/>
+      <p:bldP spid="10" grpId="0"/>
+    </p:bldLst>
+  </p:timing>
+</p:sld>
+</file>
+
+<file path=ppt/slides/slide4.xml><?xml version="1.0" encoding="utf-8"?>
+<p:sld xmlns:a="http://schemas.openxmlformats.org/drawingml/2006/main" xmlns:r="http://schemas.openxmlformats.org/officeDocument/2006/relationships" xmlns:p="http://schemas.openxmlformats.org/presentationml/2006/main">
+  <p:cSld>
+    <p:spTree>
+      <p:nvGrpSpPr>
+        <p:cNvPr id="1" name=""/>
+        <p:cNvGrpSpPr/>
+        <p:nvPr/>
+      </p:nvGrpSpPr>
+      <p:grpSpPr>
+        <a:xfrm>
+          <a:off x="0" y="0"/>
+          <a:ext cx="0" cy="0"/>
+          <a:chOff x="0" y="0"/>
+          <a:chExt cx="0" cy="0"/>
+        </a:xfrm>
+      </p:grpSpPr>
+      <p:sp>
+        <p:nvSpPr>
+          <p:cNvPr id="2" name="Titre 1"/>
+          <p:cNvSpPr>
+            <a:spLocks noGrp="1"/>
+          </p:cNvSpPr>
+          <p:nvPr>
+            <p:ph type="title"/>
+          </p:nvPr>
+        </p:nvSpPr>
+        <p:spPr/>
+        <p:txBody>
+          <a:bodyPr/>
+          <a:lstStyle/>
+          <a:p>
+            <a:r>
+              <a:rPr lang="fr-FR" dirty="0" smtClean="0"/>
+              <a:t>Diagrammes de cas d’usage</a:t>
+            </a:r>
+            <a:endParaRPr lang="fr-FR" dirty="0"/>
+          </a:p>
+        </p:txBody>
+      </p:sp>
+      <p:pic>
+        <p:nvPicPr>
+          <p:cNvPr id="4" name="Image 3"/>
+          <p:cNvPicPr>
+            <a:picLocks noChangeAspect="1"/>
+          </p:cNvPicPr>
+          <p:nvPr/>
+        </p:nvPicPr>
+        <p:blipFill>
+          <a:blip r:embed="rId2">
+            <a:extLst>
+              <a:ext uri="{28A0092B-C50C-407E-A947-70E740481C1C}">
+                <a14:useLocalDpi xmlns:a14="http://schemas.microsoft.com/office/drawing/2010/main" val="0"/>
+              </a:ext>
+            </a:extLst>
+          </a:blip>
+          <a:stretch>
+            <a:fillRect/>
+          </a:stretch>
+        </p:blipFill>
+        <p:spPr>
+          <a:xfrm>
+            <a:off x="1962150" y="261937"/>
+            <a:ext cx="8267700" cy="6334125"/>
+          </a:xfrm>
+          <a:prstGeom prst="rect">
+            <a:avLst/>
+          </a:prstGeom>
+        </p:spPr>
+      </p:pic>
+      <p:pic>
+        <p:nvPicPr>
+          <p:cNvPr id="5" name="Image 4"/>
+          <p:cNvPicPr>
+            <a:picLocks noChangeAspect="1"/>
+          </p:cNvPicPr>
+          <p:nvPr/>
+        </p:nvPicPr>
+        <p:blipFill>
+          <a:blip r:embed="rId3">
+            <a:extLst>
+              <a:ext uri="{28A0092B-C50C-407E-A947-70E740481C1C}">
+                <a14:useLocalDpi xmlns:a14="http://schemas.microsoft.com/office/drawing/2010/main" val="0"/>
+              </a:ext>
+            </a:extLst>
+          </a:blip>
+          <a:stretch>
+            <a:fillRect/>
+          </a:stretch>
+        </p:blipFill>
+        <p:spPr>
+          <a:xfrm>
+            <a:off x="3254744" y="0"/>
+            <a:ext cx="5682512" cy="6858000"/>
+          </a:xfrm>
+          <a:prstGeom prst="rect">
+            <a:avLst/>
+          </a:prstGeom>
+        </p:spPr>
+      </p:pic>
+      <p:pic>
+        <p:nvPicPr>
+          <p:cNvPr id="6" name="Image 5"/>
+          <p:cNvPicPr>
+            <a:picLocks noChangeAspect="1"/>
+          </p:cNvPicPr>
+          <p:nvPr/>
+        </p:nvPicPr>
+        <p:blipFill rotWithShape="1">
+          <a:blip r:embed="rId4">
+            <a:extLst>
+              <a:ext uri="{28A0092B-C50C-407E-A947-70E740481C1C}">
+                <a14:useLocalDpi xmlns:a14="http://schemas.microsoft.com/office/drawing/2010/main" val="0"/>
+              </a:ext>
+            </a:extLst>
+          </a:blip>
+          <a:srcRect l="17049"/>
+          <a:stretch/>
+        </p:blipFill>
+        <p:spPr>
+          <a:xfrm>
+            <a:off x="2643187" y="0"/>
+            <a:ext cx="6897118" cy="6858000"/>
+          </a:xfrm>
+          <a:prstGeom prst="rect">
+            <a:avLst/>
+          </a:prstGeom>
+        </p:spPr>
+      </p:pic>
+      <p:pic>
+        <p:nvPicPr>
+          <p:cNvPr id="7" name="Image 6"/>
+          <p:cNvPicPr>
+            <a:picLocks noChangeAspect="1"/>
+          </p:cNvPicPr>
+          <p:nvPr/>
+        </p:nvPicPr>
+        <p:blipFill>
+          <a:blip r:embed="rId5">
+            <a:extLst>
+              <a:ext uri="{28A0092B-C50C-407E-A947-70E740481C1C}">
+                <a14:useLocalDpi xmlns:a14="http://schemas.microsoft.com/office/drawing/2010/main" val="0"/>
+              </a:ext>
+            </a:extLst>
+          </a:blip>
+          <a:stretch>
+            <a:fillRect/>
+          </a:stretch>
+        </p:blipFill>
+        <p:spPr>
+          <a:xfrm>
+            <a:off x="2643187" y="109537"/>
+            <a:ext cx="6905625" cy="6638925"/>
+          </a:xfrm>
+          <a:prstGeom prst="rect">
+            <a:avLst/>
+          </a:prstGeom>
+        </p:spPr>
+      </p:pic>
+      <p:pic>
+        <p:nvPicPr>
+          <p:cNvPr id="8" name="Image 7"/>
+          <p:cNvPicPr>
+            <a:picLocks noChangeAspect="1"/>
+          </p:cNvPicPr>
+          <p:nvPr/>
+        </p:nvPicPr>
+        <p:blipFill>
+          <a:blip r:embed="rId6">
+            <a:extLst>
+              <a:ext uri="{28A0092B-C50C-407E-A947-70E740481C1C}">
+                <a14:useLocalDpi xmlns:a14="http://schemas.microsoft.com/office/drawing/2010/main" val="0"/>
+              </a:ext>
+            </a:extLst>
+          </a:blip>
+          <a:stretch>
+            <a:fillRect/>
+          </a:stretch>
+        </p:blipFill>
+        <p:spPr>
+          <a:xfrm>
+            <a:off x="2778060" y="0"/>
+            <a:ext cx="6635879" cy="6858000"/>
+          </a:xfrm>
+          <a:prstGeom prst="rect">
+            <a:avLst/>
+          </a:prstGeom>
+        </p:spPr>
+      </p:pic>
+    </p:spTree>
+    <p:extLst>
+      <p:ext uri="{BB962C8B-B14F-4D97-AF65-F5344CB8AC3E}">
+        <p14:creationId xmlns:p14="http://schemas.microsoft.com/office/powerpoint/2010/main" val="554413720"/>
+      </p:ext>
+    </p:extLst>
+  </p:cSld>
+  <p:clrMapOvr>
+    <a:masterClrMapping/>
+  </p:clrMapOvr>
+  <p:timing>
+    <p:tnLst>
+      <p:par>
+        <p:cTn id="1" dur="indefinite" restart="never" nodeType="tmRoot">
+          <p:childTnLst>
+            <p:seq concurrent="1" nextAc="seek">
+              <p:cTn id="2" dur="indefinite" nodeType="mainSeq">
+                <p:childTnLst>
+                  <p:par>
+                    <p:cTn id="3" fill="hold">
+                      <p:stCondLst>
+                        <p:cond delay="indefinite"/>
+                      </p:stCondLst>
+                      <p:childTnLst>
+                        <p:par>
+                          <p:cTn id="4" fill="hold">
+                            <p:stCondLst>
+                              <p:cond delay="0"/>
+                            </p:stCondLst>
+                            <p:childTnLst>
+                              <p:par>
+                                <p:cTn id="5" presetID="1" presetClass="exit" presetSubtype="0" fill="hold" grpId="0" nodeType="clickEffect">
+                                  <p:stCondLst>
+                                    <p:cond delay="0"/>
+                                  </p:stCondLst>
+                                  <p:childTnLst>
+                                    <p:set>
+                                      <p:cBhvr>
+                                        <p:cTn id="6" dur="1" fill="hold">
+                                          <p:stCondLst>
+                                            <p:cond delay="0"/>
+                                          </p:stCondLst>
+                                        </p:cTn>
+                                        <p:tgtEl>
+                                          <p:spTgt spid="2"/>
+                                        </p:tgtEl>
+                                        <p:attrNameLst>
+                                          <p:attrName>style.visibility</p:attrName>
+                                        </p:attrNameLst>
+                                      </p:cBhvr>
+                                      <p:to>
+                                        <p:strVal val="hidden"/>
+                                      </p:to>
+                                    </p:set>
+                                  </p:childTnLst>
+                                </p:cTn>
+                              </p:par>
+                            </p:childTnLst>
+                          </p:cTn>
+                        </p:par>
+                        <p:par>
+                          <p:cTn id="7" fill="hold">
+                            <p:stCondLst>
+                              <p:cond delay="0"/>
+                            </p:stCondLst>
+                            <p:childTnLst>
+                              <p:par>
+                                <p:cTn id="8" presetID="1" presetClass="entr" presetSubtype="0" fill="hold" nodeType="afterEffect">
+                                  <p:stCondLst>
+                                    <p:cond delay="0"/>
+                                  </p:stCondLst>
+                                  <p:childTnLst>
+                                    <p:set>
+                                      <p:cBhvr>
+                                        <p:cTn id="9" dur="1" fill="hold">
+                                          <p:stCondLst>
+                                            <p:cond delay="0"/>
+                                          </p:stCondLst>
+                                        </p:cTn>
+                                        <p:tgtEl>
+                                          <p:spTgt spid="4"/>
+                                        </p:tgtEl>
+                                        <p:attrNameLst>
+                                          <p:attrName>style.visibility</p:attrName>
+                                        </p:attrNameLst>
+                                      </p:cBhvr>
+                                      <p:to>
+                                        <p:strVal val="visible"/>
+                                      </p:to>
+                                    </p:set>
+                                  </p:childTnLst>
+                                </p:cTn>
+                              </p:par>
+                            </p:childTnLst>
+                          </p:cTn>
+                        </p:par>
+                      </p:childTnLst>
+                    </p:cTn>
+                  </p:par>
+                  <p:par>
+                    <p:cTn id="10" fill="hold">
+                      <p:stCondLst>
+                        <p:cond delay="indefinite"/>
+                      </p:stCondLst>
+                      <p:childTnLst>
+                        <p:par>
+                          <p:cTn id="11" fill="hold">
+                            <p:stCondLst>
+                              <p:cond delay="0"/>
+                            </p:stCondLst>
+                            <p:childTnLst>
+                              <p:par>
+                                <p:cTn id="12" presetID="1" presetClass="exit" presetSubtype="0" fill="hold" nodeType="clickEffect">
+                                  <p:stCondLst>
+                                    <p:cond delay="0"/>
+                                  </p:stCondLst>
+                                  <p:childTnLst>
+                                    <p:set>
+                                      <p:cBhvr>
+                                        <p:cTn id="13" dur="1" fill="hold">
+                                          <p:stCondLst>
+                                            <p:cond delay="0"/>
+                                          </p:stCondLst>
+                                        </p:cTn>
+                                        <p:tgtEl>
+                                          <p:spTgt spid="4"/>
+                                        </p:tgtEl>
+                                        <p:attrNameLst>
+                                          <p:attrName>style.visibility</p:attrName>
+                                        </p:attrNameLst>
+                                      </p:cBhvr>
+                                      <p:to>
+                                        <p:strVal val="hidden"/>
+                                      </p:to>
+                                    </p:set>
+                                  </p:childTnLst>
+                                </p:cTn>
+                              </p:par>
+                            </p:childTnLst>
+                          </p:cTn>
+                        </p:par>
+                        <p:par>
+                          <p:cTn id="14" fill="hold">
+                            <p:stCondLst>
+                              <p:cond delay="0"/>
+                            </p:stCondLst>
+                            <p:childTnLst>
+                              <p:par>
+                                <p:cTn id="15" presetID="1" presetClass="entr" presetSubtype="0" fill="hold" nodeType="afterEffect">
+                                  <p:stCondLst>
+                                    <p:cond delay="0"/>
+                                  </p:stCondLst>
+                                  <p:childTnLst>
+                                    <p:set>
+                                      <p:cBhvr>
+                                        <p:cTn id="16" dur="1" fill="hold">
+                                          <p:stCondLst>
+                                            <p:cond delay="0"/>
+                                          </p:stCondLst>
+                                        </p:cTn>
+                                        <p:tgtEl>
+                                          <p:spTgt spid="5"/>
+                                        </p:tgtEl>
+                                        <p:attrNameLst>
+                                          <p:attrName>style.visibility</p:attrName>
+                                        </p:attrNameLst>
+                                      </p:cBhvr>
+                                      <p:to>
+                                        <p:strVal val="visible"/>
+                                      </p:to>
+                                    </p:set>
+                                  </p:childTnLst>
+                                </p:cTn>
+                              </p:par>
+                            </p:childTnLst>
+                          </p:cTn>
+                        </p:par>
+                      </p:childTnLst>
+                    </p:cTn>
+                  </p:par>
+                  <p:par>
+                    <p:cTn id="17" fill="hold">
+                      <p:stCondLst>
+                        <p:cond delay="indefinite"/>
+                      </p:stCondLst>
+                      <p:childTnLst>
+                        <p:par>
+                          <p:cTn id="18" fill="hold">
+                            <p:stCondLst>
+                              <p:cond delay="0"/>
+                            </p:stCondLst>
+                            <p:childTnLst>
+                              <p:par>
+                                <p:cTn id="19" presetID="1" presetClass="exit" presetSubtype="0" fill="hold" nodeType="clickEffect">
+                                  <p:stCondLst>
+                                    <p:cond delay="0"/>
+                                  </p:stCondLst>
+                                  <p:childTnLst>
+                                    <p:set>
+                                      <p:cBhvr>
+                                        <p:cTn id="20" dur="1" fill="hold">
+                                          <p:stCondLst>
+                                            <p:cond delay="0"/>
+                                          </p:stCondLst>
+                                        </p:cTn>
+                                        <p:tgtEl>
+                                          <p:spTgt spid="5"/>
+                                        </p:tgtEl>
+                                        <p:attrNameLst>
+                                          <p:attrName>style.visibility</p:attrName>
+                                        </p:attrNameLst>
+                                      </p:cBhvr>
+                                      <p:to>
+                                        <p:strVal val="hidden"/>
+                                      </p:to>
+                                    </p:set>
+                                  </p:childTnLst>
+                                </p:cTn>
+                              </p:par>
+                            </p:childTnLst>
+                          </p:cTn>
+                        </p:par>
+                        <p:par>
+                          <p:cTn id="21" fill="hold">
+                            <p:stCondLst>
+                              <p:cond delay="0"/>
+                            </p:stCondLst>
+                            <p:childTnLst>
+                              <p:par>
+                                <p:cTn id="22" presetID="1" presetClass="entr" presetSubtype="0" fill="hold" nodeType="afterEffect">
+                                  <p:stCondLst>
+                                    <p:cond delay="0"/>
+                                  </p:stCondLst>
+                                  <p:childTnLst>
+                                    <p:set>
+                                      <p:cBhvr>
+                                        <p:cTn id="23" dur="1" fill="hold">
+                                          <p:stCondLst>
+                                            <p:cond delay="0"/>
+                                          </p:stCondLst>
+                                        </p:cTn>
+                                        <p:tgtEl>
+                                          <p:spTgt spid="6"/>
+                                        </p:tgtEl>
+                                        <p:attrNameLst>
+                                          <p:attrName>style.visibility</p:attrName>
+                                        </p:attrNameLst>
+                                      </p:cBhvr>
+                                      <p:to>
+                                        <p:strVal val="visible"/>
+                                      </p:to>
+                                    </p:set>
+                                  </p:childTnLst>
+                                </p:cTn>
+                              </p:par>
+                            </p:childTnLst>
+                          </p:cTn>
+                        </p:par>
+                      </p:childTnLst>
+                    </p:cTn>
+                  </p:par>
+                  <p:par>
+                    <p:cTn id="24" fill="hold">
+                      <p:stCondLst>
+                        <p:cond delay="indefinite"/>
+                      </p:stCondLst>
+                      <p:childTnLst>
+                        <p:par>
+                          <p:cTn id="25" fill="hold">
+                            <p:stCondLst>
+                              <p:cond delay="0"/>
+                            </p:stCondLst>
+                            <p:childTnLst>
+                              <p:par>
+                                <p:cTn id="26" presetID="1" presetClass="exit" presetSubtype="0" fill="hold" nodeType="clickEffect">
+                                  <p:stCondLst>
+                                    <p:cond delay="0"/>
+                                  </p:stCondLst>
+                                  <p:childTnLst>
+                                    <p:set>
+                                      <p:cBhvr>
+                                        <p:cTn id="27" dur="1" fill="hold">
+                                          <p:stCondLst>
+                                            <p:cond delay="0"/>
+                                          </p:stCondLst>
+                                        </p:cTn>
+                                        <p:tgtEl>
+                                          <p:spTgt spid="6"/>
+                                        </p:tgtEl>
+                                        <p:attrNameLst>
+                                          <p:attrName>style.visibility</p:attrName>
+                                        </p:attrNameLst>
+                                      </p:cBhvr>
+                                      <p:to>
+                                        <p:strVal val="hidden"/>
+                                      </p:to>
+                                    </p:set>
+                                  </p:childTnLst>
+                                </p:cTn>
+                              </p:par>
+                            </p:childTnLst>
+                          </p:cTn>
+                        </p:par>
+                        <p:par>
+                          <p:cTn id="28" fill="hold">
+                            <p:stCondLst>
+                              <p:cond delay="0"/>
+                            </p:stCondLst>
+                            <p:childTnLst>
+                              <p:par>
+                                <p:cTn id="29" presetID="1" presetClass="entr" presetSubtype="0" fill="hold" nodeType="afterEffect">
+                                  <p:stCondLst>
+                                    <p:cond delay="0"/>
+                                  </p:stCondLst>
+                                  <p:childTnLst>
+                                    <p:set>
+                                      <p:cBhvr>
+                                        <p:cTn id="30" dur="1" fill="hold">
+                                          <p:stCondLst>
+                                            <p:cond delay="0"/>
+                                          </p:stCondLst>
+                                        </p:cTn>
+                                        <p:tgtEl>
+                                          <p:spTgt spid="7"/>
+                                        </p:tgtEl>
+                                        <p:attrNameLst>
+                                          <p:attrName>style.visibility</p:attrName>
+                                        </p:attrNameLst>
+                                      </p:cBhvr>
+                                      <p:to>
+                                        <p:strVal val="visible"/>
+                                      </p:to>
+                                    </p:set>
+                                  </p:childTnLst>
+                                </p:cTn>
+                              </p:par>
+                            </p:childTnLst>
+                          </p:cTn>
+                        </p:par>
+                      </p:childTnLst>
+                    </p:cTn>
+                  </p:par>
+                  <p:par>
+                    <p:cTn id="31" fill="hold">
+                      <p:stCondLst>
+                        <p:cond delay="indefinite"/>
+                      </p:stCondLst>
+                      <p:childTnLst>
+                        <p:par>
+                          <p:cTn id="32" fill="hold">
+                            <p:stCondLst>
+                              <p:cond delay="0"/>
+                            </p:stCondLst>
+                            <p:childTnLst>
+                              <p:par>
+                                <p:cTn id="33" presetID="1" presetClass="exit" presetSubtype="0" fill="hold" nodeType="clickEffect">
+                                  <p:stCondLst>
+                                    <p:cond delay="0"/>
+                                  </p:stCondLst>
+                                  <p:childTnLst>
+                                    <p:set>
+                                      <p:cBhvr>
+                                        <p:cTn id="34" dur="1" fill="hold">
+                                          <p:stCondLst>
+                                            <p:cond delay="0"/>
+                                          </p:stCondLst>
+                                        </p:cTn>
+                                        <p:tgtEl>
+                                          <p:spTgt spid="7"/>
+                                        </p:tgtEl>
+                                        <p:attrNameLst>
+                                          <p:attrName>style.visibility</p:attrName>
+                                        </p:attrNameLst>
+                                      </p:cBhvr>
+                                      <p:to>
+                                        <p:strVal val="hidden"/>
+                                      </p:to>
+                                    </p:set>
+                                  </p:childTnLst>
+                                </p:cTn>
+                              </p:par>
+                            </p:childTnLst>
+                          </p:cTn>
+                        </p:par>
+                        <p:par>
+                          <p:cTn id="35" fill="hold">
+                            <p:stCondLst>
+                              <p:cond delay="0"/>
+                            </p:stCondLst>
+                            <p:childTnLst>
+                              <p:par>
+                                <p:cTn id="36" presetID="1" presetClass="entr" presetSubtype="0" fill="hold" nodeType="afterEffect">
+                                  <p:stCondLst>
+                                    <p:cond delay="0"/>
+                                  </p:stCondLst>
+                                  <p:childTnLst>
+                                    <p:set>
+                                      <p:cBhvr>
+                                        <p:cTn id="37" dur="1" fill="hold">
+                                          <p:stCondLst>
+                                            <p:cond delay="0"/>
+                                          </p:stCondLst>
+                                        </p:cTn>
+                                        <p:tgtEl>
+                                          <p:spTgt spid="8"/>
+                                        </p:tgtEl>
+                                        <p:attrNameLst>
+                                          <p:attrName>style.visibility</p:attrName>
+                                        </p:attrNameLst>
+                                      </p:cBhvr>
+                                      <p:to>
+                                        <p:strVal val="visible"/>
+                                      </p:to>
+                                    </p:set>
+                                  </p:childTnLst>
+                                </p:cTn>
+                              </p:par>
+                            </p:childTnLst>
+                          </p:cTn>
+                        </p:par>
+                      </p:childTnLst>
+                    </p:cTn>
+                  </p:par>
+                </p:childTnLst>
+              </p:cTn>
+              <p:prevCondLst>
+                <p:cond evt="onPrev" delay="0">
+                  <p:tgtEl>
+                    <p:sldTgt/>
+                  </p:tgtEl>
+                </p:cond>
+              </p:prevCondLst>
+              <p:nextCondLst>
+                <p:cond evt="onNext" delay="0">
+                  <p:tgtEl>
+                    <p:sldTgt/>
+                  </p:tgtEl>
+                </p:cond>
+              </p:nextCondLst>
+            </p:seq>
+          </p:childTnLst>
+        </p:cTn>
+      </p:par>
+    </p:tnLst>
+    <p:bldLst>
+      <p:bldP spid="2" grpId="0"/>
+    </p:bldLst>
+  </p:timing>
+</p:sld>
+</file>
+
 <file path=ppt/theme/theme1.xml><?xml version="1.0" encoding="utf-8"?>
 <a:theme xmlns:a="http://schemas.openxmlformats.org/drawingml/2006/main" name="Circuit">
   <a:themeElements>

</xml_diff>

<commit_message>
Mise à jour de la présentation -> userstories
</commit_message>
<xml_diff>
--- a/Présentation.pptx
+++ b/Présentation.pptx
@@ -9,6 +9,7 @@
     <p:sldId id="257" r:id="rId3"/>
     <p:sldId id="258" r:id="rId4"/>
     <p:sldId id="259" r:id="rId5"/>
+    <p:sldId id="260" r:id="rId6"/>
   </p:sldIdLst>
   <p:sldSz cx="12192000" cy="6858000"/>
   <p:notesSz cx="6858000" cy="9144000"/>
@@ -165,7 +166,7 @@
           <a:noFill/>
           <a:extLst>
             <a:ext uri="{909E8E84-426E-40dd-AFC4-6F175D3DCCD1}">
-              <a14:hiddenFill xmlns="" xmlns:a14="http://schemas.microsoft.com/office/drawing/2010/main">
+              <a14:hiddenFill xmlns:a14="http://schemas.microsoft.com/office/drawing/2010/main" xmlns="">
                 <a:solidFill>
                   <a:srgbClr val="FFFFFF"/>
                 </a:solidFill>
@@ -225,7 +226,7 @@
             </a:ln>
             <a:extLst>
               <a:ext uri="{91240B29-F687-4f45-9708-019B960494DF}">
-                <a14:hiddenLine xmlns="" xmlns:a14="http://schemas.microsoft.com/office/drawing/2010/main" w="9525">
+                <a14:hiddenLine xmlns:a14="http://schemas.microsoft.com/office/drawing/2010/main" xmlns="" w="9525">
                   <a:solidFill>
                     <a:srgbClr val="000000"/>
                   </a:solidFill>
@@ -315,7 +316,7 @@
             </a:ln>
             <a:extLst>
               <a:ext uri="{91240B29-F687-4f45-9708-019B960494DF}">
-                <a14:hiddenLine xmlns="" xmlns:a14="http://schemas.microsoft.com/office/drawing/2010/main" w="9525">
+                <a14:hiddenLine xmlns:a14="http://schemas.microsoft.com/office/drawing/2010/main" xmlns="" w="9525">
                   <a:solidFill>
                     <a:srgbClr val="000000"/>
                   </a:solidFill>
@@ -405,7 +406,7 @@
             </a:ln>
             <a:extLst>
               <a:ext uri="{91240B29-F687-4f45-9708-019B960494DF}">
-                <a14:hiddenLine xmlns="" xmlns:a14="http://schemas.microsoft.com/office/drawing/2010/main" w="9525">
+                <a14:hiddenLine xmlns:a14="http://schemas.microsoft.com/office/drawing/2010/main" xmlns="" w="9525">
                   <a:solidFill>
                     <a:srgbClr val="000000"/>
                   </a:solidFill>
@@ -439,7 +440,7 @@
             </a:ln>
             <a:extLst>
               <a:ext uri="{91240B29-F687-4f45-9708-019B960494DF}">
-                <a14:hiddenLine xmlns="" xmlns:a14="http://schemas.microsoft.com/office/drawing/2010/main" w="9525">
+                <a14:hiddenLine xmlns:a14="http://schemas.microsoft.com/office/drawing/2010/main" xmlns="" w="9525">
                   <a:solidFill>
                     <a:srgbClr val="000000"/>
                   </a:solidFill>
@@ -529,7 +530,7 @@
             </a:ln>
             <a:extLst>
               <a:ext uri="{91240B29-F687-4f45-9708-019B960494DF}">
-                <a14:hiddenLine xmlns="" xmlns:a14="http://schemas.microsoft.com/office/drawing/2010/main" w="9525">
+                <a14:hiddenLine xmlns:a14="http://schemas.microsoft.com/office/drawing/2010/main" xmlns="" w="9525">
                   <a:solidFill>
                     <a:srgbClr val="000000"/>
                   </a:solidFill>
@@ -591,7 +592,7 @@
             </a:ln>
             <a:extLst>
               <a:ext uri="{91240B29-F687-4f45-9708-019B960494DF}">
-                <a14:hiddenLine xmlns="" xmlns:a14="http://schemas.microsoft.com/office/drawing/2010/main" w="9525">
+                <a14:hiddenLine xmlns:a14="http://schemas.microsoft.com/office/drawing/2010/main" xmlns="" w="9525">
                   <a:solidFill>
                     <a:srgbClr val="000000"/>
                   </a:solidFill>
@@ -653,7 +654,7 @@
             </a:ln>
             <a:extLst>
               <a:ext uri="{91240B29-F687-4f45-9708-019B960494DF}">
-                <a14:hiddenLine xmlns="" xmlns:a14="http://schemas.microsoft.com/office/drawing/2010/main" w="9525">
+                <a14:hiddenLine xmlns:a14="http://schemas.microsoft.com/office/drawing/2010/main" xmlns="" w="9525">
                   <a:solidFill>
                     <a:srgbClr val="000000"/>
                   </a:solidFill>
@@ -743,7 +744,7 @@
             </a:ln>
             <a:extLst>
               <a:ext uri="{91240B29-F687-4f45-9708-019B960494DF}">
-                <a14:hiddenLine xmlns="" xmlns:a14="http://schemas.microsoft.com/office/drawing/2010/main" w="9525">
+                <a14:hiddenLine xmlns:a14="http://schemas.microsoft.com/office/drawing/2010/main" xmlns="" w="9525">
                   <a:solidFill>
                     <a:srgbClr val="000000"/>
                   </a:solidFill>
@@ -805,7 +806,7 @@
             </a:ln>
             <a:extLst>
               <a:ext uri="{91240B29-F687-4f45-9708-019B960494DF}">
-                <a14:hiddenLine xmlns="" xmlns:a14="http://schemas.microsoft.com/office/drawing/2010/main" w="9525">
+                <a14:hiddenLine xmlns:a14="http://schemas.microsoft.com/office/drawing/2010/main" xmlns="" w="9525">
                   <a:solidFill>
                     <a:srgbClr val="000000"/>
                   </a:solidFill>
@@ -867,7 +868,7 @@
             </a:ln>
             <a:extLst>
               <a:ext uri="{91240B29-F687-4f45-9708-019B960494DF}">
-                <a14:hiddenLine xmlns="" xmlns:a14="http://schemas.microsoft.com/office/drawing/2010/main" w="9525">
+                <a14:hiddenLine xmlns:a14="http://schemas.microsoft.com/office/drawing/2010/main" xmlns="" w="9525">
                   <a:solidFill>
                     <a:srgbClr val="000000"/>
                   </a:solidFill>
@@ -957,7 +958,7 @@
             </a:ln>
             <a:extLst>
               <a:ext uri="{91240B29-F687-4f45-9708-019B960494DF}">
-                <a14:hiddenLine xmlns="" xmlns:a14="http://schemas.microsoft.com/office/drawing/2010/main" w="9525">
+                <a14:hiddenLine xmlns:a14="http://schemas.microsoft.com/office/drawing/2010/main" xmlns="" w="9525">
                   <a:solidFill>
                     <a:srgbClr val="000000"/>
                   </a:solidFill>
@@ -1047,7 +1048,7 @@
             </a:ln>
             <a:extLst>
               <a:ext uri="{91240B29-F687-4f45-9708-019B960494DF}">
-                <a14:hiddenLine xmlns="" xmlns:a14="http://schemas.microsoft.com/office/drawing/2010/main" w="9525">
+                <a14:hiddenLine xmlns:a14="http://schemas.microsoft.com/office/drawing/2010/main" xmlns="" w="9525">
                   <a:solidFill>
                     <a:srgbClr val="000000"/>
                   </a:solidFill>
@@ -1109,7 +1110,7 @@
             </a:ln>
             <a:extLst>
               <a:ext uri="{91240B29-F687-4f45-9708-019B960494DF}">
-                <a14:hiddenLine xmlns="" xmlns:a14="http://schemas.microsoft.com/office/drawing/2010/main" w="9525">
+                <a14:hiddenLine xmlns:a14="http://schemas.microsoft.com/office/drawing/2010/main" xmlns="" w="9525">
                   <a:solidFill>
                     <a:srgbClr val="000000"/>
                   </a:solidFill>
@@ -1219,7 +1220,7 @@
             </a:ln>
             <a:extLst>
               <a:ext uri="{91240B29-F687-4f45-9708-019B960494DF}">
-                <a14:hiddenLine xmlns="" xmlns:a14="http://schemas.microsoft.com/office/drawing/2010/main" w="9525">
+                <a14:hiddenLine xmlns:a14="http://schemas.microsoft.com/office/drawing/2010/main" xmlns="" w="9525">
                   <a:solidFill>
                     <a:srgbClr val="000000"/>
                   </a:solidFill>
@@ -1281,7 +1282,7 @@
             </a:ln>
             <a:extLst>
               <a:ext uri="{91240B29-F687-4f45-9708-019B960494DF}">
-                <a14:hiddenLine xmlns="" xmlns:a14="http://schemas.microsoft.com/office/drawing/2010/main" w="9525">
+                <a14:hiddenLine xmlns:a14="http://schemas.microsoft.com/office/drawing/2010/main" xmlns="" w="9525">
                   <a:solidFill>
                     <a:srgbClr val="000000"/>
                   </a:solidFill>
@@ -1371,7 +1372,7 @@
             </a:ln>
             <a:extLst>
               <a:ext uri="{91240B29-F687-4f45-9708-019B960494DF}">
-                <a14:hiddenLine xmlns="" xmlns:a14="http://schemas.microsoft.com/office/drawing/2010/main" w="9525">
+                <a14:hiddenLine xmlns:a14="http://schemas.microsoft.com/office/drawing/2010/main" xmlns="" w="9525">
                   <a:solidFill>
                     <a:srgbClr val="000000"/>
                   </a:solidFill>
@@ -1461,7 +1462,7 @@
             </a:ln>
             <a:extLst>
               <a:ext uri="{91240B29-F687-4f45-9708-019B960494DF}">
-                <a14:hiddenLine xmlns="" xmlns:a14="http://schemas.microsoft.com/office/drawing/2010/main" w="9525">
+                <a14:hiddenLine xmlns:a14="http://schemas.microsoft.com/office/drawing/2010/main" xmlns="" w="9525">
                   <a:solidFill>
                     <a:srgbClr val="000000"/>
                   </a:solidFill>
@@ -1523,7 +1524,7 @@
             </a:ln>
             <a:extLst>
               <a:ext uri="{91240B29-F687-4f45-9708-019B960494DF}">
-                <a14:hiddenLine xmlns="" xmlns:a14="http://schemas.microsoft.com/office/drawing/2010/main" w="9525">
+                <a14:hiddenLine xmlns:a14="http://schemas.microsoft.com/office/drawing/2010/main" xmlns="" w="9525">
                   <a:solidFill>
                     <a:srgbClr val="000000"/>
                   </a:solidFill>
@@ -1613,7 +1614,7 @@
             </a:ln>
             <a:extLst>
               <a:ext uri="{91240B29-F687-4f45-9708-019B960494DF}">
-                <a14:hiddenLine xmlns="" xmlns:a14="http://schemas.microsoft.com/office/drawing/2010/main" w="9525">
+                <a14:hiddenLine xmlns:a14="http://schemas.microsoft.com/office/drawing/2010/main" xmlns="" w="9525">
                   <a:solidFill>
                     <a:srgbClr val="000000"/>
                   </a:solidFill>
@@ -1703,7 +1704,7 @@
             </a:ln>
             <a:extLst>
               <a:ext uri="{91240B29-F687-4f45-9708-019B960494DF}">
-                <a14:hiddenLine xmlns="" xmlns:a14="http://schemas.microsoft.com/office/drawing/2010/main" w="9525">
+                <a14:hiddenLine xmlns:a14="http://schemas.microsoft.com/office/drawing/2010/main" xmlns="" w="9525">
                   <a:solidFill>
                     <a:srgbClr val="000000"/>
                   </a:solidFill>
@@ -1759,7 +1760,7 @@
             </a:ln>
             <a:extLst>
               <a:ext uri="{91240B29-F687-4f45-9708-019B960494DF}">
-                <a14:hiddenLine xmlns="" xmlns:a14="http://schemas.microsoft.com/office/drawing/2010/main" w="9525">
+                <a14:hiddenLine xmlns:a14="http://schemas.microsoft.com/office/drawing/2010/main" xmlns="" w="9525">
                   <a:solidFill>
                     <a:srgbClr val="000000"/>
                   </a:solidFill>
@@ -1849,7 +1850,7 @@
             </a:ln>
             <a:extLst>
               <a:ext uri="{91240B29-F687-4f45-9708-019B960494DF}">
-                <a14:hiddenLine xmlns="" xmlns:a14="http://schemas.microsoft.com/office/drawing/2010/main" w="9525">
+                <a14:hiddenLine xmlns:a14="http://schemas.microsoft.com/office/drawing/2010/main" xmlns="" w="9525">
                   <a:solidFill>
                     <a:srgbClr val="000000"/>
                   </a:solidFill>
@@ -1905,7 +1906,7 @@
             </a:ln>
             <a:extLst>
               <a:ext uri="{91240B29-F687-4f45-9708-019B960494DF}">
-                <a14:hiddenLine xmlns="" xmlns:a14="http://schemas.microsoft.com/office/drawing/2010/main" w="9525">
+                <a14:hiddenLine xmlns:a14="http://schemas.microsoft.com/office/drawing/2010/main" xmlns="" w="9525">
                   <a:solidFill>
                     <a:srgbClr val="000000"/>
                   </a:solidFill>
@@ -1995,7 +1996,7 @@
             </a:ln>
             <a:extLst>
               <a:ext uri="{91240B29-F687-4f45-9708-019B960494DF}">
-                <a14:hiddenLine xmlns="" xmlns:a14="http://schemas.microsoft.com/office/drawing/2010/main" w="9525">
+                <a14:hiddenLine xmlns:a14="http://schemas.microsoft.com/office/drawing/2010/main" xmlns="" w="9525">
                   <a:solidFill>
                     <a:srgbClr val="000000"/>
                   </a:solidFill>
@@ -2063,7 +2064,7 @@
             </a:ln>
             <a:extLst>
               <a:ext uri="{91240B29-F687-4f45-9708-019B960494DF}">
-                <a14:hiddenLine xmlns="" xmlns:a14="http://schemas.microsoft.com/office/drawing/2010/main" w="9525">
+                <a14:hiddenLine xmlns:a14="http://schemas.microsoft.com/office/drawing/2010/main" xmlns="" w="9525">
                   <a:solidFill>
                     <a:srgbClr val="000000"/>
                   </a:solidFill>
@@ -2153,7 +2154,7 @@
             </a:ln>
             <a:extLst>
               <a:ext uri="{91240B29-F687-4f45-9708-019B960494DF}">
-                <a14:hiddenLine xmlns="" xmlns:a14="http://schemas.microsoft.com/office/drawing/2010/main" w="9525">
+                <a14:hiddenLine xmlns:a14="http://schemas.microsoft.com/office/drawing/2010/main" xmlns="" w="9525">
                   <a:solidFill>
                     <a:srgbClr val="000000"/>
                   </a:solidFill>
@@ -2221,7 +2222,7 @@
             </a:ln>
             <a:extLst>
               <a:ext uri="{91240B29-F687-4f45-9708-019B960494DF}">
-                <a14:hiddenLine xmlns="" xmlns:a14="http://schemas.microsoft.com/office/drawing/2010/main" w="9525">
+                <a14:hiddenLine xmlns:a14="http://schemas.microsoft.com/office/drawing/2010/main" xmlns="" w="9525">
                   <a:solidFill>
                     <a:srgbClr val="000000"/>
                   </a:solidFill>
@@ -2311,7 +2312,7 @@
             </a:ln>
             <a:extLst>
               <a:ext uri="{91240B29-F687-4f45-9708-019B960494DF}">
-                <a14:hiddenLine xmlns="" xmlns:a14="http://schemas.microsoft.com/office/drawing/2010/main" w="9525">
+                <a14:hiddenLine xmlns:a14="http://schemas.microsoft.com/office/drawing/2010/main" xmlns="" w="9525">
                   <a:solidFill>
                     <a:srgbClr val="000000"/>
                   </a:solidFill>
@@ -2345,7 +2346,7 @@
             </a:ln>
             <a:extLst>
               <a:ext uri="{91240B29-F687-4f45-9708-019B960494DF}">
-                <a14:hiddenLine xmlns="" xmlns:a14="http://schemas.microsoft.com/office/drawing/2010/main" w="9525">
+                <a14:hiddenLine xmlns:a14="http://schemas.microsoft.com/office/drawing/2010/main" xmlns="" w="9525">
                   <a:solidFill>
                     <a:srgbClr val="000000"/>
                   </a:solidFill>
@@ -2435,7 +2436,7 @@
             </a:ln>
             <a:extLst>
               <a:ext uri="{91240B29-F687-4f45-9708-019B960494DF}">
-                <a14:hiddenLine xmlns="" xmlns:a14="http://schemas.microsoft.com/office/drawing/2010/main" w="9525">
+                <a14:hiddenLine xmlns:a14="http://schemas.microsoft.com/office/drawing/2010/main" xmlns="" w="9525">
                   <a:solidFill>
                     <a:srgbClr val="000000"/>
                   </a:solidFill>
@@ -2497,7 +2498,7 @@
             </a:ln>
             <a:extLst>
               <a:ext uri="{91240B29-F687-4f45-9708-019B960494DF}">
-                <a14:hiddenLine xmlns="" xmlns:a14="http://schemas.microsoft.com/office/drawing/2010/main" w="9525">
+                <a14:hiddenLine xmlns:a14="http://schemas.microsoft.com/office/drawing/2010/main" xmlns="" w="9525">
                   <a:solidFill>
                     <a:srgbClr val="000000"/>
                   </a:solidFill>
@@ -2559,7 +2560,7 @@
             </a:ln>
             <a:extLst>
               <a:ext uri="{91240B29-F687-4f45-9708-019B960494DF}">
-                <a14:hiddenLine xmlns="" xmlns:a14="http://schemas.microsoft.com/office/drawing/2010/main" w="9525">
+                <a14:hiddenLine xmlns:a14="http://schemas.microsoft.com/office/drawing/2010/main" xmlns="" w="9525">
                   <a:solidFill>
                     <a:srgbClr val="000000"/>
                   </a:solidFill>
@@ -2649,7 +2650,7 @@
             </a:ln>
             <a:extLst>
               <a:ext uri="{91240B29-F687-4f45-9708-019B960494DF}">
-                <a14:hiddenLine xmlns="" xmlns:a14="http://schemas.microsoft.com/office/drawing/2010/main" w="9525">
+                <a14:hiddenLine xmlns:a14="http://schemas.microsoft.com/office/drawing/2010/main" xmlns="" w="9525">
                   <a:solidFill>
                     <a:srgbClr val="000000"/>
                   </a:solidFill>
@@ -2717,7 +2718,7 @@
             </a:ln>
             <a:extLst>
               <a:ext uri="{91240B29-F687-4f45-9708-019B960494DF}">
-                <a14:hiddenLine xmlns="" xmlns:a14="http://schemas.microsoft.com/office/drawing/2010/main" w="9525">
+                <a14:hiddenLine xmlns:a14="http://schemas.microsoft.com/office/drawing/2010/main" xmlns="" w="9525">
                   <a:solidFill>
                     <a:srgbClr val="000000"/>
                   </a:solidFill>
@@ -2779,7 +2780,7 @@
             </a:ln>
             <a:extLst>
               <a:ext uri="{91240B29-F687-4f45-9708-019B960494DF}">
-                <a14:hiddenLine xmlns="" xmlns:a14="http://schemas.microsoft.com/office/drawing/2010/main" w="9525">
+                <a14:hiddenLine xmlns:a14="http://schemas.microsoft.com/office/drawing/2010/main" xmlns="" w="9525">
                   <a:solidFill>
                     <a:srgbClr val="000000"/>
                   </a:solidFill>
@@ -2869,7 +2870,7 @@
             </a:ln>
             <a:extLst>
               <a:ext uri="{91240B29-F687-4f45-9708-019B960494DF}">
-                <a14:hiddenLine xmlns="" xmlns:a14="http://schemas.microsoft.com/office/drawing/2010/main" w="9525">
+                <a14:hiddenLine xmlns:a14="http://schemas.microsoft.com/office/drawing/2010/main" xmlns="" w="9525">
                   <a:solidFill>
                     <a:srgbClr val="000000"/>
                   </a:solidFill>
@@ -2931,7 +2932,7 @@
             </a:ln>
             <a:extLst>
               <a:ext uri="{91240B29-F687-4f45-9708-019B960494DF}">
-                <a14:hiddenLine xmlns="" xmlns:a14="http://schemas.microsoft.com/office/drawing/2010/main" w="9525">
+                <a14:hiddenLine xmlns:a14="http://schemas.microsoft.com/office/drawing/2010/main" xmlns="" w="9525">
                   <a:solidFill>
                     <a:srgbClr val="000000"/>
                   </a:solidFill>
@@ -3021,7 +3022,7 @@
             </a:ln>
             <a:extLst>
               <a:ext uri="{91240B29-F687-4f45-9708-019B960494DF}">
-                <a14:hiddenLine xmlns="" xmlns:a14="http://schemas.microsoft.com/office/drawing/2010/main" w="9525">
+                <a14:hiddenLine xmlns:a14="http://schemas.microsoft.com/office/drawing/2010/main" xmlns="" w="9525">
                   <a:solidFill>
                     <a:srgbClr val="000000"/>
                   </a:solidFill>
@@ -3083,7 +3084,7 @@
             </a:ln>
             <a:extLst>
               <a:ext uri="{91240B29-F687-4f45-9708-019B960494DF}">
-                <a14:hiddenLine xmlns="" xmlns:a14="http://schemas.microsoft.com/office/drawing/2010/main" w="9525">
+                <a14:hiddenLine xmlns:a14="http://schemas.microsoft.com/office/drawing/2010/main" xmlns="" w="9525">
                   <a:solidFill>
                     <a:srgbClr val="000000"/>
                   </a:solidFill>
@@ -3173,7 +3174,7 @@
             </a:ln>
             <a:extLst>
               <a:ext uri="{91240B29-F687-4f45-9708-019B960494DF}">
-                <a14:hiddenLine xmlns="" xmlns:a14="http://schemas.microsoft.com/office/drawing/2010/main" w="9525">
+                <a14:hiddenLine xmlns:a14="http://schemas.microsoft.com/office/drawing/2010/main" xmlns="" w="9525">
                   <a:solidFill>
                     <a:srgbClr val="000000"/>
                   </a:solidFill>
@@ -3207,7 +3208,7 @@
             </a:ln>
             <a:extLst>
               <a:ext uri="{91240B29-F687-4f45-9708-019B960494DF}">
-                <a14:hiddenLine xmlns="" xmlns:a14="http://schemas.microsoft.com/office/drawing/2010/main" w="9525">
+                <a14:hiddenLine xmlns:a14="http://schemas.microsoft.com/office/drawing/2010/main" xmlns="" w="9525">
                   <a:solidFill>
                     <a:srgbClr val="000000"/>
                   </a:solidFill>
@@ -3272,7 +3273,7 @@
             </a:ln>
             <a:extLst>
               <a:ext uri="{91240B29-F687-4f45-9708-019B960494DF}">
-                <a14:hiddenLine xmlns="" xmlns:a14="http://schemas.microsoft.com/office/drawing/2010/main" w="9525">
+                <a14:hiddenLine xmlns:a14="http://schemas.microsoft.com/office/drawing/2010/main" xmlns="" w="9525">
                   <a:solidFill>
                     <a:srgbClr val="000000"/>
                   </a:solidFill>
@@ -3362,7 +3363,7 @@
             </a:ln>
             <a:extLst>
               <a:ext uri="{91240B29-F687-4f45-9708-019B960494DF}">
-                <a14:hiddenLine xmlns="" xmlns:a14="http://schemas.microsoft.com/office/drawing/2010/main" w="9525">
+                <a14:hiddenLine xmlns:a14="http://schemas.microsoft.com/office/drawing/2010/main" xmlns="" w="9525">
                   <a:solidFill>
                     <a:srgbClr val="000000"/>
                   </a:solidFill>
@@ -3424,7 +3425,7 @@
             </a:ln>
             <a:extLst>
               <a:ext uri="{91240B29-F687-4f45-9708-019B960494DF}">
-                <a14:hiddenLine xmlns="" xmlns:a14="http://schemas.microsoft.com/office/drawing/2010/main" w="9525">
+                <a14:hiddenLine xmlns:a14="http://schemas.microsoft.com/office/drawing/2010/main" xmlns="" w="9525">
                   <a:solidFill>
                     <a:srgbClr val="000000"/>
                   </a:solidFill>
@@ -3514,7 +3515,7 @@
             </a:ln>
             <a:extLst>
               <a:ext uri="{91240B29-F687-4f45-9708-019B960494DF}">
-                <a14:hiddenLine xmlns="" xmlns:a14="http://schemas.microsoft.com/office/drawing/2010/main" w="9525">
+                <a14:hiddenLine xmlns:a14="http://schemas.microsoft.com/office/drawing/2010/main" xmlns="" w="9525">
                   <a:solidFill>
                     <a:srgbClr val="000000"/>
                   </a:solidFill>
@@ -3604,7 +3605,7 @@
             </a:ln>
             <a:extLst>
               <a:ext uri="{91240B29-F687-4f45-9708-019B960494DF}">
-                <a14:hiddenLine xmlns="" xmlns:a14="http://schemas.microsoft.com/office/drawing/2010/main" w="9525">
+                <a14:hiddenLine xmlns:a14="http://schemas.microsoft.com/office/drawing/2010/main" xmlns="" w="9525">
                   <a:solidFill>
                     <a:srgbClr val="000000"/>
                   </a:solidFill>
@@ -3669,7 +3670,7 @@
             </a:ln>
             <a:extLst>
               <a:ext uri="{91240B29-F687-4f45-9708-019B960494DF}">
-                <a14:hiddenLine xmlns="" xmlns:a14="http://schemas.microsoft.com/office/drawing/2010/main" w="9525">
+                <a14:hiddenLine xmlns:a14="http://schemas.microsoft.com/office/drawing/2010/main" xmlns="" w="9525">
                   <a:solidFill>
                     <a:srgbClr val="000000"/>
                   </a:solidFill>
@@ -3731,7 +3732,7 @@
             </a:ln>
             <a:extLst>
               <a:ext uri="{91240B29-F687-4f45-9708-019B960494DF}">
-                <a14:hiddenLine xmlns="" xmlns:a14="http://schemas.microsoft.com/office/drawing/2010/main" w="9525">
+                <a14:hiddenLine xmlns:a14="http://schemas.microsoft.com/office/drawing/2010/main" xmlns="" w="9525">
                   <a:solidFill>
                     <a:srgbClr val="000000"/>
                   </a:solidFill>
@@ -3821,7 +3822,7 @@
             </a:ln>
             <a:extLst>
               <a:ext uri="{91240B29-F687-4f45-9708-019B960494DF}">
-                <a14:hiddenLine xmlns="" xmlns:a14="http://schemas.microsoft.com/office/drawing/2010/main" w="9525">
+                <a14:hiddenLine xmlns:a14="http://schemas.microsoft.com/office/drawing/2010/main" xmlns="" w="9525">
                   <a:solidFill>
                     <a:srgbClr val="000000"/>
                   </a:solidFill>
@@ -3911,7 +3912,7 @@
             </a:ln>
             <a:extLst>
               <a:ext uri="{91240B29-F687-4f45-9708-019B960494DF}">
-                <a14:hiddenLine xmlns="" xmlns:a14="http://schemas.microsoft.com/office/drawing/2010/main" w="9525">
+                <a14:hiddenLine xmlns:a14="http://schemas.microsoft.com/office/drawing/2010/main" xmlns="" w="9525">
                   <a:solidFill>
                     <a:srgbClr val="000000"/>
                   </a:solidFill>
@@ -3973,7 +3974,7 @@
             </a:ln>
             <a:extLst>
               <a:ext uri="{91240B29-F687-4f45-9708-019B960494DF}">
-                <a14:hiddenLine xmlns="" xmlns:a14="http://schemas.microsoft.com/office/drawing/2010/main" w="9525">
+                <a14:hiddenLine xmlns:a14="http://schemas.microsoft.com/office/drawing/2010/main" xmlns="" w="9525">
                   <a:solidFill>
                     <a:srgbClr val="000000"/>
                   </a:solidFill>
@@ -4093,7 +4094,7 @@
             </a:ln>
             <a:extLst>
               <a:ext uri="{91240B29-F687-4f45-9708-019B960494DF}">
-                <a14:hiddenLine xmlns="" xmlns:a14="http://schemas.microsoft.com/office/drawing/2010/main" w="9525">
+                <a14:hiddenLine xmlns:a14="http://schemas.microsoft.com/office/drawing/2010/main" xmlns="" w="9525">
                   <a:solidFill>
                     <a:srgbClr val="000000"/>
                   </a:solidFill>
@@ -4161,7 +4162,7 @@
             </a:ln>
             <a:extLst>
               <a:ext uri="{91240B29-F687-4f45-9708-019B960494DF}">
-                <a14:hiddenLine xmlns="" xmlns:a14="http://schemas.microsoft.com/office/drawing/2010/main" w="9525">
+                <a14:hiddenLine xmlns:a14="http://schemas.microsoft.com/office/drawing/2010/main" xmlns="" w="9525">
                   <a:solidFill>
                     <a:srgbClr val="000000"/>
                   </a:solidFill>
@@ -4251,7 +4252,7 @@
             </a:ln>
             <a:extLst>
               <a:ext uri="{91240B29-F687-4f45-9708-019B960494DF}">
-                <a14:hiddenLine xmlns="" xmlns:a14="http://schemas.microsoft.com/office/drawing/2010/main" w="9525">
+                <a14:hiddenLine xmlns:a14="http://schemas.microsoft.com/office/drawing/2010/main" xmlns="" w="9525">
                   <a:solidFill>
                     <a:srgbClr val="000000"/>
                   </a:solidFill>
@@ -8973,7 +8974,7 @@
           <a:noFill/>
           <a:extLst>
             <a:ext uri="{909E8E84-426E-40dd-AFC4-6F175D3DCCD1}">
-              <a14:hiddenFill xmlns="" xmlns:a14="http://schemas.microsoft.com/office/drawing/2010/main">
+              <a14:hiddenFill xmlns:a14="http://schemas.microsoft.com/office/drawing/2010/main" xmlns="">
                 <a:solidFill>
                   <a:srgbClr val="FFFFFF"/>
                 </a:solidFill>
@@ -9047,7 +9048,7 @@
               </a:ln>
               <a:extLst>
                 <a:ext uri="{91240B29-F687-4f45-9708-019B960494DF}">
-                  <a14:hiddenLine xmlns="" xmlns:a14="http://schemas.microsoft.com/office/drawing/2010/main" w="9525">
+                  <a14:hiddenLine xmlns:a14="http://schemas.microsoft.com/office/drawing/2010/main" xmlns="" w="9525">
                     <a:solidFill>
                       <a:srgbClr val="000000"/>
                     </a:solidFill>
@@ -9137,7 +9138,7 @@
               </a:ln>
               <a:extLst>
                 <a:ext uri="{91240B29-F687-4f45-9708-019B960494DF}">
-                  <a14:hiddenLine xmlns="" xmlns:a14="http://schemas.microsoft.com/office/drawing/2010/main" w="9525">
+                  <a14:hiddenLine xmlns:a14="http://schemas.microsoft.com/office/drawing/2010/main" xmlns="" w="9525">
                     <a:solidFill>
                       <a:srgbClr val="000000"/>
                     </a:solidFill>
@@ -9227,7 +9228,7 @@
               </a:ln>
               <a:extLst>
                 <a:ext uri="{91240B29-F687-4f45-9708-019B960494DF}">
-                  <a14:hiddenLine xmlns="" xmlns:a14="http://schemas.microsoft.com/office/drawing/2010/main" w="9525">
+                  <a14:hiddenLine xmlns:a14="http://schemas.microsoft.com/office/drawing/2010/main" xmlns="" w="9525">
                     <a:solidFill>
                       <a:srgbClr val="000000"/>
                     </a:solidFill>
@@ -9289,7 +9290,7 @@
               </a:ln>
               <a:extLst>
                 <a:ext uri="{91240B29-F687-4f45-9708-019B960494DF}">
-                  <a14:hiddenLine xmlns="" xmlns:a14="http://schemas.microsoft.com/office/drawing/2010/main" w="9525">
+                  <a14:hiddenLine xmlns:a14="http://schemas.microsoft.com/office/drawing/2010/main" xmlns="" w="9525">
                     <a:solidFill>
                       <a:srgbClr val="000000"/>
                     </a:solidFill>
@@ -9379,7 +9380,7 @@
               </a:ln>
               <a:extLst>
                 <a:ext uri="{91240B29-F687-4f45-9708-019B960494DF}">
-                  <a14:hiddenLine xmlns="" xmlns:a14="http://schemas.microsoft.com/office/drawing/2010/main" w="9525">
+                  <a14:hiddenLine xmlns:a14="http://schemas.microsoft.com/office/drawing/2010/main" xmlns="" w="9525">
                     <a:solidFill>
                       <a:srgbClr val="000000"/>
                     </a:solidFill>
@@ -9441,7 +9442,7 @@
               </a:ln>
               <a:extLst>
                 <a:ext uri="{91240B29-F687-4f45-9708-019B960494DF}">
-                  <a14:hiddenLine xmlns="" xmlns:a14="http://schemas.microsoft.com/office/drawing/2010/main" w="9525">
+                  <a14:hiddenLine xmlns:a14="http://schemas.microsoft.com/office/drawing/2010/main" xmlns="" w="9525">
                     <a:solidFill>
                       <a:srgbClr val="000000"/>
                     </a:solidFill>
@@ -9503,7 +9504,7 @@
               </a:ln>
               <a:extLst>
                 <a:ext uri="{91240B29-F687-4f45-9708-019B960494DF}">
-                  <a14:hiddenLine xmlns="" xmlns:a14="http://schemas.microsoft.com/office/drawing/2010/main" w="9525">
+                  <a14:hiddenLine xmlns:a14="http://schemas.microsoft.com/office/drawing/2010/main" xmlns="" w="9525">
                     <a:solidFill>
                       <a:srgbClr val="000000"/>
                     </a:solidFill>
@@ -9593,7 +9594,7 @@
               </a:ln>
               <a:extLst>
                 <a:ext uri="{91240B29-F687-4f45-9708-019B960494DF}">
-                  <a14:hiddenLine xmlns="" xmlns:a14="http://schemas.microsoft.com/office/drawing/2010/main" w="9525">
+                  <a14:hiddenLine xmlns:a14="http://schemas.microsoft.com/office/drawing/2010/main" xmlns="" w="9525">
                     <a:solidFill>
                       <a:srgbClr val="000000"/>
                     </a:solidFill>
@@ -9683,7 +9684,7 @@
               </a:ln>
               <a:extLst>
                 <a:ext uri="{91240B29-F687-4f45-9708-019B960494DF}">
-                  <a14:hiddenLine xmlns="" xmlns:a14="http://schemas.microsoft.com/office/drawing/2010/main" w="9525">
+                  <a14:hiddenLine xmlns:a14="http://schemas.microsoft.com/office/drawing/2010/main" xmlns="" w="9525">
                     <a:solidFill>
                       <a:srgbClr val="000000"/>
                     </a:solidFill>
@@ -9745,7 +9746,7 @@
               </a:ln>
               <a:extLst>
                 <a:ext uri="{91240B29-F687-4f45-9708-019B960494DF}">
-                  <a14:hiddenLine xmlns="" xmlns:a14="http://schemas.microsoft.com/office/drawing/2010/main" w="9525">
+                  <a14:hiddenLine xmlns:a14="http://schemas.microsoft.com/office/drawing/2010/main" xmlns="" w="9525">
                     <a:solidFill>
                       <a:srgbClr val="000000"/>
                     </a:solidFill>
@@ -9855,7 +9856,7 @@
               </a:ln>
               <a:extLst>
                 <a:ext uri="{91240B29-F687-4f45-9708-019B960494DF}">
-                  <a14:hiddenLine xmlns="" xmlns:a14="http://schemas.microsoft.com/office/drawing/2010/main" w="9525">
+                  <a14:hiddenLine xmlns:a14="http://schemas.microsoft.com/office/drawing/2010/main" xmlns="" w="9525">
                     <a:solidFill>
                       <a:srgbClr val="000000"/>
                     </a:solidFill>
@@ -9939,7 +9940,7 @@
               </a:ln>
               <a:extLst>
                 <a:ext uri="{91240B29-F687-4f45-9708-019B960494DF}">
-                  <a14:hiddenLine xmlns="" xmlns:a14="http://schemas.microsoft.com/office/drawing/2010/main" w="9525">
+                  <a14:hiddenLine xmlns:a14="http://schemas.microsoft.com/office/drawing/2010/main" xmlns="" w="9525">
                     <a:solidFill>
                       <a:srgbClr val="000000"/>
                     </a:solidFill>
@@ -10001,7 +10002,7 @@
               </a:ln>
               <a:extLst>
                 <a:ext uri="{91240B29-F687-4f45-9708-019B960494DF}">
-                  <a14:hiddenLine xmlns="" xmlns:a14="http://schemas.microsoft.com/office/drawing/2010/main" w="9525">
+                  <a14:hiddenLine xmlns:a14="http://schemas.microsoft.com/office/drawing/2010/main" xmlns="" w="9525">
                     <a:solidFill>
                       <a:srgbClr val="000000"/>
                     </a:solidFill>
@@ -10063,7 +10064,7 @@
               </a:ln>
               <a:extLst>
                 <a:ext uri="{91240B29-F687-4f45-9708-019B960494DF}">
-                  <a14:hiddenLine xmlns="" xmlns:a14="http://schemas.microsoft.com/office/drawing/2010/main" w="9525">
+                  <a14:hiddenLine xmlns:a14="http://schemas.microsoft.com/office/drawing/2010/main" xmlns="" w="9525">
                     <a:solidFill>
                       <a:srgbClr val="000000"/>
                     </a:solidFill>
@@ -10153,7 +10154,7 @@
               </a:ln>
               <a:extLst>
                 <a:ext uri="{91240B29-F687-4f45-9708-019B960494DF}">
-                  <a14:hiddenLine xmlns="" xmlns:a14="http://schemas.microsoft.com/office/drawing/2010/main" w="9525">
+                  <a14:hiddenLine xmlns:a14="http://schemas.microsoft.com/office/drawing/2010/main" xmlns="" w="9525">
                     <a:solidFill>
                       <a:srgbClr val="000000"/>
                     </a:solidFill>
@@ -10187,7 +10188,7 @@
               </a:ln>
               <a:extLst>
                 <a:ext uri="{91240B29-F687-4f45-9708-019B960494DF}">
-                  <a14:hiddenLine xmlns="" xmlns:a14="http://schemas.microsoft.com/office/drawing/2010/main" w="9525">
+                  <a14:hiddenLine xmlns:a14="http://schemas.microsoft.com/office/drawing/2010/main" xmlns="" w="9525">
                     <a:solidFill>
                       <a:srgbClr val="000000"/>
                     </a:solidFill>
@@ -10252,7 +10253,7 @@
               </a:ln>
               <a:extLst>
                 <a:ext uri="{91240B29-F687-4f45-9708-019B960494DF}">
-                  <a14:hiddenLine xmlns="" xmlns:a14="http://schemas.microsoft.com/office/drawing/2010/main" w="9525">
+                  <a14:hiddenLine xmlns:a14="http://schemas.microsoft.com/office/drawing/2010/main" xmlns="" w="9525">
                     <a:solidFill>
                       <a:srgbClr val="000000"/>
                     </a:solidFill>
@@ -10342,7 +10343,7 @@
               </a:ln>
               <a:extLst>
                 <a:ext uri="{91240B29-F687-4f45-9708-019B960494DF}">
-                  <a14:hiddenLine xmlns="" xmlns:a14="http://schemas.microsoft.com/office/drawing/2010/main" w="9525">
+                  <a14:hiddenLine xmlns:a14="http://schemas.microsoft.com/office/drawing/2010/main" xmlns="" w="9525">
                     <a:solidFill>
                       <a:srgbClr val="000000"/>
                     </a:solidFill>
@@ -10404,7 +10405,7 @@
               </a:ln>
               <a:extLst>
                 <a:ext uri="{91240B29-F687-4f45-9708-019B960494DF}">
-                  <a14:hiddenLine xmlns="" xmlns:a14="http://schemas.microsoft.com/office/drawing/2010/main" w="9525">
+                  <a14:hiddenLine xmlns:a14="http://schemas.microsoft.com/office/drawing/2010/main" xmlns="" w="9525">
                     <a:solidFill>
                       <a:srgbClr val="000000"/>
                     </a:solidFill>
@@ -10494,7 +10495,7 @@
               </a:ln>
               <a:extLst>
                 <a:ext uri="{91240B29-F687-4f45-9708-019B960494DF}">
-                  <a14:hiddenLine xmlns="" xmlns:a14="http://schemas.microsoft.com/office/drawing/2010/main" w="9525">
+                  <a14:hiddenLine xmlns:a14="http://schemas.microsoft.com/office/drawing/2010/main" xmlns="" w="9525">
                     <a:solidFill>
                       <a:srgbClr val="000000"/>
                     </a:solidFill>
@@ -10559,7 +10560,7 @@
               </a:ln>
               <a:extLst>
                 <a:ext uri="{91240B29-F687-4f45-9708-019B960494DF}">
-                  <a14:hiddenLine xmlns="" xmlns:a14="http://schemas.microsoft.com/office/drawing/2010/main" w="9525">
+                  <a14:hiddenLine xmlns:a14="http://schemas.microsoft.com/office/drawing/2010/main" xmlns="" w="9525">
                     <a:solidFill>
                       <a:srgbClr val="000000"/>
                     </a:solidFill>
@@ -10621,7 +10622,7 @@
               </a:ln>
               <a:extLst>
                 <a:ext uri="{91240B29-F687-4f45-9708-019B960494DF}">
-                  <a14:hiddenLine xmlns="" xmlns:a14="http://schemas.microsoft.com/office/drawing/2010/main" w="9525">
+                  <a14:hiddenLine xmlns:a14="http://schemas.microsoft.com/office/drawing/2010/main" xmlns="" w="9525">
                     <a:solidFill>
                       <a:srgbClr val="000000"/>
                     </a:solidFill>
@@ -10711,7 +10712,7 @@
               </a:ln>
               <a:extLst>
                 <a:ext uri="{91240B29-F687-4f45-9708-019B960494DF}">
-                  <a14:hiddenLine xmlns="" xmlns:a14="http://schemas.microsoft.com/office/drawing/2010/main" w="9525">
+                  <a14:hiddenLine xmlns:a14="http://schemas.microsoft.com/office/drawing/2010/main" xmlns="" w="9525">
                     <a:solidFill>
                       <a:srgbClr val="000000"/>
                     </a:solidFill>
@@ -10801,7 +10802,7 @@
               </a:ln>
               <a:extLst>
                 <a:ext uri="{91240B29-F687-4f45-9708-019B960494DF}">
-                  <a14:hiddenLine xmlns="" xmlns:a14="http://schemas.microsoft.com/office/drawing/2010/main" w="9525">
+                  <a14:hiddenLine xmlns:a14="http://schemas.microsoft.com/office/drawing/2010/main" xmlns="" w="9525">
                     <a:solidFill>
                       <a:srgbClr val="000000"/>
                     </a:solidFill>
@@ -10866,7 +10867,7 @@
               </a:ln>
               <a:extLst>
                 <a:ext uri="{91240B29-F687-4f45-9708-019B960494DF}">
-                  <a14:hiddenLine xmlns="" xmlns:a14="http://schemas.microsoft.com/office/drawing/2010/main" w="9525">
+                  <a14:hiddenLine xmlns:a14="http://schemas.microsoft.com/office/drawing/2010/main" xmlns="" w="9525">
                     <a:solidFill>
                       <a:srgbClr val="000000"/>
                     </a:solidFill>
@@ -10986,7 +10987,7 @@
               </a:ln>
               <a:extLst>
                 <a:ext uri="{91240B29-F687-4f45-9708-019B960494DF}">
-                  <a14:hiddenLine xmlns="" xmlns:a14="http://schemas.microsoft.com/office/drawing/2010/main" w="9525">
+                  <a14:hiddenLine xmlns:a14="http://schemas.microsoft.com/office/drawing/2010/main" xmlns="" w="9525">
                     <a:solidFill>
                       <a:srgbClr val="000000"/>
                     </a:solidFill>
@@ -11084,7 +11085,7 @@
               </a:ln>
               <a:extLst>
                 <a:ext uri="{91240B29-F687-4f45-9708-019B960494DF}">
-                  <a14:hiddenLine xmlns="" xmlns:a14="http://schemas.microsoft.com/office/drawing/2010/main" w="9525">
+                  <a14:hiddenLine xmlns:a14="http://schemas.microsoft.com/office/drawing/2010/main" xmlns="" w="9525">
                     <a:solidFill>
                       <a:srgbClr val="000000"/>
                     </a:solidFill>
@@ -11199,7 +11200,7 @@
               </a:ln>
               <a:extLst>
                 <a:ext uri="{91240B29-F687-4f45-9708-019B960494DF}">
-                  <a14:hiddenLine xmlns="" xmlns:a14="http://schemas.microsoft.com/office/drawing/2010/main" w="9525">
+                  <a14:hiddenLine xmlns:a14="http://schemas.microsoft.com/office/drawing/2010/main" xmlns="" w="9525">
                     <a:solidFill>
                       <a:srgbClr val="000000"/>
                     </a:solidFill>
@@ -11289,7 +11290,7 @@
               </a:ln>
               <a:extLst>
                 <a:ext uri="{91240B29-F687-4f45-9708-019B960494DF}">
-                  <a14:hiddenLine xmlns="" xmlns:a14="http://schemas.microsoft.com/office/drawing/2010/main" w="9525">
+                  <a14:hiddenLine xmlns:a14="http://schemas.microsoft.com/office/drawing/2010/main" xmlns="" w="9525">
                     <a:solidFill>
                       <a:srgbClr val="000000"/>
                     </a:solidFill>
@@ -11354,7 +11355,7 @@
               </a:ln>
               <a:extLst>
                 <a:ext uri="{91240B29-F687-4f45-9708-019B960494DF}">
-                  <a14:hiddenLine xmlns="" xmlns:a14="http://schemas.microsoft.com/office/drawing/2010/main" w="9525">
+                  <a14:hiddenLine xmlns:a14="http://schemas.microsoft.com/office/drawing/2010/main" xmlns="" w="9525">
                     <a:solidFill>
                       <a:srgbClr val="000000"/>
                     </a:solidFill>
@@ -11444,7 +11445,7 @@
               </a:ln>
               <a:extLst>
                 <a:ext uri="{91240B29-F687-4f45-9708-019B960494DF}">
-                  <a14:hiddenLine xmlns="" xmlns:a14="http://schemas.microsoft.com/office/drawing/2010/main" w="9525">
+                  <a14:hiddenLine xmlns:a14="http://schemas.microsoft.com/office/drawing/2010/main" xmlns="" w="9525">
                     <a:solidFill>
                       <a:srgbClr val="000000"/>
                     </a:solidFill>
@@ -11512,7 +11513,7 @@
               </a:ln>
               <a:extLst>
                 <a:ext uri="{91240B29-F687-4f45-9708-019B960494DF}">
-                  <a14:hiddenLine xmlns="" xmlns:a14="http://schemas.microsoft.com/office/drawing/2010/main" w="9525">
+                  <a14:hiddenLine xmlns:a14="http://schemas.microsoft.com/office/drawing/2010/main" xmlns="" w="9525">
                     <a:solidFill>
                       <a:srgbClr val="000000"/>
                     </a:solidFill>
@@ -11602,7 +11603,7 @@
               </a:ln>
               <a:extLst>
                 <a:ext uri="{91240B29-F687-4f45-9708-019B960494DF}">
-                  <a14:hiddenLine xmlns="" xmlns:a14="http://schemas.microsoft.com/office/drawing/2010/main" w="9525">
+                  <a14:hiddenLine xmlns:a14="http://schemas.microsoft.com/office/drawing/2010/main" xmlns="" w="9525">
                     <a:solidFill>
                       <a:srgbClr val="000000"/>
                     </a:solidFill>
@@ -11670,7 +11671,7 @@
               </a:ln>
               <a:extLst>
                 <a:ext uri="{91240B29-F687-4f45-9708-019B960494DF}">
-                  <a14:hiddenLine xmlns="" xmlns:a14="http://schemas.microsoft.com/office/drawing/2010/main" w="9525">
+                  <a14:hiddenLine xmlns:a14="http://schemas.microsoft.com/office/drawing/2010/main" xmlns="" w="9525">
                     <a:solidFill>
                       <a:srgbClr val="000000"/>
                     </a:solidFill>
@@ -11760,7 +11761,7 @@
               </a:ln>
               <a:extLst>
                 <a:ext uri="{91240B29-F687-4f45-9708-019B960494DF}">
-                  <a14:hiddenLine xmlns="" xmlns:a14="http://schemas.microsoft.com/office/drawing/2010/main" w="9525">
+                  <a14:hiddenLine xmlns:a14="http://schemas.microsoft.com/office/drawing/2010/main" xmlns="" w="9525">
                     <a:solidFill>
                       <a:srgbClr val="000000"/>
                     </a:solidFill>
@@ -11794,7 +11795,7 @@
               </a:ln>
               <a:extLst>
                 <a:ext uri="{91240B29-F687-4f45-9708-019B960494DF}">
-                  <a14:hiddenLine xmlns="" xmlns:a14="http://schemas.microsoft.com/office/drawing/2010/main" w="9525">
+                  <a14:hiddenLine xmlns:a14="http://schemas.microsoft.com/office/drawing/2010/main" xmlns="" w="9525">
                     <a:solidFill>
                       <a:srgbClr val="000000"/>
                     </a:solidFill>
@@ -14854,6 +14855,450 @@
 </p:sld>
 </file>
 
+<file path=ppt/slides/slide5.xml><?xml version="1.0" encoding="utf-8"?>
+<p:sld xmlns:a="http://schemas.openxmlformats.org/drawingml/2006/main" xmlns:r="http://schemas.openxmlformats.org/officeDocument/2006/relationships" xmlns:p="http://schemas.openxmlformats.org/presentationml/2006/main">
+  <p:cSld>
+    <p:spTree>
+      <p:nvGrpSpPr>
+        <p:cNvPr id="1" name=""/>
+        <p:cNvGrpSpPr/>
+        <p:nvPr/>
+      </p:nvGrpSpPr>
+      <p:grpSpPr>
+        <a:xfrm>
+          <a:off x="0" y="0"/>
+          <a:ext cx="0" cy="0"/>
+          <a:chOff x="0" y="0"/>
+          <a:chExt cx="0" cy="0"/>
+        </a:xfrm>
+      </p:grpSpPr>
+      <p:sp>
+        <p:nvSpPr>
+          <p:cNvPr id="2" name="Titre 1"/>
+          <p:cNvSpPr>
+            <a:spLocks noGrp="1"/>
+          </p:cNvSpPr>
+          <p:nvPr>
+            <p:ph type="title"/>
+          </p:nvPr>
+        </p:nvSpPr>
+        <p:spPr/>
+        <p:txBody>
+          <a:bodyPr/>
+          <a:lstStyle/>
+          <a:p>
+            <a:r>
+              <a:rPr lang="fr-FR" dirty="0" smtClean="0"/>
+              <a:t>User stories</a:t>
+            </a:r>
+            <a:endParaRPr lang="fr-FR" dirty="0"/>
+          </a:p>
+        </p:txBody>
+      </p:sp>
+      <p:sp>
+        <p:nvSpPr>
+          <p:cNvPr id="3" name="Espace réservé du contenu 2"/>
+          <p:cNvSpPr>
+            <a:spLocks noGrp="1"/>
+          </p:cNvSpPr>
+          <p:nvPr>
+            <p:ph idx="1"/>
+          </p:nvPr>
+        </p:nvSpPr>
+        <p:spPr/>
+        <p:txBody>
+          <a:bodyPr/>
+          <a:lstStyle/>
+          <a:p>
+            <a:r>
+              <a:rPr lang="fr-FR" dirty="0" smtClean="0"/>
+              <a:t>Page de connexion </a:t>
+            </a:r>
+            <a:r>
+              <a:rPr lang="fr-FR" dirty="0" smtClean="0">
+                <a:sym typeface="Wingdings" panose="05000000000000000000" pitchFamily="2" charset="2"/>
+                <a:hlinkClick r:id="rId2" action="ppaction://hlinkfile"/>
+              </a:rPr>
+              <a:t> 1 à 4</a:t>
+            </a:r>
+            <a:endParaRPr lang="fr-FR" dirty="0" smtClean="0"/>
+          </a:p>
+          <a:p>
+            <a:r>
+              <a:rPr lang="fr-FR" dirty="0" smtClean="0"/>
+              <a:t>Page de tableau de bord </a:t>
+            </a:r>
+            <a:r>
+              <a:rPr lang="fr-FR" dirty="0" smtClean="0">
+                <a:sym typeface="Wingdings" panose="05000000000000000000" pitchFamily="2" charset="2"/>
+                <a:hlinkClick r:id="rId3" action="ppaction://hlinkfile"/>
+              </a:rPr>
+              <a:t> 5 à 13</a:t>
+            </a:r>
+            <a:endParaRPr lang="fr-FR" dirty="0" smtClean="0"/>
+          </a:p>
+          <a:p>
+            <a:r>
+              <a:rPr lang="fr-FR" dirty="0" smtClean="0"/>
+              <a:t>Page de chat </a:t>
+            </a:r>
+            <a:r>
+              <a:rPr lang="fr-FR" dirty="0" smtClean="0">
+                <a:sym typeface="Wingdings" panose="05000000000000000000" pitchFamily="2" charset="2"/>
+                <a:hlinkClick r:id="rId4" action="ppaction://hlinkfile"/>
+              </a:rPr>
+              <a:t> 14 à 20</a:t>
+            </a:r>
+            <a:endParaRPr lang="fr-FR" dirty="0" smtClean="0"/>
+          </a:p>
+          <a:p>
+            <a:r>
+              <a:rPr lang="fr-FR" dirty="0" smtClean="0"/>
+              <a:t>Page de calendrier </a:t>
+            </a:r>
+            <a:r>
+              <a:rPr lang="fr-FR" dirty="0" smtClean="0">
+                <a:sym typeface="Wingdings" panose="05000000000000000000" pitchFamily="2" charset="2"/>
+                <a:hlinkClick r:id="rId5" action="ppaction://hlinkfile"/>
+              </a:rPr>
+              <a:t> 21 à 29</a:t>
+            </a:r>
+            <a:endParaRPr lang="fr-FR" dirty="0" smtClean="0"/>
+          </a:p>
+          <a:p>
+            <a:r>
+              <a:rPr lang="fr-FR" dirty="0" smtClean="0"/>
+              <a:t>Page de gestion des tâches </a:t>
+            </a:r>
+            <a:r>
+              <a:rPr lang="fr-FR" dirty="0" smtClean="0">
+                <a:sym typeface="Wingdings" panose="05000000000000000000" pitchFamily="2" charset="2"/>
+                <a:hlinkClick r:id="rId6" action="ppaction://hlinkfile"/>
+              </a:rPr>
+              <a:t> 30 à 35</a:t>
+            </a:r>
+            <a:endParaRPr lang="fr-FR" dirty="0" smtClean="0"/>
+          </a:p>
+        </p:txBody>
+      </p:sp>
+    </p:spTree>
+    <p:extLst>
+      <p:ext uri="{BB962C8B-B14F-4D97-AF65-F5344CB8AC3E}">
+        <p14:creationId xmlns:p14="http://schemas.microsoft.com/office/powerpoint/2010/main" val="3956823170"/>
+      </p:ext>
+    </p:extLst>
+  </p:cSld>
+  <p:clrMapOvr>
+    <a:masterClrMapping/>
+  </p:clrMapOvr>
+  <p:timing>
+    <p:tnLst>
+      <p:par>
+        <p:cTn id="1" dur="indefinite" restart="never" nodeType="tmRoot">
+          <p:childTnLst>
+            <p:seq concurrent="1" nextAc="seek">
+              <p:cTn id="2" dur="indefinite" nodeType="mainSeq">
+                <p:childTnLst>
+                  <p:par>
+                    <p:cTn id="3" fill="hold">
+                      <p:stCondLst>
+                        <p:cond delay="indefinite"/>
+                        <p:cond evt="onBegin" delay="0">
+                          <p:tn val="2"/>
+                        </p:cond>
+                      </p:stCondLst>
+                      <p:childTnLst>
+                        <p:par>
+                          <p:cTn id="4" fill="hold">
+                            <p:stCondLst>
+                              <p:cond delay="0"/>
+                            </p:stCondLst>
+                            <p:childTnLst>
+                              <p:par>
+                                <p:cTn id="5" presetID="10" presetClass="entr" presetSubtype="0" fill="hold" grpId="0" nodeType="afterEffect">
+                                  <p:stCondLst>
+                                    <p:cond delay="0"/>
+                                  </p:stCondLst>
+                                  <p:childTnLst>
+                                    <p:set>
+                                      <p:cBhvr>
+                                        <p:cTn id="6" dur="1" fill="hold">
+                                          <p:stCondLst>
+                                            <p:cond delay="0"/>
+                                          </p:stCondLst>
+                                        </p:cTn>
+                                        <p:tgtEl>
+                                          <p:spTgt spid="3">
+                                            <p:txEl>
+                                              <p:pRg st="0" end="0"/>
+                                            </p:txEl>
+                                          </p:spTgt>
+                                        </p:tgtEl>
+                                        <p:attrNameLst>
+                                          <p:attrName>style.visibility</p:attrName>
+                                        </p:attrNameLst>
+                                      </p:cBhvr>
+                                      <p:to>
+                                        <p:strVal val="visible"/>
+                                      </p:to>
+                                    </p:set>
+                                    <p:animEffect transition="in" filter="fade">
+                                      <p:cBhvr>
+                                        <p:cTn id="7" dur="500"/>
+                                        <p:tgtEl>
+                                          <p:spTgt spid="3">
+                                            <p:txEl>
+                                              <p:pRg st="0" end="0"/>
+                                            </p:txEl>
+                                          </p:spTgt>
+                                        </p:tgtEl>
+                                      </p:cBhvr>
+                                    </p:animEffect>
+                                  </p:childTnLst>
+                                </p:cTn>
+                              </p:par>
+                            </p:childTnLst>
+                          </p:cTn>
+                        </p:par>
+                        <p:par>
+                          <p:cTn id="8" fill="hold">
+                            <p:stCondLst>
+                              <p:cond delay="500"/>
+                            </p:stCondLst>
+                            <p:childTnLst>
+                              <p:par>
+                                <p:cTn id="9" presetID="10" presetClass="entr" presetSubtype="0" fill="hold" grpId="0" nodeType="afterEffect">
+                                  <p:stCondLst>
+                                    <p:cond delay="0"/>
+                                  </p:stCondLst>
+                                  <p:childTnLst>
+                                    <p:set>
+                                      <p:cBhvr>
+                                        <p:cTn id="10" dur="1" fill="hold">
+                                          <p:stCondLst>
+                                            <p:cond delay="0"/>
+                                          </p:stCondLst>
+                                        </p:cTn>
+                                        <p:tgtEl>
+                                          <p:spTgt spid="3">
+                                            <p:txEl>
+                                              <p:pRg st="1" end="1"/>
+                                            </p:txEl>
+                                          </p:spTgt>
+                                        </p:tgtEl>
+                                        <p:attrNameLst>
+                                          <p:attrName>style.visibility</p:attrName>
+                                        </p:attrNameLst>
+                                      </p:cBhvr>
+                                      <p:to>
+                                        <p:strVal val="visible"/>
+                                      </p:to>
+                                    </p:set>
+                                    <p:animEffect transition="in" filter="fade">
+                                      <p:cBhvr>
+                                        <p:cTn id="11" dur="500"/>
+                                        <p:tgtEl>
+                                          <p:spTgt spid="3">
+                                            <p:txEl>
+                                              <p:pRg st="1" end="1"/>
+                                            </p:txEl>
+                                          </p:spTgt>
+                                        </p:tgtEl>
+                                      </p:cBhvr>
+                                    </p:animEffect>
+                                  </p:childTnLst>
+                                </p:cTn>
+                              </p:par>
+                            </p:childTnLst>
+                          </p:cTn>
+                        </p:par>
+                        <p:par>
+                          <p:cTn id="12" fill="hold">
+                            <p:stCondLst>
+                              <p:cond delay="1000"/>
+                            </p:stCondLst>
+                            <p:childTnLst>
+                              <p:par>
+                                <p:cTn id="13" presetID="10" presetClass="entr" presetSubtype="0" fill="hold" grpId="0" nodeType="afterEffect">
+                                  <p:stCondLst>
+                                    <p:cond delay="0"/>
+                                  </p:stCondLst>
+                                  <p:childTnLst>
+                                    <p:set>
+                                      <p:cBhvr>
+                                        <p:cTn id="14" dur="1" fill="hold">
+                                          <p:stCondLst>
+                                            <p:cond delay="0"/>
+                                          </p:stCondLst>
+                                        </p:cTn>
+                                        <p:tgtEl>
+                                          <p:spTgt spid="3">
+                                            <p:txEl>
+                                              <p:pRg st="2" end="2"/>
+                                            </p:txEl>
+                                          </p:spTgt>
+                                        </p:tgtEl>
+                                        <p:attrNameLst>
+                                          <p:attrName>style.visibility</p:attrName>
+                                        </p:attrNameLst>
+                                      </p:cBhvr>
+                                      <p:to>
+                                        <p:strVal val="visible"/>
+                                      </p:to>
+                                    </p:set>
+                                    <p:animEffect transition="in" filter="fade">
+                                      <p:cBhvr>
+                                        <p:cTn id="15" dur="500"/>
+                                        <p:tgtEl>
+                                          <p:spTgt spid="3">
+                                            <p:txEl>
+                                              <p:pRg st="2" end="2"/>
+                                            </p:txEl>
+                                          </p:spTgt>
+                                        </p:tgtEl>
+                                      </p:cBhvr>
+                                    </p:animEffect>
+                                  </p:childTnLst>
+                                </p:cTn>
+                              </p:par>
+                            </p:childTnLst>
+                          </p:cTn>
+                        </p:par>
+                        <p:par>
+                          <p:cTn id="16" fill="hold">
+                            <p:stCondLst>
+                              <p:cond delay="1500"/>
+                            </p:stCondLst>
+                            <p:childTnLst>
+                              <p:par>
+                                <p:cTn id="17" presetID="10" presetClass="entr" presetSubtype="0" fill="hold" grpId="0" nodeType="afterEffect">
+                                  <p:stCondLst>
+                                    <p:cond delay="0"/>
+                                  </p:stCondLst>
+                                  <p:childTnLst>
+                                    <p:set>
+                                      <p:cBhvr>
+                                        <p:cTn id="18" dur="1" fill="hold">
+                                          <p:stCondLst>
+                                            <p:cond delay="0"/>
+                                          </p:stCondLst>
+                                        </p:cTn>
+                                        <p:tgtEl>
+                                          <p:spTgt spid="3">
+                                            <p:txEl>
+                                              <p:pRg st="3" end="3"/>
+                                            </p:txEl>
+                                          </p:spTgt>
+                                        </p:tgtEl>
+                                        <p:attrNameLst>
+                                          <p:attrName>style.visibility</p:attrName>
+                                        </p:attrNameLst>
+                                      </p:cBhvr>
+                                      <p:to>
+                                        <p:strVal val="visible"/>
+                                      </p:to>
+                                    </p:set>
+                                    <p:animEffect transition="in" filter="fade">
+                                      <p:cBhvr>
+                                        <p:cTn id="19" dur="500"/>
+                                        <p:tgtEl>
+                                          <p:spTgt spid="3">
+                                            <p:txEl>
+                                              <p:pRg st="3" end="3"/>
+                                            </p:txEl>
+                                          </p:spTgt>
+                                        </p:tgtEl>
+                                      </p:cBhvr>
+                                    </p:animEffect>
+                                  </p:childTnLst>
+                                </p:cTn>
+                              </p:par>
+                            </p:childTnLst>
+                          </p:cTn>
+                        </p:par>
+                        <p:par>
+                          <p:cTn id="20" fill="hold">
+                            <p:stCondLst>
+                              <p:cond delay="2000"/>
+                            </p:stCondLst>
+                            <p:childTnLst>
+                              <p:par>
+                                <p:cTn id="21" presetID="10" presetClass="entr" presetSubtype="0" fill="hold" grpId="0" nodeType="afterEffect">
+                                  <p:stCondLst>
+                                    <p:cond delay="0"/>
+                                  </p:stCondLst>
+                                  <p:childTnLst>
+                                    <p:set>
+                                      <p:cBhvr>
+                                        <p:cTn id="22" dur="1" fill="hold">
+                                          <p:stCondLst>
+                                            <p:cond delay="0"/>
+                                          </p:stCondLst>
+                                        </p:cTn>
+                                        <p:tgtEl>
+                                          <p:spTgt spid="3">
+                                            <p:txEl>
+                                              <p:pRg st="4" end="4"/>
+                                            </p:txEl>
+                                          </p:spTgt>
+                                        </p:tgtEl>
+                                        <p:attrNameLst>
+                                          <p:attrName>style.visibility</p:attrName>
+                                        </p:attrNameLst>
+                                      </p:cBhvr>
+                                      <p:to>
+                                        <p:strVal val="visible"/>
+                                      </p:to>
+                                    </p:set>
+                                    <p:animEffect transition="in" filter="fade">
+                                      <p:cBhvr>
+                                        <p:cTn id="23" dur="500"/>
+                                        <p:tgtEl>
+                                          <p:spTgt spid="3">
+                                            <p:txEl>
+                                              <p:pRg st="4" end="4"/>
+                                            </p:txEl>
+                                          </p:spTgt>
+                                        </p:tgtEl>
+                                      </p:cBhvr>
+                                    </p:animEffect>
+                                  </p:childTnLst>
+                                </p:cTn>
+                              </p:par>
+                            </p:childTnLst>
+                          </p:cTn>
+                        </p:par>
+                      </p:childTnLst>
+                    </p:cTn>
+                  </p:par>
+                </p:childTnLst>
+              </p:cTn>
+              <p:prevCondLst>
+                <p:cond evt="onPrev" delay="0">
+                  <p:tgtEl>
+                    <p:sldTgt/>
+                  </p:tgtEl>
+                </p:cond>
+              </p:prevCondLst>
+              <p:nextCondLst>
+                <p:cond evt="onNext" delay="0">
+                  <p:tgtEl>
+                    <p:sldTgt/>
+                  </p:tgtEl>
+                </p:cond>
+              </p:nextCondLst>
+            </p:seq>
+          </p:childTnLst>
+        </p:cTn>
+      </p:par>
+    </p:tnLst>
+    <p:bldLst>
+      <p:bldP spid="3" grpId="0" build="p"/>
+    </p:bldLst>
+  </p:timing>
+</p:sld>
+</file>
+
 <file path=ppt/theme/theme1.xml><?xml version="1.0" encoding="utf-8"?>
 <a:theme xmlns:a="http://schemas.openxmlformats.org/drawingml/2006/main" name="Circuit">
   <a:themeElements>

</xml_diff>

<commit_message>
Fin de présentation '
</commit_message>
<xml_diff>
--- a/Présentation.pptx
+++ b/Présentation.pptx
@@ -10,6 +10,9 @@
     <p:sldId id="258" r:id="rId4"/>
     <p:sldId id="259" r:id="rId5"/>
     <p:sldId id="260" r:id="rId6"/>
+    <p:sldId id="261" r:id="rId7"/>
+    <p:sldId id="262" r:id="rId8"/>
+    <p:sldId id="263" r:id="rId9"/>
   </p:sldIdLst>
   <p:sldSz cx="12192000" cy="6858000"/>
   <p:notesSz cx="6858000" cy="9144000"/>
@@ -166,7 +169,7 @@
           <a:noFill/>
           <a:extLst>
             <a:ext uri="{909E8E84-426E-40dd-AFC4-6F175D3DCCD1}">
-              <a14:hiddenFill xmlns:a14="http://schemas.microsoft.com/office/drawing/2010/main" xmlns="">
+              <a14:hiddenFill xmlns="" xmlns:a14="http://schemas.microsoft.com/office/drawing/2010/main">
                 <a:solidFill>
                   <a:srgbClr val="FFFFFF"/>
                 </a:solidFill>
@@ -226,7 +229,7 @@
             </a:ln>
             <a:extLst>
               <a:ext uri="{91240B29-F687-4f45-9708-019B960494DF}">
-                <a14:hiddenLine xmlns:a14="http://schemas.microsoft.com/office/drawing/2010/main" xmlns="" w="9525">
+                <a14:hiddenLine xmlns="" xmlns:a14="http://schemas.microsoft.com/office/drawing/2010/main" w="9525">
                   <a:solidFill>
                     <a:srgbClr val="000000"/>
                   </a:solidFill>
@@ -316,7 +319,7 @@
             </a:ln>
             <a:extLst>
               <a:ext uri="{91240B29-F687-4f45-9708-019B960494DF}">
-                <a14:hiddenLine xmlns:a14="http://schemas.microsoft.com/office/drawing/2010/main" xmlns="" w="9525">
+                <a14:hiddenLine xmlns="" xmlns:a14="http://schemas.microsoft.com/office/drawing/2010/main" w="9525">
                   <a:solidFill>
                     <a:srgbClr val="000000"/>
                   </a:solidFill>
@@ -406,7 +409,7 @@
             </a:ln>
             <a:extLst>
               <a:ext uri="{91240B29-F687-4f45-9708-019B960494DF}">
-                <a14:hiddenLine xmlns:a14="http://schemas.microsoft.com/office/drawing/2010/main" xmlns="" w="9525">
+                <a14:hiddenLine xmlns="" xmlns:a14="http://schemas.microsoft.com/office/drawing/2010/main" w="9525">
                   <a:solidFill>
                     <a:srgbClr val="000000"/>
                   </a:solidFill>
@@ -440,7 +443,7 @@
             </a:ln>
             <a:extLst>
               <a:ext uri="{91240B29-F687-4f45-9708-019B960494DF}">
-                <a14:hiddenLine xmlns:a14="http://schemas.microsoft.com/office/drawing/2010/main" xmlns="" w="9525">
+                <a14:hiddenLine xmlns="" xmlns:a14="http://schemas.microsoft.com/office/drawing/2010/main" w="9525">
                   <a:solidFill>
                     <a:srgbClr val="000000"/>
                   </a:solidFill>
@@ -530,7 +533,7 @@
             </a:ln>
             <a:extLst>
               <a:ext uri="{91240B29-F687-4f45-9708-019B960494DF}">
-                <a14:hiddenLine xmlns:a14="http://schemas.microsoft.com/office/drawing/2010/main" xmlns="" w="9525">
+                <a14:hiddenLine xmlns="" xmlns:a14="http://schemas.microsoft.com/office/drawing/2010/main" w="9525">
                   <a:solidFill>
                     <a:srgbClr val="000000"/>
                   </a:solidFill>
@@ -592,7 +595,7 @@
             </a:ln>
             <a:extLst>
               <a:ext uri="{91240B29-F687-4f45-9708-019B960494DF}">
-                <a14:hiddenLine xmlns:a14="http://schemas.microsoft.com/office/drawing/2010/main" xmlns="" w="9525">
+                <a14:hiddenLine xmlns="" xmlns:a14="http://schemas.microsoft.com/office/drawing/2010/main" w="9525">
                   <a:solidFill>
                     <a:srgbClr val="000000"/>
                   </a:solidFill>
@@ -654,7 +657,7 @@
             </a:ln>
             <a:extLst>
               <a:ext uri="{91240B29-F687-4f45-9708-019B960494DF}">
-                <a14:hiddenLine xmlns:a14="http://schemas.microsoft.com/office/drawing/2010/main" xmlns="" w="9525">
+                <a14:hiddenLine xmlns="" xmlns:a14="http://schemas.microsoft.com/office/drawing/2010/main" w="9525">
                   <a:solidFill>
                     <a:srgbClr val="000000"/>
                   </a:solidFill>
@@ -744,7 +747,7 @@
             </a:ln>
             <a:extLst>
               <a:ext uri="{91240B29-F687-4f45-9708-019B960494DF}">
-                <a14:hiddenLine xmlns:a14="http://schemas.microsoft.com/office/drawing/2010/main" xmlns="" w="9525">
+                <a14:hiddenLine xmlns="" xmlns:a14="http://schemas.microsoft.com/office/drawing/2010/main" w="9525">
                   <a:solidFill>
                     <a:srgbClr val="000000"/>
                   </a:solidFill>
@@ -806,7 +809,7 @@
             </a:ln>
             <a:extLst>
               <a:ext uri="{91240B29-F687-4f45-9708-019B960494DF}">
-                <a14:hiddenLine xmlns:a14="http://schemas.microsoft.com/office/drawing/2010/main" xmlns="" w="9525">
+                <a14:hiddenLine xmlns="" xmlns:a14="http://schemas.microsoft.com/office/drawing/2010/main" w="9525">
                   <a:solidFill>
                     <a:srgbClr val="000000"/>
                   </a:solidFill>
@@ -868,7 +871,7 @@
             </a:ln>
             <a:extLst>
               <a:ext uri="{91240B29-F687-4f45-9708-019B960494DF}">
-                <a14:hiddenLine xmlns:a14="http://schemas.microsoft.com/office/drawing/2010/main" xmlns="" w="9525">
+                <a14:hiddenLine xmlns="" xmlns:a14="http://schemas.microsoft.com/office/drawing/2010/main" w="9525">
                   <a:solidFill>
                     <a:srgbClr val="000000"/>
                   </a:solidFill>
@@ -958,7 +961,7 @@
             </a:ln>
             <a:extLst>
               <a:ext uri="{91240B29-F687-4f45-9708-019B960494DF}">
-                <a14:hiddenLine xmlns:a14="http://schemas.microsoft.com/office/drawing/2010/main" xmlns="" w="9525">
+                <a14:hiddenLine xmlns="" xmlns:a14="http://schemas.microsoft.com/office/drawing/2010/main" w="9525">
                   <a:solidFill>
                     <a:srgbClr val="000000"/>
                   </a:solidFill>
@@ -1048,7 +1051,7 @@
             </a:ln>
             <a:extLst>
               <a:ext uri="{91240B29-F687-4f45-9708-019B960494DF}">
-                <a14:hiddenLine xmlns:a14="http://schemas.microsoft.com/office/drawing/2010/main" xmlns="" w="9525">
+                <a14:hiddenLine xmlns="" xmlns:a14="http://schemas.microsoft.com/office/drawing/2010/main" w="9525">
                   <a:solidFill>
                     <a:srgbClr val="000000"/>
                   </a:solidFill>
@@ -1110,7 +1113,7 @@
             </a:ln>
             <a:extLst>
               <a:ext uri="{91240B29-F687-4f45-9708-019B960494DF}">
-                <a14:hiddenLine xmlns:a14="http://schemas.microsoft.com/office/drawing/2010/main" xmlns="" w="9525">
+                <a14:hiddenLine xmlns="" xmlns:a14="http://schemas.microsoft.com/office/drawing/2010/main" w="9525">
                   <a:solidFill>
                     <a:srgbClr val="000000"/>
                   </a:solidFill>
@@ -1220,7 +1223,7 @@
             </a:ln>
             <a:extLst>
               <a:ext uri="{91240B29-F687-4f45-9708-019B960494DF}">
-                <a14:hiddenLine xmlns:a14="http://schemas.microsoft.com/office/drawing/2010/main" xmlns="" w="9525">
+                <a14:hiddenLine xmlns="" xmlns:a14="http://schemas.microsoft.com/office/drawing/2010/main" w="9525">
                   <a:solidFill>
                     <a:srgbClr val="000000"/>
                   </a:solidFill>
@@ -1282,7 +1285,7 @@
             </a:ln>
             <a:extLst>
               <a:ext uri="{91240B29-F687-4f45-9708-019B960494DF}">
-                <a14:hiddenLine xmlns:a14="http://schemas.microsoft.com/office/drawing/2010/main" xmlns="" w="9525">
+                <a14:hiddenLine xmlns="" xmlns:a14="http://schemas.microsoft.com/office/drawing/2010/main" w="9525">
                   <a:solidFill>
                     <a:srgbClr val="000000"/>
                   </a:solidFill>
@@ -1372,7 +1375,7 @@
             </a:ln>
             <a:extLst>
               <a:ext uri="{91240B29-F687-4f45-9708-019B960494DF}">
-                <a14:hiddenLine xmlns:a14="http://schemas.microsoft.com/office/drawing/2010/main" xmlns="" w="9525">
+                <a14:hiddenLine xmlns="" xmlns:a14="http://schemas.microsoft.com/office/drawing/2010/main" w="9525">
                   <a:solidFill>
                     <a:srgbClr val="000000"/>
                   </a:solidFill>
@@ -1462,7 +1465,7 @@
             </a:ln>
             <a:extLst>
               <a:ext uri="{91240B29-F687-4f45-9708-019B960494DF}">
-                <a14:hiddenLine xmlns:a14="http://schemas.microsoft.com/office/drawing/2010/main" xmlns="" w="9525">
+                <a14:hiddenLine xmlns="" xmlns:a14="http://schemas.microsoft.com/office/drawing/2010/main" w="9525">
                   <a:solidFill>
                     <a:srgbClr val="000000"/>
                   </a:solidFill>
@@ -1524,7 +1527,7 @@
             </a:ln>
             <a:extLst>
               <a:ext uri="{91240B29-F687-4f45-9708-019B960494DF}">
-                <a14:hiddenLine xmlns:a14="http://schemas.microsoft.com/office/drawing/2010/main" xmlns="" w="9525">
+                <a14:hiddenLine xmlns="" xmlns:a14="http://schemas.microsoft.com/office/drawing/2010/main" w="9525">
                   <a:solidFill>
                     <a:srgbClr val="000000"/>
                   </a:solidFill>
@@ -1614,7 +1617,7 @@
             </a:ln>
             <a:extLst>
               <a:ext uri="{91240B29-F687-4f45-9708-019B960494DF}">
-                <a14:hiddenLine xmlns:a14="http://schemas.microsoft.com/office/drawing/2010/main" xmlns="" w="9525">
+                <a14:hiddenLine xmlns="" xmlns:a14="http://schemas.microsoft.com/office/drawing/2010/main" w="9525">
                   <a:solidFill>
                     <a:srgbClr val="000000"/>
                   </a:solidFill>
@@ -1704,7 +1707,7 @@
             </a:ln>
             <a:extLst>
               <a:ext uri="{91240B29-F687-4f45-9708-019B960494DF}">
-                <a14:hiddenLine xmlns:a14="http://schemas.microsoft.com/office/drawing/2010/main" xmlns="" w="9525">
+                <a14:hiddenLine xmlns="" xmlns:a14="http://schemas.microsoft.com/office/drawing/2010/main" w="9525">
                   <a:solidFill>
                     <a:srgbClr val="000000"/>
                   </a:solidFill>
@@ -1760,7 +1763,7 @@
             </a:ln>
             <a:extLst>
               <a:ext uri="{91240B29-F687-4f45-9708-019B960494DF}">
-                <a14:hiddenLine xmlns:a14="http://schemas.microsoft.com/office/drawing/2010/main" xmlns="" w="9525">
+                <a14:hiddenLine xmlns="" xmlns:a14="http://schemas.microsoft.com/office/drawing/2010/main" w="9525">
                   <a:solidFill>
                     <a:srgbClr val="000000"/>
                   </a:solidFill>
@@ -1850,7 +1853,7 @@
             </a:ln>
             <a:extLst>
               <a:ext uri="{91240B29-F687-4f45-9708-019B960494DF}">
-                <a14:hiddenLine xmlns:a14="http://schemas.microsoft.com/office/drawing/2010/main" xmlns="" w="9525">
+                <a14:hiddenLine xmlns="" xmlns:a14="http://schemas.microsoft.com/office/drawing/2010/main" w="9525">
                   <a:solidFill>
                     <a:srgbClr val="000000"/>
                   </a:solidFill>
@@ -1906,7 +1909,7 @@
             </a:ln>
             <a:extLst>
               <a:ext uri="{91240B29-F687-4f45-9708-019B960494DF}">
-                <a14:hiddenLine xmlns:a14="http://schemas.microsoft.com/office/drawing/2010/main" xmlns="" w="9525">
+                <a14:hiddenLine xmlns="" xmlns:a14="http://schemas.microsoft.com/office/drawing/2010/main" w="9525">
                   <a:solidFill>
                     <a:srgbClr val="000000"/>
                   </a:solidFill>
@@ -1996,7 +1999,7 @@
             </a:ln>
             <a:extLst>
               <a:ext uri="{91240B29-F687-4f45-9708-019B960494DF}">
-                <a14:hiddenLine xmlns:a14="http://schemas.microsoft.com/office/drawing/2010/main" xmlns="" w="9525">
+                <a14:hiddenLine xmlns="" xmlns:a14="http://schemas.microsoft.com/office/drawing/2010/main" w="9525">
                   <a:solidFill>
                     <a:srgbClr val="000000"/>
                   </a:solidFill>
@@ -2064,7 +2067,7 @@
             </a:ln>
             <a:extLst>
               <a:ext uri="{91240B29-F687-4f45-9708-019B960494DF}">
-                <a14:hiddenLine xmlns:a14="http://schemas.microsoft.com/office/drawing/2010/main" xmlns="" w="9525">
+                <a14:hiddenLine xmlns="" xmlns:a14="http://schemas.microsoft.com/office/drawing/2010/main" w="9525">
                   <a:solidFill>
                     <a:srgbClr val="000000"/>
                   </a:solidFill>
@@ -2154,7 +2157,7 @@
             </a:ln>
             <a:extLst>
               <a:ext uri="{91240B29-F687-4f45-9708-019B960494DF}">
-                <a14:hiddenLine xmlns:a14="http://schemas.microsoft.com/office/drawing/2010/main" xmlns="" w="9525">
+                <a14:hiddenLine xmlns="" xmlns:a14="http://schemas.microsoft.com/office/drawing/2010/main" w="9525">
                   <a:solidFill>
                     <a:srgbClr val="000000"/>
                   </a:solidFill>
@@ -2222,7 +2225,7 @@
             </a:ln>
             <a:extLst>
               <a:ext uri="{91240B29-F687-4f45-9708-019B960494DF}">
-                <a14:hiddenLine xmlns:a14="http://schemas.microsoft.com/office/drawing/2010/main" xmlns="" w="9525">
+                <a14:hiddenLine xmlns="" xmlns:a14="http://schemas.microsoft.com/office/drawing/2010/main" w="9525">
                   <a:solidFill>
                     <a:srgbClr val="000000"/>
                   </a:solidFill>
@@ -2312,7 +2315,7 @@
             </a:ln>
             <a:extLst>
               <a:ext uri="{91240B29-F687-4f45-9708-019B960494DF}">
-                <a14:hiddenLine xmlns:a14="http://schemas.microsoft.com/office/drawing/2010/main" xmlns="" w="9525">
+                <a14:hiddenLine xmlns="" xmlns:a14="http://schemas.microsoft.com/office/drawing/2010/main" w="9525">
                   <a:solidFill>
                     <a:srgbClr val="000000"/>
                   </a:solidFill>
@@ -2346,7 +2349,7 @@
             </a:ln>
             <a:extLst>
               <a:ext uri="{91240B29-F687-4f45-9708-019B960494DF}">
-                <a14:hiddenLine xmlns:a14="http://schemas.microsoft.com/office/drawing/2010/main" xmlns="" w="9525">
+                <a14:hiddenLine xmlns="" xmlns:a14="http://schemas.microsoft.com/office/drawing/2010/main" w="9525">
                   <a:solidFill>
                     <a:srgbClr val="000000"/>
                   </a:solidFill>
@@ -2436,7 +2439,7 @@
             </a:ln>
             <a:extLst>
               <a:ext uri="{91240B29-F687-4f45-9708-019B960494DF}">
-                <a14:hiddenLine xmlns:a14="http://schemas.microsoft.com/office/drawing/2010/main" xmlns="" w="9525">
+                <a14:hiddenLine xmlns="" xmlns:a14="http://schemas.microsoft.com/office/drawing/2010/main" w="9525">
                   <a:solidFill>
                     <a:srgbClr val="000000"/>
                   </a:solidFill>
@@ -2498,7 +2501,7 @@
             </a:ln>
             <a:extLst>
               <a:ext uri="{91240B29-F687-4f45-9708-019B960494DF}">
-                <a14:hiddenLine xmlns:a14="http://schemas.microsoft.com/office/drawing/2010/main" xmlns="" w="9525">
+                <a14:hiddenLine xmlns="" xmlns:a14="http://schemas.microsoft.com/office/drawing/2010/main" w="9525">
                   <a:solidFill>
                     <a:srgbClr val="000000"/>
                   </a:solidFill>
@@ -2560,7 +2563,7 @@
             </a:ln>
             <a:extLst>
               <a:ext uri="{91240B29-F687-4f45-9708-019B960494DF}">
-                <a14:hiddenLine xmlns:a14="http://schemas.microsoft.com/office/drawing/2010/main" xmlns="" w="9525">
+                <a14:hiddenLine xmlns="" xmlns:a14="http://schemas.microsoft.com/office/drawing/2010/main" w="9525">
                   <a:solidFill>
                     <a:srgbClr val="000000"/>
                   </a:solidFill>
@@ -2650,7 +2653,7 @@
             </a:ln>
             <a:extLst>
               <a:ext uri="{91240B29-F687-4f45-9708-019B960494DF}">
-                <a14:hiddenLine xmlns:a14="http://schemas.microsoft.com/office/drawing/2010/main" xmlns="" w="9525">
+                <a14:hiddenLine xmlns="" xmlns:a14="http://schemas.microsoft.com/office/drawing/2010/main" w="9525">
                   <a:solidFill>
                     <a:srgbClr val="000000"/>
                   </a:solidFill>
@@ -2718,7 +2721,7 @@
             </a:ln>
             <a:extLst>
               <a:ext uri="{91240B29-F687-4f45-9708-019B960494DF}">
-                <a14:hiddenLine xmlns:a14="http://schemas.microsoft.com/office/drawing/2010/main" xmlns="" w="9525">
+                <a14:hiddenLine xmlns="" xmlns:a14="http://schemas.microsoft.com/office/drawing/2010/main" w="9525">
                   <a:solidFill>
                     <a:srgbClr val="000000"/>
                   </a:solidFill>
@@ -2780,7 +2783,7 @@
             </a:ln>
             <a:extLst>
               <a:ext uri="{91240B29-F687-4f45-9708-019B960494DF}">
-                <a14:hiddenLine xmlns:a14="http://schemas.microsoft.com/office/drawing/2010/main" xmlns="" w="9525">
+                <a14:hiddenLine xmlns="" xmlns:a14="http://schemas.microsoft.com/office/drawing/2010/main" w="9525">
                   <a:solidFill>
                     <a:srgbClr val="000000"/>
                   </a:solidFill>
@@ -2870,7 +2873,7 @@
             </a:ln>
             <a:extLst>
               <a:ext uri="{91240B29-F687-4f45-9708-019B960494DF}">
-                <a14:hiddenLine xmlns:a14="http://schemas.microsoft.com/office/drawing/2010/main" xmlns="" w="9525">
+                <a14:hiddenLine xmlns="" xmlns:a14="http://schemas.microsoft.com/office/drawing/2010/main" w="9525">
                   <a:solidFill>
                     <a:srgbClr val="000000"/>
                   </a:solidFill>
@@ -2932,7 +2935,7 @@
             </a:ln>
             <a:extLst>
               <a:ext uri="{91240B29-F687-4f45-9708-019B960494DF}">
-                <a14:hiddenLine xmlns:a14="http://schemas.microsoft.com/office/drawing/2010/main" xmlns="" w="9525">
+                <a14:hiddenLine xmlns="" xmlns:a14="http://schemas.microsoft.com/office/drawing/2010/main" w="9525">
                   <a:solidFill>
                     <a:srgbClr val="000000"/>
                   </a:solidFill>
@@ -3022,7 +3025,7 @@
             </a:ln>
             <a:extLst>
               <a:ext uri="{91240B29-F687-4f45-9708-019B960494DF}">
-                <a14:hiddenLine xmlns:a14="http://schemas.microsoft.com/office/drawing/2010/main" xmlns="" w="9525">
+                <a14:hiddenLine xmlns="" xmlns:a14="http://schemas.microsoft.com/office/drawing/2010/main" w="9525">
                   <a:solidFill>
                     <a:srgbClr val="000000"/>
                   </a:solidFill>
@@ -3084,7 +3087,7 @@
             </a:ln>
             <a:extLst>
               <a:ext uri="{91240B29-F687-4f45-9708-019B960494DF}">
-                <a14:hiddenLine xmlns:a14="http://schemas.microsoft.com/office/drawing/2010/main" xmlns="" w="9525">
+                <a14:hiddenLine xmlns="" xmlns:a14="http://schemas.microsoft.com/office/drawing/2010/main" w="9525">
                   <a:solidFill>
                     <a:srgbClr val="000000"/>
                   </a:solidFill>
@@ -3174,7 +3177,7 @@
             </a:ln>
             <a:extLst>
               <a:ext uri="{91240B29-F687-4f45-9708-019B960494DF}">
-                <a14:hiddenLine xmlns:a14="http://schemas.microsoft.com/office/drawing/2010/main" xmlns="" w="9525">
+                <a14:hiddenLine xmlns="" xmlns:a14="http://schemas.microsoft.com/office/drawing/2010/main" w="9525">
                   <a:solidFill>
                     <a:srgbClr val="000000"/>
                   </a:solidFill>
@@ -3208,7 +3211,7 @@
             </a:ln>
             <a:extLst>
               <a:ext uri="{91240B29-F687-4f45-9708-019B960494DF}">
-                <a14:hiddenLine xmlns:a14="http://schemas.microsoft.com/office/drawing/2010/main" xmlns="" w="9525">
+                <a14:hiddenLine xmlns="" xmlns:a14="http://schemas.microsoft.com/office/drawing/2010/main" w="9525">
                   <a:solidFill>
                     <a:srgbClr val="000000"/>
                   </a:solidFill>
@@ -3273,7 +3276,7 @@
             </a:ln>
             <a:extLst>
               <a:ext uri="{91240B29-F687-4f45-9708-019B960494DF}">
-                <a14:hiddenLine xmlns:a14="http://schemas.microsoft.com/office/drawing/2010/main" xmlns="" w="9525">
+                <a14:hiddenLine xmlns="" xmlns:a14="http://schemas.microsoft.com/office/drawing/2010/main" w="9525">
                   <a:solidFill>
                     <a:srgbClr val="000000"/>
                   </a:solidFill>
@@ -3363,7 +3366,7 @@
             </a:ln>
             <a:extLst>
               <a:ext uri="{91240B29-F687-4f45-9708-019B960494DF}">
-                <a14:hiddenLine xmlns:a14="http://schemas.microsoft.com/office/drawing/2010/main" xmlns="" w="9525">
+                <a14:hiddenLine xmlns="" xmlns:a14="http://schemas.microsoft.com/office/drawing/2010/main" w="9525">
                   <a:solidFill>
                     <a:srgbClr val="000000"/>
                   </a:solidFill>
@@ -3425,7 +3428,7 @@
             </a:ln>
             <a:extLst>
               <a:ext uri="{91240B29-F687-4f45-9708-019B960494DF}">
-                <a14:hiddenLine xmlns:a14="http://schemas.microsoft.com/office/drawing/2010/main" xmlns="" w="9525">
+                <a14:hiddenLine xmlns="" xmlns:a14="http://schemas.microsoft.com/office/drawing/2010/main" w="9525">
                   <a:solidFill>
                     <a:srgbClr val="000000"/>
                   </a:solidFill>
@@ -3515,7 +3518,7 @@
             </a:ln>
             <a:extLst>
               <a:ext uri="{91240B29-F687-4f45-9708-019B960494DF}">
-                <a14:hiddenLine xmlns:a14="http://schemas.microsoft.com/office/drawing/2010/main" xmlns="" w="9525">
+                <a14:hiddenLine xmlns="" xmlns:a14="http://schemas.microsoft.com/office/drawing/2010/main" w="9525">
                   <a:solidFill>
                     <a:srgbClr val="000000"/>
                   </a:solidFill>
@@ -3605,7 +3608,7 @@
             </a:ln>
             <a:extLst>
               <a:ext uri="{91240B29-F687-4f45-9708-019B960494DF}">
-                <a14:hiddenLine xmlns:a14="http://schemas.microsoft.com/office/drawing/2010/main" xmlns="" w="9525">
+                <a14:hiddenLine xmlns="" xmlns:a14="http://schemas.microsoft.com/office/drawing/2010/main" w="9525">
                   <a:solidFill>
                     <a:srgbClr val="000000"/>
                   </a:solidFill>
@@ -3670,7 +3673,7 @@
             </a:ln>
             <a:extLst>
               <a:ext uri="{91240B29-F687-4f45-9708-019B960494DF}">
-                <a14:hiddenLine xmlns:a14="http://schemas.microsoft.com/office/drawing/2010/main" xmlns="" w="9525">
+                <a14:hiddenLine xmlns="" xmlns:a14="http://schemas.microsoft.com/office/drawing/2010/main" w="9525">
                   <a:solidFill>
                     <a:srgbClr val="000000"/>
                   </a:solidFill>
@@ -3732,7 +3735,7 @@
             </a:ln>
             <a:extLst>
               <a:ext uri="{91240B29-F687-4f45-9708-019B960494DF}">
-                <a14:hiddenLine xmlns:a14="http://schemas.microsoft.com/office/drawing/2010/main" xmlns="" w="9525">
+                <a14:hiddenLine xmlns="" xmlns:a14="http://schemas.microsoft.com/office/drawing/2010/main" w="9525">
                   <a:solidFill>
                     <a:srgbClr val="000000"/>
                   </a:solidFill>
@@ -3822,7 +3825,7 @@
             </a:ln>
             <a:extLst>
               <a:ext uri="{91240B29-F687-4f45-9708-019B960494DF}">
-                <a14:hiddenLine xmlns:a14="http://schemas.microsoft.com/office/drawing/2010/main" xmlns="" w="9525">
+                <a14:hiddenLine xmlns="" xmlns:a14="http://schemas.microsoft.com/office/drawing/2010/main" w="9525">
                   <a:solidFill>
                     <a:srgbClr val="000000"/>
                   </a:solidFill>
@@ -3912,7 +3915,7 @@
             </a:ln>
             <a:extLst>
               <a:ext uri="{91240B29-F687-4f45-9708-019B960494DF}">
-                <a14:hiddenLine xmlns:a14="http://schemas.microsoft.com/office/drawing/2010/main" xmlns="" w="9525">
+                <a14:hiddenLine xmlns="" xmlns:a14="http://schemas.microsoft.com/office/drawing/2010/main" w="9525">
                   <a:solidFill>
                     <a:srgbClr val="000000"/>
                   </a:solidFill>
@@ -3974,7 +3977,7 @@
             </a:ln>
             <a:extLst>
               <a:ext uri="{91240B29-F687-4f45-9708-019B960494DF}">
-                <a14:hiddenLine xmlns:a14="http://schemas.microsoft.com/office/drawing/2010/main" xmlns="" w="9525">
+                <a14:hiddenLine xmlns="" xmlns:a14="http://schemas.microsoft.com/office/drawing/2010/main" w="9525">
                   <a:solidFill>
                     <a:srgbClr val="000000"/>
                   </a:solidFill>
@@ -4094,7 +4097,7 @@
             </a:ln>
             <a:extLst>
               <a:ext uri="{91240B29-F687-4f45-9708-019B960494DF}">
-                <a14:hiddenLine xmlns:a14="http://schemas.microsoft.com/office/drawing/2010/main" xmlns="" w="9525">
+                <a14:hiddenLine xmlns="" xmlns:a14="http://schemas.microsoft.com/office/drawing/2010/main" w="9525">
                   <a:solidFill>
                     <a:srgbClr val="000000"/>
                   </a:solidFill>
@@ -4162,7 +4165,7 @@
             </a:ln>
             <a:extLst>
               <a:ext uri="{91240B29-F687-4f45-9708-019B960494DF}">
-                <a14:hiddenLine xmlns:a14="http://schemas.microsoft.com/office/drawing/2010/main" xmlns="" w="9525">
+                <a14:hiddenLine xmlns="" xmlns:a14="http://schemas.microsoft.com/office/drawing/2010/main" w="9525">
                   <a:solidFill>
                     <a:srgbClr val="000000"/>
                   </a:solidFill>
@@ -4252,7 +4255,7 @@
             </a:ln>
             <a:extLst>
               <a:ext uri="{91240B29-F687-4f45-9708-019B960494DF}">
-                <a14:hiddenLine xmlns:a14="http://schemas.microsoft.com/office/drawing/2010/main" xmlns="" w="9525">
+                <a14:hiddenLine xmlns="" xmlns:a14="http://schemas.microsoft.com/office/drawing/2010/main" w="9525">
                   <a:solidFill>
                     <a:srgbClr val="000000"/>
                   </a:solidFill>
@@ -8974,7 +8977,7 @@
           <a:noFill/>
           <a:extLst>
             <a:ext uri="{909E8E84-426E-40dd-AFC4-6F175D3DCCD1}">
-              <a14:hiddenFill xmlns:a14="http://schemas.microsoft.com/office/drawing/2010/main" xmlns="">
+              <a14:hiddenFill xmlns="" xmlns:a14="http://schemas.microsoft.com/office/drawing/2010/main">
                 <a:solidFill>
                   <a:srgbClr val="FFFFFF"/>
                 </a:solidFill>
@@ -9048,7 +9051,7 @@
               </a:ln>
               <a:extLst>
                 <a:ext uri="{91240B29-F687-4f45-9708-019B960494DF}">
-                  <a14:hiddenLine xmlns:a14="http://schemas.microsoft.com/office/drawing/2010/main" xmlns="" w="9525">
+                  <a14:hiddenLine xmlns="" xmlns:a14="http://schemas.microsoft.com/office/drawing/2010/main" w="9525">
                     <a:solidFill>
                       <a:srgbClr val="000000"/>
                     </a:solidFill>
@@ -9138,7 +9141,7 @@
               </a:ln>
               <a:extLst>
                 <a:ext uri="{91240B29-F687-4f45-9708-019B960494DF}">
-                  <a14:hiddenLine xmlns:a14="http://schemas.microsoft.com/office/drawing/2010/main" xmlns="" w="9525">
+                  <a14:hiddenLine xmlns="" xmlns:a14="http://schemas.microsoft.com/office/drawing/2010/main" w="9525">
                     <a:solidFill>
                       <a:srgbClr val="000000"/>
                     </a:solidFill>
@@ -9228,7 +9231,7 @@
               </a:ln>
               <a:extLst>
                 <a:ext uri="{91240B29-F687-4f45-9708-019B960494DF}">
-                  <a14:hiddenLine xmlns:a14="http://schemas.microsoft.com/office/drawing/2010/main" xmlns="" w="9525">
+                  <a14:hiddenLine xmlns="" xmlns:a14="http://schemas.microsoft.com/office/drawing/2010/main" w="9525">
                     <a:solidFill>
                       <a:srgbClr val="000000"/>
                     </a:solidFill>
@@ -9290,7 +9293,7 @@
               </a:ln>
               <a:extLst>
                 <a:ext uri="{91240B29-F687-4f45-9708-019B960494DF}">
-                  <a14:hiddenLine xmlns:a14="http://schemas.microsoft.com/office/drawing/2010/main" xmlns="" w="9525">
+                  <a14:hiddenLine xmlns="" xmlns:a14="http://schemas.microsoft.com/office/drawing/2010/main" w="9525">
                     <a:solidFill>
                       <a:srgbClr val="000000"/>
                     </a:solidFill>
@@ -9380,7 +9383,7 @@
               </a:ln>
               <a:extLst>
                 <a:ext uri="{91240B29-F687-4f45-9708-019B960494DF}">
-                  <a14:hiddenLine xmlns:a14="http://schemas.microsoft.com/office/drawing/2010/main" xmlns="" w="9525">
+                  <a14:hiddenLine xmlns="" xmlns:a14="http://schemas.microsoft.com/office/drawing/2010/main" w="9525">
                     <a:solidFill>
                       <a:srgbClr val="000000"/>
                     </a:solidFill>
@@ -9442,7 +9445,7 @@
               </a:ln>
               <a:extLst>
                 <a:ext uri="{91240B29-F687-4f45-9708-019B960494DF}">
-                  <a14:hiddenLine xmlns:a14="http://schemas.microsoft.com/office/drawing/2010/main" xmlns="" w="9525">
+                  <a14:hiddenLine xmlns="" xmlns:a14="http://schemas.microsoft.com/office/drawing/2010/main" w="9525">
                     <a:solidFill>
                       <a:srgbClr val="000000"/>
                     </a:solidFill>
@@ -9504,7 +9507,7 @@
               </a:ln>
               <a:extLst>
                 <a:ext uri="{91240B29-F687-4f45-9708-019B960494DF}">
-                  <a14:hiddenLine xmlns:a14="http://schemas.microsoft.com/office/drawing/2010/main" xmlns="" w="9525">
+                  <a14:hiddenLine xmlns="" xmlns:a14="http://schemas.microsoft.com/office/drawing/2010/main" w="9525">
                     <a:solidFill>
                       <a:srgbClr val="000000"/>
                     </a:solidFill>
@@ -9594,7 +9597,7 @@
               </a:ln>
               <a:extLst>
                 <a:ext uri="{91240B29-F687-4f45-9708-019B960494DF}">
-                  <a14:hiddenLine xmlns:a14="http://schemas.microsoft.com/office/drawing/2010/main" xmlns="" w="9525">
+                  <a14:hiddenLine xmlns="" xmlns:a14="http://schemas.microsoft.com/office/drawing/2010/main" w="9525">
                     <a:solidFill>
                       <a:srgbClr val="000000"/>
                     </a:solidFill>
@@ -9684,7 +9687,7 @@
               </a:ln>
               <a:extLst>
                 <a:ext uri="{91240B29-F687-4f45-9708-019B960494DF}">
-                  <a14:hiddenLine xmlns:a14="http://schemas.microsoft.com/office/drawing/2010/main" xmlns="" w="9525">
+                  <a14:hiddenLine xmlns="" xmlns:a14="http://schemas.microsoft.com/office/drawing/2010/main" w="9525">
                     <a:solidFill>
                       <a:srgbClr val="000000"/>
                     </a:solidFill>
@@ -9746,7 +9749,7 @@
               </a:ln>
               <a:extLst>
                 <a:ext uri="{91240B29-F687-4f45-9708-019B960494DF}">
-                  <a14:hiddenLine xmlns:a14="http://schemas.microsoft.com/office/drawing/2010/main" xmlns="" w="9525">
+                  <a14:hiddenLine xmlns="" xmlns:a14="http://schemas.microsoft.com/office/drawing/2010/main" w="9525">
                     <a:solidFill>
                       <a:srgbClr val="000000"/>
                     </a:solidFill>
@@ -9856,7 +9859,7 @@
               </a:ln>
               <a:extLst>
                 <a:ext uri="{91240B29-F687-4f45-9708-019B960494DF}">
-                  <a14:hiddenLine xmlns:a14="http://schemas.microsoft.com/office/drawing/2010/main" xmlns="" w="9525">
+                  <a14:hiddenLine xmlns="" xmlns:a14="http://schemas.microsoft.com/office/drawing/2010/main" w="9525">
                     <a:solidFill>
                       <a:srgbClr val="000000"/>
                     </a:solidFill>
@@ -9940,7 +9943,7 @@
               </a:ln>
               <a:extLst>
                 <a:ext uri="{91240B29-F687-4f45-9708-019B960494DF}">
-                  <a14:hiddenLine xmlns:a14="http://schemas.microsoft.com/office/drawing/2010/main" xmlns="" w="9525">
+                  <a14:hiddenLine xmlns="" xmlns:a14="http://schemas.microsoft.com/office/drawing/2010/main" w="9525">
                     <a:solidFill>
                       <a:srgbClr val="000000"/>
                     </a:solidFill>
@@ -10002,7 +10005,7 @@
               </a:ln>
               <a:extLst>
                 <a:ext uri="{91240B29-F687-4f45-9708-019B960494DF}">
-                  <a14:hiddenLine xmlns:a14="http://schemas.microsoft.com/office/drawing/2010/main" xmlns="" w="9525">
+                  <a14:hiddenLine xmlns="" xmlns:a14="http://schemas.microsoft.com/office/drawing/2010/main" w="9525">
                     <a:solidFill>
                       <a:srgbClr val="000000"/>
                     </a:solidFill>
@@ -10064,7 +10067,7 @@
               </a:ln>
               <a:extLst>
                 <a:ext uri="{91240B29-F687-4f45-9708-019B960494DF}">
-                  <a14:hiddenLine xmlns:a14="http://schemas.microsoft.com/office/drawing/2010/main" xmlns="" w="9525">
+                  <a14:hiddenLine xmlns="" xmlns:a14="http://schemas.microsoft.com/office/drawing/2010/main" w="9525">
                     <a:solidFill>
                       <a:srgbClr val="000000"/>
                     </a:solidFill>
@@ -10154,7 +10157,7 @@
               </a:ln>
               <a:extLst>
                 <a:ext uri="{91240B29-F687-4f45-9708-019B960494DF}">
-                  <a14:hiddenLine xmlns:a14="http://schemas.microsoft.com/office/drawing/2010/main" xmlns="" w="9525">
+                  <a14:hiddenLine xmlns="" xmlns:a14="http://schemas.microsoft.com/office/drawing/2010/main" w="9525">
                     <a:solidFill>
                       <a:srgbClr val="000000"/>
                     </a:solidFill>
@@ -10188,7 +10191,7 @@
               </a:ln>
               <a:extLst>
                 <a:ext uri="{91240B29-F687-4f45-9708-019B960494DF}">
-                  <a14:hiddenLine xmlns:a14="http://schemas.microsoft.com/office/drawing/2010/main" xmlns="" w="9525">
+                  <a14:hiddenLine xmlns="" xmlns:a14="http://schemas.microsoft.com/office/drawing/2010/main" w="9525">
                     <a:solidFill>
                       <a:srgbClr val="000000"/>
                     </a:solidFill>
@@ -10253,7 +10256,7 @@
               </a:ln>
               <a:extLst>
                 <a:ext uri="{91240B29-F687-4f45-9708-019B960494DF}">
-                  <a14:hiddenLine xmlns:a14="http://schemas.microsoft.com/office/drawing/2010/main" xmlns="" w="9525">
+                  <a14:hiddenLine xmlns="" xmlns:a14="http://schemas.microsoft.com/office/drawing/2010/main" w="9525">
                     <a:solidFill>
                       <a:srgbClr val="000000"/>
                     </a:solidFill>
@@ -10343,7 +10346,7 @@
               </a:ln>
               <a:extLst>
                 <a:ext uri="{91240B29-F687-4f45-9708-019B960494DF}">
-                  <a14:hiddenLine xmlns:a14="http://schemas.microsoft.com/office/drawing/2010/main" xmlns="" w="9525">
+                  <a14:hiddenLine xmlns="" xmlns:a14="http://schemas.microsoft.com/office/drawing/2010/main" w="9525">
                     <a:solidFill>
                       <a:srgbClr val="000000"/>
                     </a:solidFill>
@@ -10405,7 +10408,7 @@
               </a:ln>
               <a:extLst>
                 <a:ext uri="{91240B29-F687-4f45-9708-019B960494DF}">
-                  <a14:hiddenLine xmlns:a14="http://schemas.microsoft.com/office/drawing/2010/main" xmlns="" w="9525">
+                  <a14:hiddenLine xmlns="" xmlns:a14="http://schemas.microsoft.com/office/drawing/2010/main" w="9525">
                     <a:solidFill>
                       <a:srgbClr val="000000"/>
                     </a:solidFill>
@@ -10495,7 +10498,7 @@
               </a:ln>
               <a:extLst>
                 <a:ext uri="{91240B29-F687-4f45-9708-019B960494DF}">
-                  <a14:hiddenLine xmlns:a14="http://schemas.microsoft.com/office/drawing/2010/main" xmlns="" w="9525">
+                  <a14:hiddenLine xmlns="" xmlns:a14="http://schemas.microsoft.com/office/drawing/2010/main" w="9525">
                     <a:solidFill>
                       <a:srgbClr val="000000"/>
                     </a:solidFill>
@@ -10560,7 +10563,7 @@
               </a:ln>
               <a:extLst>
                 <a:ext uri="{91240B29-F687-4f45-9708-019B960494DF}">
-                  <a14:hiddenLine xmlns:a14="http://schemas.microsoft.com/office/drawing/2010/main" xmlns="" w="9525">
+                  <a14:hiddenLine xmlns="" xmlns:a14="http://schemas.microsoft.com/office/drawing/2010/main" w="9525">
                     <a:solidFill>
                       <a:srgbClr val="000000"/>
                     </a:solidFill>
@@ -10622,7 +10625,7 @@
               </a:ln>
               <a:extLst>
                 <a:ext uri="{91240B29-F687-4f45-9708-019B960494DF}">
-                  <a14:hiddenLine xmlns:a14="http://schemas.microsoft.com/office/drawing/2010/main" xmlns="" w="9525">
+                  <a14:hiddenLine xmlns="" xmlns:a14="http://schemas.microsoft.com/office/drawing/2010/main" w="9525">
                     <a:solidFill>
                       <a:srgbClr val="000000"/>
                     </a:solidFill>
@@ -10712,7 +10715,7 @@
               </a:ln>
               <a:extLst>
                 <a:ext uri="{91240B29-F687-4f45-9708-019B960494DF}">
-                  <a14:hiddenLine xmlns:a14="http://schemas.microsoft.com/office/drawing/2010/main" xmlns="" w="9525">
+                  <a14:hiddenLine xmlns="" xmlns:a14="http://schemas.microsoft.com/office/drawing/2010/main" w="9525">
                     <a:solidFill>
                       <a:srgbClr val="000000"/>
                     </a:solidFill>
@@ -10802,7 +10805,7 @@
               </a:ln>
               <a:extLst>
                 <a:ext uri="{91240B29-F687-4f45-9708-019B960494DF}">
-                  <a14:hiddenLine xmlns:a14="http://schemas.microsoft.com/office/drawing/2010/main" xmlns="" w="9525">
+                  <a14:hiddenLine xmlns="" xmlns:a14="http://schemas.microsoft.com/office/drawing/2010/main" w="9525">
                     <a:solidFill>
                       <a:srgbClr val="000000"/>
                     </a:solidFill>
@@ -10867,7 +10870,7 @@
               </a:ln>
               <a:extLst>
                 <a:ext uri="{91240B29-F687-4f45-9708-019B960494DF}">
-                  <a14:hiddenLine xmlns:a14="http://schemas.microsoft.com/office/drawing/2010/main" xmlns="" w="9525">
+                  <a14:hiddenLine xmlns="" xmlns:a14="http://schemas.microsoft.com/office/drawing/2010/main" w="9525">
                     <a:solidFill>
                       <a:srgbClr val="000000"/>
                     </a:solidFill>
@@ -10987,7 +10990,7 @@
               </a:ln>
               <a:extLst>
                 <a:ext uri="{91240B29-F687-4f45-9708-019B960494DF}">
-                  <a14:hiddenLine xmlns:a14="http://schemas.microsoft.com/office/drawing/2010/main" xmlns="" w="9525">
+                  <a14:hiddenLine xmlns="" xmlns:a14="http://schemas.microsoft.com/office/drawing/2010/main" w="9525">
                     <a:solidFill>
                       <a:srgbClr val="000000"/>
                     </a:solidFill>
@@ -11085,7 +11088,7 @@
               </a:ln>
               <a:extLst>
                 <a:ext uri="{91240B29-F687-4f45-9708-019B960494DF}">
-                  <a14:hiddenLine xmlns:a14="http://schemas.microsoft.com/office/drawing/2010/main" xmlns="" w="9525">
+                  <a14:hiddenLine xmlns="" xmlns:a14="http://schemas.microsoft.com/office/drawing/2010/main" w="9525">
                     <a:solidFill>
                       <a:srgbClr val="000000"/>
                     </a:solidFill>
@@ -11200,7 +11203,7 @@
               </a:ln>
               <a:extLst>
                 <a:ext uri="{91240B29-F687-4f45-9708-019B960494DF}">
-                  <a14:hiddenLine xmlns:a14="http://schemas.microsoft.com/office/drawing/2010/main" xmlns="" w="9525">
+                  <a14:hiddenLine xmlns="" xmlns:a14="http://schemas.microsoft.com/office/drawing/2010/main" w="9525">
                     <a:solidFill>
                       <a:srgbClr val="000000"/>
                     </a:solidFill>
@@ -11290,7 +11293,7 @@
               </a:ln>
               <a:extLst>
                 <a:ext uri="{91240B29-F687-4f45-9708-019B960494DF}">
-                  <a14:hiddenLine xmlns:a14="http://schemas.microsoft.com/office/drawing/2010/main" xmlns="" w="9525">
+                  <a14:hiddenLine xmlns="" xmlns:a14="http://schemas.microsoft.com/office/drawing/2010/main" w="9525">
                     <a:solidFill>
                       <a:srgbClr val="000000"/>
                     </a:solidFill>
@@ -11355,7 +11358,7 @@
               </a:ln>
               <a:extLst>
                 <a:ext uri="{91240B29-F687-4f45-9708-019B960494DF}">
-                  <a14:hiddenLine xmlns:a14="http://schemas.microsoft.com/office/drawing/2010/main" xmlns="" w="9525">
+                  <a14:hiddenLine xmlns="" xmlns:a14="http://schemas.microsoft.com/office/drawing/2010/main" w="9525">
                     <a:solidFill>
                       <a:srgbClr val="000000"/>
                     </a:solidFill>
@@ -11445,7 +11448,7 @@
               </a:ln>
               <a:extLst>
                 <a:ext uri="{91240B29-F687-4f45-9708-019B960494DF}">
-                  <a14:hiddenLine xmlns:a14="http://schemas.microsoft.com/office/drawing/2010/main" xmlns="" w="9525">
+                  <a14:hiddenLine xmlns="" xmlns:a14="http://schemas.microsoft.com/office/drawing/2010/main" w="9525">
                     <a:solidFill>
                       <a:srgbClr val="000000"/>
                     </a:solidFill>
@@ -11513,7 +11516,7 @@
               </a:ln>
               <a:extLst>
                 <a:ext uri="{91240B29-F687-4f45-9708-019B960494DF}">
-                  <a14:hiddenLine xmlns:a14="http://schemas.microsoft.com/office/drawing/2010/main" xmlns="" w="9525">
+                  <a14:hiddenLine xmlns="" xmlns:a14="http://schemas.microsoft.com/office/drawing/2010/main" w="9525">
                     <a:solidFill>
                       <a:srgbClr val="000000"/>
                     </a:solidFill>
@@ -11603,7 +11606,7 @@
               </a:ln>
               <a:extLst>
                 <a:ext uri="{91240B29-F687-4f45-9708-019B960494DF}">
-                  <a14:hiddenLine xmlns:a14="http://schemas.microsoft.com/office/drawing/2010/main" xmlns="" w="9525">
+                  <a14:hiddenLine xmlns="" xmlns:a14="http://schemas.microsoft.com/office/drawing/2010/main" w="9525">
                     <a:solidFill>
                       <a:srgbClr val="000000"/>
                     </a:solidFill>
@@ -11671,7 +11674,7 @@
               </a:ln>
               <a:extLst>
                 <a:ext uri="{91240B29-F687-4f45-9708-019B960494DF}">
-                  <a14:hiddenLine xmlns:a14="http://schemas.microsoft.com/office/drawing/2010/main" xmlns="" w="9525">
+                  <a14:hiddenLine xmlns="" xmlns:a14="http://schemas.microsoft.com/office/drawing/2010/main" w="9525">
                     <a:solidFill>
                       <a:srgbClr val="000000"/>
                     </a:solidFill>
@@ -11761,7 +11764,7 @@
               </a:ln>
               <a:extLst>
                 <a:ext uri="{91240B29-F687-4f45-9708-019B960494DF}">
-                  <a14:hiddenLine xmlns:a14="http://schemas.microsoft.com/office/drawing/2010/main" xmlns="" w="9525">
+                  <a14:hiddenLine xmlns="" xmlns:a14="http://schemas.microsoft.com/office/drawing/2010/main" w="9525">
                     <a:solidFill>
                       <a:srgbClr val="000000"/>
                     </a:solidFill>
@@ -11795,7 +11798,7 @@
               </a:ln>
               <a:extLst>
                 <a:ext uri="{91240B29-F687-4f45-9708-019B960494DF}">
-                  <a14:hiddenLine xmlns:a14="http://schemas.microsoft.com/office/drawing/2010/main" xmlns="" w="9525">
+                  <a14:hiddenLine xmlns="" xmlns:a14="http://schemas.microsoft.com/office/drawing/2010/main" w="9525">
                     <a:solidFill>
                       <a:srgbClr val="000000"/>
                     </a:solidFill>
@@ -12472,6 +12475,13 @@
   <p:clrMapOvr>
     <a:masterClrMapping/>
   </p:clrMapOvr>
+  <p:timing>
+    <p:tnLst>
+      <p:par>
+        <p:cTn id="1" dur="indefinite" restart="never" nodeType="tmRoot"/>
+      </p:par>
+    </p:tnLst>
+  </p:timing>
 </p:sld>
 </file>
 
@@ -15299,6 +15309,1689 @@
 </p:sld>
 </file>
 
+<file path=ppt/slides/slide6.xml><?xml version="1.0" encoding="utf-8"?>
+<p:sld xmlns:a="http://schemas.openxmlformats.org/drawingml/2006/main" xmlns:r="http://schemas.openxmlformats.org/officeDocument/2006/relationships" xmlns:p="http://schemas.openxmlformats.org/presentationml/2006/main">
+  <p:cSld>
+    <p:spTree>
+      <p:nvGrpSpPr>
+        <p:cNvPr id="1" name=""/>
+        <p:cNvGrpSpPr/>
+        <p:nvPr/>
+      </p:nvGrpSpPr>
+      <p:grpSpPr>
+        <a:xfrm>
+          <a:off x="0" y="0"/>
+          <a:ext cx="0" cy="0"/>
+          <a:chOff x="0" y="0"/>
+          <a:chExt cx="0" cy="0"/>
+        </a:xfrm>
+      </p:grpSpPr>
+      <p:sp>
+        <p:nvSpPr>
+          <p:cNvPr id="2" name="Titre 1"/>
+          <p:cNvSpPr>
+            <a:spLocks noGrp="1"/>
+          </p:cNvSpPr>
+          <p:nvPr>
+            <p:ph type="title"/>
+          </p:nvPr>
+        </p:nvSpPr>
+        <p:spPr/>
+        <p:txBody>
+          <a:bodyPr/>
+          <a:lstStyle/>
+          <a:p>
+            <a:r>
+              <a:rPr lang="fr-FR" dirty="0" smtClean="0"/>
+              <a:t>Maquettes fonctionnelles</a:t>
+            </a:r>
+            <a:endParaRPr lang="fr-FR" dirty="0"/>
+          </a:p>
+        </p:txBody>
+      </p:sp>
+      <p:sp>
+        <p:nvSpPr>
+          <p:cNvPr id="3" name="Espace réservé du contenu 2"/>
+          <p:cNvSpPr>
+            <a:spLocks noGrp="1"/>
+          </p:cNvSpPr>
+          <p:nvPr>
+            <p:ph sz="half" idx="1"/>
+          </p:nvPr>
+        </p:nvSpPr>
+        <p:spPr/>
+        <p:txBody>
+          <a:bodyPr>
+            <a:normAutofit fontScale="92500" lnSpcReduction="10000"/>
+          </a:bodyPr>
+          <a:lstStyle/>
+          <a:p>
+            <a:pPr marL="0" indent="0">
+              <a:buNone/>
+            </a:pPr>
+            <a:r>
+              <a:rPr lang="fr-FR" dirty="0" smtClean="0"/>
+              <a:t>Mobile</a:t>
+            </a:r>
+          </a:p>
+          <a:p>
+            <a:pPr>
+              <a:buFontTx/>
+              <a:buChar char="-"/>
+            </a:pPr>
+            <a:r>
+              <a:rPr lang="fr-FR" dirty="0" smtClean="0">
+                <a:hlinkClick r:id="rId2" action="ppaction://hlinkfile"/>
+              </a:rPr>
+              <a:t>Page de connexion</a:t>
+            </a:r>
+            <a:endParaRPr lang="fr-FR" dirty="0" smtClean="0"/>
+          </a:p>
+          <a:p>
+            <a:pPr>
+              <a:buFontTx/>
+              <a:buChar char="-"/>
+            </a:pPr>
+            <a:r>
+              <a:rPr lang="fr-FR" dirty="0" smtClean="0">
+                <a:hlinkClick r:id="rId3" action="ppaction://hlinkfile"/>
+              </a:rPr>
+              <a:t>Page de tableau de bord</a:t>
+            </a:r>
+            <a:endParaRPr lang="fr-FR" dirty="0" smtClean="0"/>
+          </a:p>
+          <a:p>
+            <a:pPr>
+              <a:buFontTx/>
+              <a:buChar char="-"/>
+            </a:pPr>
+            <a:r>
+              <a:rPr lang="fr-FR" dirty="0" smtClean="0">
+                <a:hlinkClick r:id="rId4" action="ppaction://hlinkfile"/>
+              </a:rPr>
+              <a:t>Page d’interface de chat</a:t>
+            </a:r>
+            <a:endParaRPr lang="fr-FR" dirty="0" smtClean="0"/>
+          </a:p>
+          <a:p>
+            <a:pPr>
+              <a:buFontTx/>
+              <a:buChar char="-"/>
+            </a:pPr>
+            <a:r>
+              <a:rPr lang="fr-FR" dirty="0" smtClean="0">
+                <a:hlinkClick r:id="rId5" action="ppaction://hlinkfile"/>
+              </a:rPr>
+              <a:t>Page de calendrier</a:t>
+            </a:r>
+            <a:endParaRPr lang="fr-FR" dirty="0" smtClean="0"/>
+          </a:p>
+          <a:p>
+            <a:pPr>
+              <a:buFontTx/>
+              <a:buChar char="-"/>
+            </a:pPr>
+            <a:r>
+              <a:rPr lang="fr-FR" dirty="0" smtClean="0">
+                <a:hlinkClick r:id="rId6" action="ppaction://hlinkfile"/>
+              </a:rPr>
+              <a:t>Page de gestion des tâches</a:t>
+            </a:r>
+            <a:endParaRPr lang="fr-FR" dirty="0" smtClean="0"/>
+          </a:p>
+          <a:p>
+            <a:pPr marL="0" indent="0">
+              <a:buNone/>
+            </a:pPr>
+            <a:r>
+              <a:rPr lang="fr-FR" dirty="0" smtClean="0">
+                <a:sym typeface="Wingdings" panose="05000000000000000000" pitchFamily="2" charset="2"/>
+                <a:hlinkClick r:id="rId7" action="ppaction://hlinkfile"/>
+              </a:rPr>
+              <a:t> </a:t>
+            </a:r>
+            <a:r>
+              <a:rPr lang="fr-FR" dirty="0" smtClean="0">
+                <a:sym typeface="Wingdings" panose="05000000000000000000" pitchFamily="2" charset="2"/>
+              </a:rPr>
+              <a:t>Démo</a:t>
+            </a:r>
+            <a:endParaRPr lang="fr-FR" dirty="0"/>
+          </a:p>
+        </p:txBody>
+      </p:sp>
+      <p:sp>
+        <p:nvSpPr>
+          <p:cNvPr id="4" name="Espace réservé du contenu 3"/>
+          <p:cNvSpPr>
+            <a:spLocks noGrp="1"/>
+          </p:cNvSpPr>
+          <p:nvPr>
+            <p:ph sz="half" idx="2"/>
+          </p:nvPr>
+        </p:nvSpPr>
+        <p:spPr/>
+        <p:txBody>
+          <a:bodyPr>
+            <a:normAutofit fontScale="92500" lnSpcReduction="10000"/>
+          </a:bodyPr>
+          <a:lstStyle/>
+          <a:p>
+            <a:pPr marL="0" indent="0">
+              <a:buNone/>
+            </a:pPr>
+            <a:r>
+              <a:rPr lang="fr-FR" dirty="0" smtClean="0"/>
+              <a:t>Web</a:t>
+            </a:r>
+          </a:p>
+          <a:p>
+            <a:pPr>
+              <a:buFontTx/>
+              <a:buChar char="-"/>
+            </a:pPr>
+            <a:r>
+              <a:rPr lang="fr-FR" dirty="0">
+                <a:hlinkClick r:id="rId8" action="ppaction://hlinkfile"/>
+              </a:rPr>
+              <a:t>Page de connexion</a:t>
+            </a:r>
+            <a:endParaRPr lang="fr-FR" dirty="0"/>
+          </a:p>
+          <a:p>
+            <a:pPr>
+              <a:buFontTx/>
+              <a:buChar char="-"/>
+            </a:pPr>
+            <a:r>
+              <a:rPr lang="fr-FR" dirty="0">
+                <a:hlinkClick r:id="rId9" action="ppaction://hlinkfile"/>
+              </a:rPr>
+              <a:t>Page de tableau de bord</a:t>
+            </a:r>
+            <a:endParaRPr lang="fr-FR" dirty="0"/>
+          </a:p>
+          <a:p>
+            <a:pPr>
+              <a:buFontTx/>
+              <a:buChar char="-"/>
+            </a:pPr>
+            <a:r>
+              <a:rPr lang="fr-FR" dirty="0">
+                <a:hlinkClick r:id="rId10" action="ppaction://hlinkfile"/>
+              </a:rPr>
+              <a:t>Page d’interface de chat</a:t>
+            </a:r>
+            <a:endParaRPr lang="fr-FR" dirty="0"/>
+          </a:p>
+          <a:p>
+            <a:pPr>
+              <a:buFontTx/>
+              <a:buChar char="-"/>
+            </a:pPr>
+            <a:r>
+              <a:rPr lang="fr-FR" dirty="0">
+                <a:hlinkClick r:id="rId11" action="ppaction://hlinkfile"/>
+              </a:rPr>
+              <a:t>Page de calendrier</a:t>
+            </a:r>
+            <a:endParaRPr lang="fr-FR" dirty="0"/>
+          </a:p>
+          <a:p>
+            <a:pPr>
+              <a:buFontTx/>
+              <a:buChar char="-"/>
+            </a:pPr>
+            <a:r>
+              <a:rPr lang="fr-FR" dirty="0">
+                <a:hlinkClick r:id="rId12" action="ppaction://hlinkfile"/>
+              </a:rPr>
+              <a:t>Page de gestion des </a:t>
+            </a:r>
+            <a:r>
+              <a:rPr lang="fr-FR" dirty="0" smtClean="0">
+                <a:hlinkClick r:id="rId12" action="ppaction://hlinkfile"/>
+              </a:rPr>
+              <a:t>tâches</a:t>
+            </a:r>
+            <a:endParaRPr lang="fr-FR" dirty="0" smtClean="0"/>
+          </a:p>
+          <a:p>
+            <a:pPr marL="0" indent="0">
+              <a:buNone/>
+            </a:pPr>
+            <a:r>
+              <a:rPr lang="fr-FR" dirty="0" smtClean="0">
+                <a:sym typeface="Wingdings" panose="05000000000000000000" pitchFamily="2" charset="2"/>
+                <a:hlinkClick r:id="rId13" action="ppaction://hlinkfile"/>
+              </a:rPr>
+              <a:t> </a:t>
+            </a:r>
+            <a:r>
+              <a:rPr lang="fr-FR" dirty="0" smtClean="0">
+                <a:sym typeface="Wingdings" panose="05000000000000000000" pitchFamily="2" charset="2"/>
+              </a:rPr>
+              <a:t>Démo </a:t>
+            </a:r>
+            <a:endParaRPr lang="fr-FR" dirty="0"/>
+          </a:p>
+        </p:txBody>
+      </p:sp>
+    </p:spTree>
+    <p:extLst>
+      <p:ext uri="{BB962C8B-B14F-4D97-AF65-F5344CB8AC3E}">
+        <p14:creationId xmlns:p14="http://schemas.microsoft.com/office/powerpoint/2010/main" val="3174830398"/>
+      </p:ext>
+    </p:extLst>
+  </p:cSld>
+  <p:clrMapOvr>
+    <a:masterClrMapping/>
+  </p:clrMapOvr>
+  <p:timing>
+    <p:tnLst>
+      <p:par>
+        <p:cTn id="1" dur="indefinite" restart="never" nodeType="tmRoot">
+          <p:childTnLst>
+            <p:seq concurrent="1" nextAc="seek">
+              <p:cTn id="2" dur="indefinite" nodeType="mainSeq">
+                <p:childTnLst>
+                  <p:par>
+                    <p:cTn id="3" fill="hold">
+                      <p:stCondLst>
+                        <p:cond delay="indefinite"/>
+                        <p:cond evt="onBegin" delay="0">
+                          <p:tn val="2"/>
+                        </p:cond>
+                      </p:stCondLst>
+                      <p:childTnLst>
+                        <p:par>
+                          <p:cTn id="4" fill="hold">
+                            <p:stCondLst>
+                              <p:cond delay="0"/>
+                            </p:stCondLst>
+                            <p:childTnLst>
+                              <p:par>
+                                <p:cTn id="5" presetID="10" presetClass="entr" presetSubtype="0" fill="hold" grpId="0" nodeType="withEffect">
+                                  <p:stCondLst>
+                                    <p:cond delay="0"/>
+                                  </p:stCondLst>
+                                  <p:childTnLst>
+                                    <p:set>
+                                      <p:cBhvr>
+                                        <p:cTn id="6" dur="1" fill="hold">
+                                          <p:stCondLst>
+                                            <p:cond delay="0"/>
+                                          </p:stCondLst>
+                                        </p:cTn>
+                                        <p:tgtEl>
+                                          <p:spTgt spid="3">
+                                            <p:txEl>
+                                              <p:pRg st="0" end="0"/>
+                                            </p:txEl>
+                                          </p:spTgt>
+                                        </p:tgtEl>
+                                        <p:attrNameLst>
+                                          <p:attrName>style.visibility</p:attrName>
+                                        </p:attrNameLst>
+                                      </p:cBhvr>
+                                      <p:to>
+                                        <p:strVal val="visible"/>
+                                      </p:to>
+                                    </p:set>
+                                    <p:animEffect transition="in" filter="fade">
+                                      <p:cBhvr>
+                                        <p:cTn id="7" dur="500"/>
+                                        <p:tgtEl>
+                                          <p:spTgt spid="3">
+                                            <p:txEl>
+                                              <p:pRg st="0" end="0"/>
+                                            </p:txEl>
+                                          </p:spTgt>
+                                        </p:tgtEl>
+                                      </p:cBhvr>
+                                    </p:animEffect>
+                                  </p:childTnLst>
+                                </p:cTn>
+                              </p:par>
+                              <p:par>
+                                <p:cTn id="8" presetID="10" presetClass="entr" presetSubtype="0" fill="hold" grpId="0" nodeType="withEffect">
+                                  <p:stCondLst>
+                                    <p:cond delay="0"/>
+                                  </p:stCondLst>
+                                  <p:childTnLst>
+                                    <p:set>
+                                      <p:cBhvr>
+                                        <p:cTn id="9" dur="1" fill="hold">
+                                          <p:stCondLst>
+                                            <p:cond delay="0"/>
+                                          </p:stCondLst>
+                                        </p:cTn>
+                                        <p:tgtEl>
+                                          <p:spTgt spid="3">
+                                            <p:txEl>
+                                              <p:pRg st="1" end="1"/>
+                                            </p:txEl>
+                                          </p:spTgt>
+                                        </p:tgtEl>
+                                        <p:attrNameLst>
+                                          <p:attrName>style.visibility</p:attrName>
+                                        </p:attrNameLst>
+                                      </p:cBhvr>
+                                      <p:to>
+                                        <p:strVal val="visible"/>
+                                      </p:to>
+                                    </p:set>
+                                    <p:animEffect transition="in" filter="fade">
+                                      <p:cBhvr>
+                                        <p:cTn id="10" dur="500"/>
+                                        <p:tgtEl>
+                                          <p:spTgt spid="3">
+                                            <p:txEl>
+                                              <p:pRg st="1" end="1"/>
+                                            </p:txEl>
+                                          </p:spTgt>
+                                        </p:tgtEl>
+                                      </p:cBhvr>
+                                    </p:animEffect>
+                                  </p:childTnLst>
+                                </p:cTn>
+                              </p:par>
+                              <p:par>
+                                <p:cTn id="11" presetID="10" presetClass="entr" presetSubtype="0" fill="hold" grpId="0" nodeType="withEffect">
+                                  <p:stCondLst>
+                                    <p:cond delay="0"/>
+                                  </p:stCondLst>
+                                  <p:childTnLst>
+                                    <p:set>
+                                      <p:cBhvr>
+                                        <p:cTn id="12" dur="1" fill="hold">
+                                          <p:stCondLst>
+                                            <p:cond delay="0"/>
+                                          </p:stCondLst>
+                                        </p:cTn>
+                                        <p:tgtEl>
+                                          <p:spTgt spid="3">
+                                            <p:txEl>
+                                              <p:pRg st="2" end="2"/>
+                                            </p:txEl>
+                                          </p:spTgt>
+                                        </p:tgtEl>
+                                        <p:attrNameLst>
+                                          <p:attrName>style.visibility</p:attrName>
+                                        </p:attrNameLst>
+                                      </p:cBhvr>
+                                      <p:to>
+                                        <p:strVal val="visible"/>
+                                      </p:to>
+                                    </p:set>
+                                    <p:animEffect transition="in" filter="fade">
+                                      <p:cBhvr>
+                                        <p:cTn id="13" dur="500"/>
+                                        <p:tgtEl>
+                                          <p:spTgt spid="3">
+                                            <p:txEl>
+                                              <p:pRg st="2" end="2"/>
+                                            </p:txEl>
+                                          </p:spTgt>
+                                        </p:tgtEl>
+                                      </p:cBhvr>
+                                    </p:animEffect>
+                                  </p:childTnLst>
+                                </p:cTn>
+                              </p:par>
+                              <p:par>
+                                <p:cTn id="14" presetID="10" presetClass="entr" presetSubtype="0" fill="hold" grpId="0" nodeType="withEffect">
+                                  <p:stCondLst>
+                                    <p:cond delay="0"/>
+                                  </p:stCondLst>
+                                  <p:childTnLst>
+                                    <p:set>
+                                      <p:cBhvr>
+                                        <p:cTn id="15" dur="1" fill="hold">
+                                          <p:stCondLst>
+                                            <p:cond delay="0"/>
+                                          </p:stCondLst>
+                                        </p:cTn>
+                                        <p:tgtEl>
+                                          <p:spTgt spid="3">
+                                            <p:txEl>
+                                              <p:pRg st="3" end="3"/>
+                                            </p:txEl>
+                                          </p:spTgt>
+                                        </p:tgtEl>
+                                        <p:attrNameLst>
+                                          <p:attrName>style.visibility</p:attrName>
+                                        </p:attrNameLst>
+                                      </p:cBhvr>
+                                      <p:to>
+                                        <p:strVal val="visible"/>
+                                      </p:to>
+                                    </p:set>
+                                    <p:animEffect transition="in" filter="fade">
+                                      <p:cBhvr>
+                                        <p:cTn id="16" dur="500"/>
+                                        <p:tgtEl>
+                                          <p:spTgt spid="3">
+                                            <p:txEl>
+                                              <p:pRg st="3" end="3"/>
+                                            </p:txEl>
+                                          </p:spTgt>
+                                        </p:tgtEl>
+                                      </p:cBhvr>
+                                    </p:animEffect>
+                                  </p:childTnLst>
+                                </p:cTn>
+                              </p:par>
+                              <p:par>
+                                <p:cTn id="17" presetID="10" presetClass="entr" presetSubtype="0" fill="hold" grpId="0" nodeType="withEffect">
+                                  <p:stCondLst>
+                                    <p:cond delay="0"/>
+                                  </p:stCondLst>
+                                  <p:childTnLst>
+                                    <p:set>
+                                      <p:cBhvr>
+                                        <p:cTn id="18" dur="1" fill="hold">
+                                          <p:stCondLst>
+                                            <p:cond delay="0"/>
+                                          </p:stCondLst>
+                                        </p:cTn>
+                                        <p:tgtEl>
+                                          <p:spTgt spid="3">
+                                            <p:txEl>
+                                              <p:pRg st="4" end="4"/>
+                                            </p:txEl>
+                                          </p:spTgt>
+                                        </p:tgtEl>
+                                        <p:attrNameLst>
+                                          <p:attrName>style.visibility</p:attrName>
+                                        </p:attrNameLst>
+                                      </p:cBhvr>
+                                      <p:to>
+                                        <p:strVal val="visible"/>
+                                      </p:to>
+                                    </p:set>
+                                    <p:animEffect transition="in" filter="fade">
+                                      <p:cBhvr>
+                                        <p:cTn id="19" dur="500"/>
+                                        <p:tgtEl>
+                                          <p:spTgt spid="3">
+                                            <p:txEl>
+                                              <p:pRg st="4" end="4"/>
+                                            </p:txEl>
+                                          </p:spTgt>
+                                        </p:tgtEl>
+                                      </p:cBhvr>
+                                    </p:animEffect>
+                                  </p:childTnLst>
+                                </p:cTn>
+                              </p:par>
+                              <p:par>
+                                <p:cTn id="20" presetID="10" presetClass="entr" presetSubtype="0" fill="hold" grpId="0" nodeType="withEffect">
+                                  <p:stCondLst>
+                                    <p:cond delay="0"/>
+                                  </p:stCondLst>
+                                  <p:childTnLst>
+                                    <p:set>
+                                      <p:cBhvr>
+                                        <p:cTn id="21" dur="1" fill="hold">
+                                          <p:stCondLst>
+                                            <p:cond delay="0"/>
+                                          </p:stCondLst>
+                                        </p:cTn>
+                                        <p:tgtEl>
+                                          <p:spTgt spid="3">
+                                            <p:txEl>
+                                              <p:pRg st="5" end="5"/>
+                                            </p:txEl>
+                                          </p:spTgt>
+                                        </p:tgtEl>
+                                        <p:attrNameLst>
+                                          <p:attrName>style.visibility</p:attrName>
+                                        </p:attrNameLst>
+                                      </p:cBhvr>
+                                      <p:to>
+                                        <p:strVal val="visible"/>
+                                      </p:to>
+                                    </p:set>
+                                    <p:animEffect transition="in" filter="fade">
+                                      <p:cBhvr>
+                                        <p:cTn id="22" dur="500"/>
+                                        <p:tgtEl>
+                                          <p:spTgt spid="3">
+                                            <p:txEl>
+                                              <p:pRg st="5" end="5"/>
+                                            </p:txEl>
+                                          </p:spTgt>
+                                        </p:tgtEl>
+                                      </p:cBhvr>
+                                    </p:animEffect>
+                                  </p:childTnLst>
+                                </p:cTn>
+                              </p:par>
+                              <p:par>
+                                <p:cTn id="23" presetID="10" presetClass="entr" presetSubtype="0" fill="hold" grpId="0" nodeType="withEffect">
+                                  <p:stCondLst>
+                                    <p:cond delay="0"/>
+                                  </p:stCondLst>
+                                  <p:childTnLst>
+                                    <p:set>
+                                      <p:cBhvr>
+                                        <p:cTn id="24" dur="1" fill="hold">
+                                          <p:stCondLst>
+                                            <p:cond delay="0"/>
+                                          </p:stCondLst>
+                                        </p:cTn>
+                                        <p:tgtEl>
+                                          <p:spTgt spid="3">
+                                            <p:txEl>
+                                              <p:pRg st="6" end="6"/>
+                                            </p:txEl>
+                                          </p:spTgt>
+                                        </p:tgtEl>
+                                        <p:attrNameLst>
+                                          <p:attrName>style.visibility</p:attrName>
+                                        </p:attrNameLst>
+                                      </p:cBhvr>
+                                      <p:to>
+                                        <p:strVal val="visible"/>
+                                      </p:to>
+                                    </p:set>
+                                    <p:animEffect transition="in" filter="fade">
+                                      <p:cBhvr>
+                                        <p:cTn id="25" dur="500"/>
+                                        <p:tgtEl>
+                                          <p:spTgt spid="3">
+                                            <p:txEl>
+                                              <p:pRg st="6" end="6"/>
+                                            </p:txEl>
+                                          </p:spTgt>
+                                        </p:tgtEl>
+                                      </p:cBhvr>
+                                    </p:animEffect>
+                                  </p:childTnLst>
+                                </p:cTn>
+                              </p:par>
+                            </p:childTnLst>
+                          </p:cTn>
+                        </p:par>
+                        <p:par>
+                          <p:cTn id="26" fill="hold">
+                            <p:stCondLst>
+                              <p:cond delay="500"/>
+                            </p:stCondLst>
+                            <p:childTnLst>
+                              <p:par>
+                                <p:cTn id="27" presetID="10" presetClass="entr" presetSubtype="0" fill="hold" grpId="0" nodeType="afterEffect">
+                                  <p:stCondLst>
+                                    <p:cond delay="0"/>
+                                  </p:stCondLst>
+                                  <p:childTnLst>
+                                    <p:set>
+                                      <p:cBhvr>
+                                        <p:cTn id="28" dur="1" fill="hold">
+                                          <p:stCondLst>
+                                            <p:cond delay="0"/>
+                                          </p:stCondLst>
+                                        </p:cTn>
+                                        <p:tgtEl>
+                                          <p:spTgt spid="4">
+                                            <p:txEl>
+                                              <p:pRg st="0" end="0"/>
+                                            </p:txEl>
+                                          </p:spTgt>
+                                        </p:tgtEl>
+                                        <p:attrNameLst>
+                                          <p:attrName>style.visibility</p:attrName>
+                                        </p:attrNameLst>
+                                      </p:cBhvr>
+                                      <p:to>
+                                        <p:strVal val="visible"/>
+                                      </p:to>
+                                    </p:set>
+                                    <p:animEffect transition="in" filter="fade">
+                                      <p:cBhvr>
+                                        <p:cTn id="29" dur="500"/>
+                                        <p:tgtEl>
+                                          <p:spTgt spid="4">
+                                            <p:txEl>
+                                              <p:pRg st="0" end="0"/>
+                                            </p:txEl>
+                                          </p:spTgt>
+                                        </p:tgtEl>
+                                      </p:cBhvr>
+                                    </p:animEffect>
+                                  </p:childTnLst>
+                                </p:cTn>
+                              </p:par>
+                              <p:par>
+                                <p:cTn id="30" presetID="10" presetClass="entr" presetSubtype="0" fill="hold" grpId="0" nodeType="withEffect">
+                                  <p:stCondLst>
+                                    <p:cond delay="0"/>
+                                  </p:stCondLst>
+                                  <p:childTnLst>
+                                    <p:set>
+                                      <p:cBhvr>
+                                        <p:cTn id="31" dur="1" fill="hold">
+                                          <p:stCondLst>
+                                            <p:cond delay="0"/>
+                                          </p:stCondLst>
+                                        </p:cTn>
+                                        <p:tgtEl>
+                                          <p:spTgt spid="4">
+                                            <p:txEl>
+                                              <p:pRg st="1" end="1"/>
+                                            </p:txEl>
+                                          </p:spTgt>
+                                        </p:tgtEl>
+                                        <p:attrNameLst>
+                                          <p:attrName>style.visibility</p:attrName>
+                                        </p:attrNameLst>
+                                      </p:cBhvr>
+                                      <p:to>
+                                        <p:strVal val="visible"/>
+                                      </p:to>
+                                    </p:set>
+                                    <p:animEffect transition="in" filter="fade">
+                                      <p:cBhvr>
+                                        <p:cTn id="32" dur="500"/>
+                                        <p:tgtEl>
+                                          <p:spTgt spid="4">
+                                            <p:txEl>
+                                              <p:pRg st="1" end="1"/>
+                                            </p:txEl>
+                                          </p:spTgt>
+                                        </p:tgtEl>
+                                      </p:cBhvr>
+                                    </p:animEffect>
+                                  </p:childTnLst>
+                                </p:cTn>
+                              </p:par>
+                              <p:par>
+                                <p:cTn id="33" presetID="10" presetClass="entr" presetSubtype="0" fill="hold" grpId="0" nodeType="withEffect">
+                                  <p:stCondLst>
+                                    <p:cond delay="0"/>
+                                  </p:stCondLst>
+                                  <p:childTnLst>
+                                    <p:set>
+                                      <p:cBhvr>
+                                        <p:cTn id="34" dur="1" fill="hold">
+                                          <p:stCondLst>
+                                            <p:cond delay="0"/>
+                                          </p:stCondLst>
+                                        </p:cTn>
+                                        <p:tgtEl>
+                                          <p:spTgt spid="4">
+                                            <p:txEl>
+                                              <p:pRg st="2" end="2"/>
+                                            </p:txEl>
+                                          </p:spTgt>
+                                        </p:tgtEl>
+                                        <p:attrNameLst>
+                                          <p:attrName>style.visibility</p:attrName>
+                                        </p:attrNameLst>
+                                      </p:cBhvr>
+                                      <p:to>
+                                        <p:strVal val="visible"/>
+                                      </p:to>
+                                    </p:set>
+                                    <p:animEffect transition="in" filter="fade">
+                                      <p:cBhvr>
+                                        <p:cTn id="35" dur="500"/>
+                                        <p:tgtEl>
+                                          <p:spTgt spid="4">
+                                            <p:txEl>
+                                              <p:pRg st="2" end="2"/>
+                                            </p:txEl>
+                                          </p:spTgt>
+                                        </p:tgtEl>
+                                      </p:cBhvr>
+                                    </p:animEffect>
+                                  </p:childTnLst>
+                                </p:cTn>
+                              </p:par>
+                              <p:par>
+                                <p:cTn id="36" presetID="10" presetClass="entr" presetSubtype="0" fill="hold" grpId="0" nodeType="withEffect">
+                                  <p:stCondLst>
+                                    <p:cond delay="0"/>
+                                  </p:stCondLst>
+                                  <p:childTnLst>
+                                    <p:set>
+                                      <p:cBhvr>
+                                        <p:cTn id="37" dur="1" fill="hold">
+                                          <p:stCondLst>
+                                            <p:cond delay="0"/>
+                                          </p:stCondLst>
+                                        </p:cTn>
+                                        <p:tgtEl>
+                                          <p:spTgt spid="4">
+                                            <p:txEl>
+                                              <p:pRg st="3" end="3"/>
+                                            </p:txEl>
+                                          </p:spTgt>
+                                        </p:tgtEl>
+                                        <p:attrNameLst>
+                                          <p:attrName>style.visibility</p:attrName>
+                                        </p:attrNameLst>
+                                      </p:cBhvr>
+                                      <p:to>
+                                        <p:strVal val="visible"/>
+                                      </p:to>
+                                    </p:set>
+                                    <p:animEffect transition="in" filter="fade">
+                                      <p:cBhvr>
+                                        <p:cTn id="38" dur="500"/>
+                                        <p:tgtEl>
+                                          <p:spTgt spid="4">
+                                            <p:txEl>
+                                              <p:pRg st="3" end="3"/>
+                                            </p:txEl>
+                                          </p:spTgt>
+                                        </p:tgtEl>
+                                      </p:cBhvr>
+                                    </p:animEffect>
+                                  </p:childTnLst>
+                                </p:cTn>
+                              </p:par>
+                              <p:par>
+                                <p:cTn id="39" presetID="10" presetClass="entr" presetSubtype="0" fill="hold" grpId="0" nodeType="withEffect">
+                                  <p:stCondLst>
+                                    <p:cond delay="0"/>
+                                  </p:stCondLst>
+                                  <p:childTnLst>
+                                    <p:set>
+                                      <p:cBhvr>
+                                        <p:cTn id="40" dur="1" fill="hold">
+                                          <p:stCondLst>
+                                            <p:cond delay="0"/>
+                                          </p:stCondLst>
+                                        </p:cTn>
+                                        <p:tgtEl>
+                                          <p:spTgt spid="4">
+                                            <p:txEl>
+                                              <p:pRg st="4" end="4"/>
+                                            </p:txEl>
+                                          </p:spTgt>
+                                        </p:tgtEl>
+                                        <p:attrNameLst>
+                                          <p:attrName>style.visibility</p:attrName>
+                                        </p:attrNameLst>
+                                      </p:cBhvr>
+                                      <p:to>
+                                        <p:strVal val="visible"/>
+                                      </p:to>
+                                    </p:set>
+                                    <p:animEffect transition="in" filter="fade">
+                                      <p:cBhvr>
+                                        <p:cTn id="41" dur="500"/>
+                                        <p:tgtEl>
+                                          <p:spTgt spid="4">
+                                            <p:txEl>
+                                              <p:pRg st="4" end="4"/>
+                                            </p:txEl>
+                                          </p:spTgt>
+                                        </p:tgtEl>
+                                      </p:cBhvr>
+                                    </p:animEffect>
+                                  </p:childTnLst>
+                                </p:cTn>
+                              </p:par>
+                              <p:par>
+                                <p:cTn id="42" presetID="10" presetClass="entr" presetSubtype="0" fill="hold" grpId="0" nodeType="withEffect">
+                                  <p:stCondLst>
+                                    <p:cond delay="0"/>
+                                  </p:stCondLst>
+                                  <p:childTnLst>
+                                    <p:set>
+                                      <p:cBhvr>
+                                        <p:cTn id="43" dur="1" fill="hold">
+                                          <p:stCondLst>
+                                            <p:cond delay="0"/>
+                                          </p:stCondLst>
+                                        </p:cTn>
+                                        <p:tgtEl>
+                                          <p:spTgt spid="4">
+                                            <p:txEl>
+                                              <p:pRg st="5" end="5"/>
+                                            </p:txEl>
+                                          </p:spTgt>
+                                        </p:tgtEl>
+                                        <p:attrNameLst>
+                                          <p:attrName>style.visibility</p:attrName>
+                                        </p:attrNameLst>
+                                      </p:cBhvr>
+                                      <p:to>
+                                        <p:strVal val="visible"/>
+                                      </p:to>
+                                    </p:set>
+                                    <p:animEffect transition="in" filter="fade">
+                                      <p:cBhvr>
+                                        <p:cTn id="44" dur="500"/>
+                                        <p:tgtEl>
+                                          <p:spTgt spid="4">
+                                            <p:txEl>
+                                              <p:pRg st="5" end="5"/>
+                                            </p:txEl>
+                                          </p:spTgt>
+                                        </p:tgtEl>
+                                      </p:cBhvr>
+                                    </p:animEffect>
+                                  </p:childTnLst>
+                                </p:cTn>
+                              </p:par>
+                              <p:par>
+                                <p:cTn id="45" presetID="10" presetClass="entr" presetSubtype="0" fill="hold" grpId="0" nodeType="withEffect">
+                                  <p:stCondLst>
+                                    <p:cond delay="0"/>
+                                  </p:stCondLst>
+                                  <p:childTnLst>
+                                    <p:set>
+                                      <p:cBhvr>
+                                        <p:cTn id="46" dur="1" fill="hold">
+                                          <p:stCondLst>
+                                            <p:cond delay="0"/>
+                                          </p:stCondLst>
+                                        </p:cTn>
+                                        <p:tgtEl>
+                                          <p:spTgt spid="4">
+                                            <p:txEl>
+                                              <p:pRg st="6" end="6"/>
+                                            </p:txEl>
+                                          </p:spTgt>
+                                        </p:tgtEl>
+                                        <p:attrNameLst>
+                                          <p:attrName>style.visibility</p:attrName>
+                                        </p:attrNameLst>
+                                      </p:cBhvr>
+                                      <p:to>
+                                        <p:strVal val="visible"/>
+                                      </p:to>
+                                    </p:set>
+                                    <p:animEffect transition="in" filter="fade">
+                                      <p:cBhvr>
+                                        <p:cTn id="47" dur="500"/>
+                                        <p:tgtEl>
+                                          <p:spTgt spid="4">
+                                            <p:txEl>
+                                              <p:pRg st="6" end="6"/>
+                                            </p:txEl>
+                                          </p:spTgt>
+                                        </p:tgtEl>
+                                      </p:cBhvr>
+                                    </p:animEffect>
+                                  </p:childTnLst>
+                                </p:cTn>
+                              </p:par>
+                            </p:childTnLst>
+                          </p:cTn>
+                        </p:par>
+                      </p:childTnLst>
+                    </p:cTn>
+                  </p:par>
+                </p:childTnLst>
+              </p:cTn>
+              <p:prevCondLst>
+                <p:cond evt="onPrev" delay="0">
+                  <p:tgtEl>
+                    <p:sldTgt/>
+                  </p:tgtEl>
+                </p:cond>
+              </p:prevCondLst>
+              <p:nextCondLst>
+                <p:cond evt="onNext" delay="0">
+                  <p:tgtEl>
+                    <p:sldTgt/>
+                  </p:tgtEl>
+                </p:cond>
+              </p:nextCondLst>
+            </p:seq>
+          </p:childTnLst>
+        </p:cTn>
+      </p:par>
+    </p:tnLst>
+    <p:bldLst>
+      <p:bldP spid="3" grpId="0" uiExpand="1" build="p"/>
+      <p:bldP spid="4" grpId="0" uiExpand="1" build="p"/>
+    </p:bldLst>
+  </p:timing>
+</p:sld>
+</file>
+
+<file path=ppt/slides/slide7.xml><?xml version="1.0" encoding="utf-8"?>
+<p:sld xmlns:a="http://schemas.openxmlformats.org/drawingml/2006/main" xmlns:r="http://schemas.openxmlformats.org/officeDocument/2006/relationships" xmlns:p="http://schemas.openxmlformats.org/presentationml/2006/main">
+  <p:cSld>
+    <p:spTree>
+      <p:nvGrpSpPr>
+        <p:cNvPr id="1" name=""/>
+        <p:cNvGrpSpPr/>
+        <p:nvPr/>
+      </p:nvGrpSpPr>
+      <p:grpSpPr>
+        <a:xfrm>
+          <a:off x="0" y="0"/>
+          <a:ext cx="0" cy="0"/>
+          <a:chOff x="0" y="0"/>
+          <a:chExt cx="0" cy="0"/>
+        </a:xfrm>
+      </p:grpSpPr>
+      <p:sp>
+        <p:nvSpPr>
+          <p:cNvPr id="2" name="Titre 1"/>
+          <p:cNvSpPr>
+            <a:spLocks noGrp="1"/>
+          </p:cNvSpPr>
+          <p:nvPr>
+            <p:ph type="title"/>
+          </p:nvPr>
+        </p:nvSpPr>
+        <p:spPr/>
+        <p:txBody>
+          <a:bodyPr/>
+          <a:lstStyle/>
+          <a:p>
+            <a:r>
+              <a:rPr lang="fr-FR" dirty="0" smtClean="0"/>
+              <a:t>kanban</a:t>
+            </a:r>
+            <a:endParaRPr lang="fr-FR" dirty="0"/>
+          </a:p>
+        </p:txBody>
+      </p:sp>
+      <p:sp>
+        <p:nvSpPr>
+          <p:cNvPr id="3" name="Espace réservé du contenu 2"/>
+          <p:cNvSpPr>
+            <a:spLocks noGrp="1"/>
+          </p:cNvSpPr>
+          <p:nvPr>
+            <p:ph idx="1"/>
+          </p:nvPr>
+        </p:nvSpPr>
+        <p:spPr>
+          <a:xfrm>
+            <a:off x="7278487" y="3027686"/>
+            <a:ext cx="4413529" cy="637148"/>
+          </a:xfrm>
+        </p:spPr>
+        <p:txBody>
+          <a:bodyPr/>
+          <a:lstStyle/>
+          <a:p>
+            <a:pPr marL="0" indent="0">
+              <a:buNone/>
+            </a:pPr>
+            <a:r>
+              <a:rPr lang="fr-FR" dirty="0" smtClean="0">
+                <a:hlinkClick r:id="rId2"/>
+              </a:rPr>
+              <a:t>Lien vers le KANBAN – sur Git Hub </a:t>
+            </a:r>
+            <a:endParaRPr lang="fr-FR" dirty="0"/>
+          </a:p>
+        </p:txBody>
+      </p:sp>
+      <p:pic>
+        <p:nvPicPr>
+          <p:cNvPr id="5" name="Image 4"/>
+          <p:cNvPicPr>
+            <a:picLocks noChangeAspect="1"/>
+          </p:cNvPicPr>
+          <p:nvPr/>
+        </p:nvPicPr>
+        <p:blipFill>
+          <a:blip r:embed="rId3"/>
+          <a:stretch>
+            <a:fillRect/>
+          </a:stretch>
+        </p:blipFill>
+        <p:spPr>
+          <a:xfrm>
+            <a:off x="3500127" y="141938"/>
+            <a:ext cx="3467584" cy="6716062"/>
+          </a:xfrm>
+          <a:prstGeom prst="rect">
+            <a:avLst/>
+          </a:prstGeom>
+        </p:spPr>
+      </p:pic>
+      <p:pic>
+        <p:nvPicPr>
+          <p:cNvPr id="6" name="Image 5"/>
+          <p:cNvPicPr>
+            <a:picLocks noChangeAspect="1"/>
+          </p:cNvPicPr>
+          <p:nvPr/>
+        </p:nvPicPr>
+        <p:blipFill>
+          <a:blip r:embed="rId4"/>
+          <a:stretch>
+            <a:fillRect/>
+          </a:stretch>
+        </p:blipFill>
+        <p:spPr>
+          <a:xfrm>
+            <a:off x="3533469" y="251490"/>
+            <a:ext cx="3400900" cy="6496957"/>
+          </a:xfrm>
+          <a:prstGeom prst="rect">
+            <a:avLst/>
+          </a:prstGeom>
+        </p:spPr>
+      </p:pic>
+      <p:pic>
+        <p:nvPicPr>
+          <p:cNvPr id="7" name="Image 6"/>
+          <p:cNvPicPr>
+            <a:picLocks noChangeAspect="1"/>
+          </p:cNvPicPr>
+          <p:nvPr/>
+        </p:nvPicPr>
+        <p:blipFill>
+          <a:blip r:embed="rId5"/>
+          <a:stretch>
+            <a:fillRect/>
+          </a:stretch>
+        </p:blipFill>
+        <p:spPr>
+          <a:xfrm>
+            <a:off x="3585864" y="185949"/>
+            <a:ext cx="3296110" cy="6430272"/>
+          </a:xfrm>
+          <a:prstGeom prst="rect">
+            <a:avLst/>
+          </a:prstGeom>
+        </p:spPr>
+      </p:pic>
+      <p:pic>
+        <p:nvPicPr>
+          <p:cNvPr id="8" name="Image 7"/>
+          <p:cNvPicPr>
+            <a:picLocks noChangeAspect="1"/>
+          </p:cNvPicPr>
+          <p:nvPr/>
+        </p:nvPicPr>
+        <p:blipFill>
+          <a:blip r:embed="rId6"/>
+          <a:stretch>
+            <a:fillRect/>
+          </a:stretch>
+        </p:blipFill>
+        <p:spPr>
+          <a:xfrm>
+            <a:off x="3647785" y="337799"/>
+            <a:ext cx="3286584" cy="6344535"/>
+          </a:xfrm>
+          <a:prstGeom prst="rect">
+            <a:avLst/>
+          </a:prstGeom>
+        </p:spPr>
+      </p:pic>
+      <p:pic>
+        <p:nvPicPr>
+          <p:cNvPr id="9" name="Image 8"/>
+          <p:cNvPicPr>
+            <a:picLocks noChangeAspect="1"/>
+          </p:cNvPicPr>
+          <p:nvPr/>
+        </p:nvPicPr>
+        <p:blipFill>
+          <a:blip r:embed="rId7"/>
+          <a:stretch>
+            <a:fillRect/>
+          </a:stretch>
+        </p:blipFill>
+        <p:spPr>
+          <a:xfrm>
+            <a:off x="3542996" y="185949"/>
+            <a:ext cx="3391373" cy="6468378"/>
+          </a:xfrm>
+          <a:prstGeom prst="rect">
+            <a:avLst/>
+          </a:prstGeom>
+        </p:spPr>
+      </p:pic>
+    </p:spTree>
+    <p:extLst>
+      <p:ext uri="{BB962C8B-B14F-4D97-AF65-F5344CB8AC3E}">
+        <p14:creationId xmlns:p14="http://schemas.microsoft.com/office/powerpoint/2010/main" val="289967152"/>
+      </p:ext>
+    </p:extLst>
+  </p:cSld>
+  <p:clrMapOvr>
+    <a:masterClrMapping/>
+  </p:clrMapOvr>
+  <p:timing>
+    <p:tnLst>
+      <p:par>
+        <p:cTn id="1" dur="indefinite" restart="never" nodeType="tmRoot">
+          <p:childTnLst>
+            <p:seq concurrent="1" nextAc="seek">
+              <p:cTn id="2" dur="indefinite" nodeType="mainSeq">
+                <p:childTnLst>
+                  <p:par>
+                    <p:cTn id="3" fill="hold">
+                      <p:stCondLst>
+                        <p:cond delay="indefinite"/>
+                      </p:stCondLst>
+                      <p:childTnLst>
+                        <p:par>
+                          <p:cTn id="4" fill="hold">
+                            <p:stCondLst>
+                              <p:cond delay="0"/>
+                            </p:stCondLst>
+                            <p:childTnLst>
+                              <p:par>
+                                <p:cTn id="5" presetID="10" presetClass="entr" presetSubtype="0" fill="hold" grpId="0" nodeType="clickEffect">
+                                  <p:stCondLst>
+                                    <p:cond delay="0"/>
+                                  </p:stCondLst>
+                                  <p:childTnLst>
+                                    <p:set>
+                                      <p:cBhvr>
+                                        <p:cTn id="6" dur="1" fill="hold">
+                                          <p:stCondLst>
+                                            <p:cond delay="0"/>
+                                          </p:stCondLst>
+                                        </p:cTn>
+                                        <p:tgtEl>
+                                          <p:spTgt spid="3">
+                                            <p:txEl>
+                                              <p:pRg st="0" end="0"/>
+                                            </p:txEl>
+                                          </p:spTgt>
+                                        </p:tgtEl>
+                                        <p:attrNameLst>
+                                          <p:attrName>style.visibility</p:attrName>
+                                        </p:attrNameLst>
+                                      </p:cBhvr>
+                                      <p:to>
+                                        <p:strVal val="visible"/>
+                                      </p:to>
+                                    </p:set>
+                                    <p:animEffect transition="in" filter="fade">
+                                      <p:cBhvr>
+                                        <p:cTn id="7" dur="500"/>
+                                        <p:tgtEl>
+                                          <p:spTgt spid="3">
+                                            <p:txEl>
+                                              <p:pRg st="0" end="0"/>
+                                            </p:txEl>
+                                          </p:spTgt>
+                                        </p:tgtEl>
+                                      </p:cBhvr>
+                                    </p:animEffect>
+                                  </p:childTnLst>
+                                </p:cTn>
+                              </p:par>
+                              <p:par>
+                                <p:cTn id="8" presetID="1" presetClass="entr" presetSubtype="0" fill="hold" nodeType="withEffect">
+                                  <p:stCondLst>
+                                    <p:cond delay="0"/>
+                                  </p:stCondLst>
+                                  <p:childTnLst>
+                                    <p:set>
+                                      <p:cBhvr>
+                                        <p:cTn id="9" dur="1" fill="hold">
+                                          <p:stCondLst>
+                                            <p:cond delay="0"/>
+                                          </p:stCondLst>
+                                        </p:cTn>
+                                        <p:tgtEl>
+                                          <p:spTgt spid="5"/>
+                                        </p:tgtEl>
+                                        <p:attrNameLst>
+                                          <p:attrName>style.visibility</p:attrName>
+                                        </p:attrNameLst>
+                                      </p:cBhvr>
+                                      <p:to>
+                                        <p:strVal val="visible"/>
+                                      </p:to>
+                                    </p:set>
+                                  </p:childTnLst>
+                                </p:cTn>
+                              </p:par>
+                            </p:childTnLst>
+                          </p:cTn>
+                        </p:par>
+                      </p:childTnLst>
+                    </p:cTn>
+                  </p:par>
+                  <p:par>
+                    <p:cTn id="10" fill="hold">
+                      <p:stCondLst>
+                        <p:cond delay="indefinite"/>
+                      </p:stCondLst>
+                      <p:childTnLst>
+                        <p:par>
+                          <p:cTn id="11" fill="hold">
+                            <p:stCondLst>
+                              <p:cond delay="0"/>
+                            </p:stCondLst>
+                            <p:childTnLst>
+                              <p:par>
+                                <p:cTn id="12" presetID="1" presetClass="exit" presetSubtype="0" fill="hold" nodeType="clickEffect">
+                                  <p:stCondLst>
+                                    <p:cond delay="0"/>
+                                  </p:stCondLst>
+                                  <p:childTnLst>
+                                    <p:set>
+                                      <p:cBhvr>
+                                        <p:cTn id="13" dur="1" fill="hold">
+                                          <p:stCondLst>
+                                            <p:cond delay="0"/>
+                                          </p:stCondLst>
+                                        </p:cTn>
+                                        <p:tgtEl>
+                                          <p:spTgt spid="5"/>
+                                        </p:tgtEl>
+                                        <p:attrNameLst>
+                                          <p:attrName>style.visibility</p:attrName>
+                                        </p:attrNameLst>
+                                      </p:cBhvr>
+                                      <p:to>
+                                        <p:strVal val="hidden"/>
+                                      </p:to>
+                                    </p:set>
+                                  </p:childTnLst>
+                                </p:cTn>
+                              </p:par>
+                            </p:childTnLst>
+                          </p:cTn>
+                        </p:par>
+                        <p:par>
+                          <p:cTn id="14" fill="hold">
+                            <p:stCondLst>
+                              <p:cond delay="0"/>
+                            </p:stCondLst>
+                            <p:childTnLst>
+                              <p:par>
+                                <p:cTn id="15" presetID="1" presetClass="entr" presetSubtype="0" fill="hold" nodeType="afterEffect">
+                                  <p:stCondLst>
+                                    <p:cond delay="0"/>
+                                  </p:stCondLst>
+                                  <p:childTnLst>
+                                    <p:set>
+                                      <p:cBhvr>
+                                        <p:cTn id="16" dur="1" fill="hold">
+                                          <p:stCondLst>
+                                            <p:cond delay="0"/>
+                                          </p:stCondLst>
+                                        </p:cTn>
+                                        <p:tgtEl>
+                                          <p:spTgt spid="6"/>
+                                        </p:tgtEl>
+                                        <p:attrNameLst>
+                                          <p:attrName>style.visibility</p:attrName>
+                                        </p:attrNameLst>
+                                      </p:cBhvr>
+                                      <p:to>
+                                        <p:strVal val="visible"/>
+                                      </p:to>
+                                    </p:set>
+                                  </p:childTnLst>
+                                </p:cTn>
+                              </p:par>
+                            </p:childTnLst>
+                          </p:cTn>
+                        </p:par>
+                      </p:childTnLst>
+                    </p:cTn>
+                  </p:par>
+                  <p:par>
+                    <p:cTn id="17" fill="hold">
+                      <p:stCondLst>
+                        <p:cond delay="indefinite"/>
+                      </p:stCondLst>
+                      <p:childTnLst>
+                        <p:par>
+                          <p:cTn id="18" fill="hold">
+                            <p:stCondLst>
+                              <p:cond delay="0"/>
+                            </p:stCondLst>
+                            <p:childTnLst>
+                              <p:par>
+                                <p:cTn id="19" presetID="1" presetClass="exit" presetSubtype="0" fill="hold" nodeType="clickEffect">
+                                  <p:stCondLst>
+                                    <p:cond delay="0"/>
+                                  </p:stCondLst>
+                                  <p:childTnLst>
+                                    <p:set>
+                                      <p:cBhvr>
+                                        <p:cTn id="20" dur="1" fill="hold">
+                                          <p:stCondLst>
+                                            <p:cond delay="0"/>
+                                          </p:stCondLst>
+                                        </p:cTn>
+                                        <p:tgtEl>
+                                          <p:spTgt spid="6"/>
+                                        </p:tgtEl>
+                                        <p:attrNameLst>
+                                          <p:attrName>style.visibility</p:attrName>
+                                        </p:attrNameLst>
+                                      </p:cBhvr>
+                                      <p:to>
+                                        <p:strVal val="hidden"/>
+                                      </p:to>
+                                    </p:set>
+                                  </p:childTnLst>
+                                </p:cTn>
+                              </p:par>
+                            </p:childTnLst>
+                          </p:cTn>
+                        </p:par>
+                        <p:par>
+                          <p:cTn id="21" fill="hold">
+                            <p:stCondLst>
+                              <p:cond delay="0"/>
+                            </p:stCondLst>
+                            <p:childTnLst>
+                              <p:par>
+                                <p:cTn id="22" presetID="1" presetClass="entr" presetSubtype="0" fill="hold" nodeType="afterEffect">
+                                  <p:stCondLst>
+                                    <p:cond delay="0"/>
+                                  </p:stCondLst>
+                                  <p:childTnLst>
+                                    <p:set>
+                                      <p:cBhvr>
+                                        <p:cTn id="23" dur="1" fill="hold">
+                                          <p:stCondLst>
+                                            <p:cond delay="0"/>
+                                          </p:stCondLst>
+                                        </p:cTn>
+                                        <p:tgtEl>
+                                          <p:spTgt spid="7"/>
+                                        </p:tgtEl>
+                                        <p:attrNameLst>
+                                          <p:attrName>style.visibility</p:attrName>
+                                        </p:attrNameLst>
+                                      </p:cBhvr>
+                                      <p:to>
+                                        <p:strVal val="visible"/>
+                                      </p:to>
+                                    </p:set>
+                                  </p:childTnLst>
+                                </p:cTn>
+                              </p:par>
+                            </p:childTnLst>
+                          </p:cTn>
+                        </p:par>
+                      </p:childTnLst>
+                    </p:cTn>
+                  </p:par>
+                  <p:par>
+                    <p:cTn id="24" fill="hold">
+                      <p:stCondLst>
+                        <p:cond delay="indefinite"/>
+                      </p:stCondLst>
+                      <p:childTnLst>
+                        <p:par>
+                          <p:cTn id="25" fill="hold">
+                            <p:stCondLst>
+                              <p:cond delay="0"/>
+                            </p:stCondLst>
+                            <p:childTnLst>
+                              <p:par>
+                                <p:cTn id="26" presetID="1" presetClass="exit" presetSubtype="0" fill="hold" nodeType="clickEffect">
+                                  <p:stCondLst>
+                                    <p:cond delay="0"/>
+                                  </p:stCondLst>
+                                  <p:childTnLst>
+                                    <p:set>
+                                      <p:cBhvr>
+                                        <p:cTn id="27" dur="1" fill="hold">
+                                          <p:stCondLst>
+                                            <p:cond delay="0"/>
+                                          </p:stCondLst>
+                                        </p:cTn>
+                                        <p:tgtEl>
+                                          <p:spTgt spid="7"/>
+                                        </p:tgtEl>
+                                        <p:attrNameLst>
+                                          <p:attrName>style.visibility</p:attrName>
+                                        </p:attrNameLst>
+                                      </p:cBhvr>
+                                      <p:to>
+                                        <p:strVal val="hidden"/>
+                                      </p:to>
+                                    </p:set>
+                                  </p:childTnLst>
+                                </p:cTn>
+                              </p:par>
+                            </p:childTnLst>
+                          </p:cTn>
+                        </p:par>
+                        <p:par>
+                          <p:cTn id="28" fill="hold">
+                            <p:stCondLst>
+                              <p:cond delay="0"/>
+                            </p:stCondLst>
+                            <p:childTnLst>
+                              <p:par>
+                                <p:cTn id="29" presetID="1" presetClass="entr" presetSubtype="0" fill="hold" nodeType="afterEffect">
+                                  <p:stCondLst>
+                                    <p:cond delay="0"/>
+                                  </p:stCondLst>
+                                  <p:childTnLst>
+                                    <p:set>
+                                      <p:cBhvr>
+                                        <p:cTn id="30" dur="1" fill="hold">
+                                          <p:stCondLst>
+                                            <p:cond delay="0"/>
+                                          </p:stCondLst>
+                                        </p:cTn>
+                                        <p:tgtEl>
+                                          <p:spTgt spid="8"/>
+                                        </p:tgtEl>
+                                        <p:attrNameLst>
+                                          <p:attrName>style.visibility</p:attrName>
+                                        </p:attrNameLst>
+                                      </p:cBhvr>
+                                      <p:to>
+                                        <p:strVal val="visible"/>
+                                      </p:to>
+                                    </p:set>
+                                  </p:childTnLst>
+                                </p:cTn>
+                              </p:par>
+                            </p:childTnLst>
+                          </p:cTn>
+                        </p:par>
+                      </p:childTnLst>
+                    </p:cTn>
+                  </p:par>
+                  <p:par>
+                    <p:cTn id="31" fill="hold">
+                      <p:stCondLst>
+                        <p:cond delay="indefinite"/>
+                      </p:stCondLst>
+                      <p:childTnLst>
+                        <p:par>
+                          <p:cTn id="32" fill="hold">
+                            <p:stCondLst>
+                              <p:cond delay="0"/>
+                            </p:stCondLst>
+                            <p:childTnLst>
+                              <p:par>
+                                <p:cTn id="33" presetID="1" presetClass="exit" presetSubtype="0" fill="hold" nodeType="clickEffect">
+                                  <p:stCondLst>
+                                    <p:cond delay="0"/>
+                                  </p:stCondLst>
+                                  <p:childTnLst>
+                                    <p:set>
+                                      <p:cBhvr>
+                                        <p:cTn id="34" dur="1" fill="hold">
+                                          <p:stCondLst>
+                                            <p:cond delay="0"/>
+                                          </p:stCondLst>
+                                        </p:cTn>
+                                        <p:tgtEl>
+                                          <p:spTgt spid="8"/>
+                                        </p:tgtEl>
+                                        <p:attrNameLst>
+                                          <p:attrName>style.visibility</p:attrName>
+                                        </p:attrNameLst>
+                                      </p:cBhvr>
+                                      <p:to>
+                                        <p:strVal val="hidden"/>
+                                      </p:to>
+                                    </p:set>
+                                  </p:childTnLst>
+                                </p:cTn>
+                              </p:par>
+                            </p:childTnLst>
+                          </p:cTn>
+                        </p:par>
+                        <p:par>
+                          <p:cTn id="35" fill="hold">
+                            <p:stCondLst>
+                              <p:cond delay="0"/>
+                            </p:stCondLst>
+                            <p:childTnLst>
+                              <p:par>
+                                <p:cTn id="36" presetID="1" presetClass="entr" presetSubtype="0" fill="hold" nodeType="afterEffect">
+                                  <p:stCondLst>
+                                    <p:cond delay="0"/>
+                                  </p:stCondLst>
+                                  <p:childTnLst>
+                                    <p:set>
+                                      <p:cBhvr>
+                                        <p:cTn id="37" dur="1" fill="hold">
+                                          <p:stCondLst>
+                                            <p:cond delay="0"/>
+                                          </p:stCondLst>
+                                        </p:cTn>
+                                        <p:tgtEl>
+                                          <p:spTgt spid="9"/>
+                                        </p:tgtEl>
+                                        <p:attrNameLst>
+                                          <p:attrName>style.visibility</p:attrName>
+                                        </p:attrNameLst>
+                                      </p:cBhvr>
+                                      <p:to>
+                                        <p:strVal val="visible"/>
+                                      </p:to>
+                                    </p:set>
+                                  </p:childTnLst>
+                                </p:cTn>
+                              </p:par>
+                            </p:childTnLst>
+                          </p:cTn>
+                        </p:par>
+                      </p:childTnLst>
+                    </p:cTn>
+                  </p:par>
+                </p:childTnLst>
+              </p:cTn>
+              <p:prevCondLst>
+                <p:cond evt="onPrev" delay="0">
+                  <p:tgtEl>
+                    <p:sldTgt/>
+                  </p:tgtEl>
+                </p:cond>
+              </p:prevCondLst>
+              <p:nextCondLst>
+                <p:cond evt="onNext" delay="0">
+                  <p:tgtEl>
+                    <p:sldTgt/>
+                  </p:tgtEl>
+                </p:cond>
+              </p:nextCondLst>
+            </p:seq>
+          </p:childTnLst>
+        </p:cTn>
+      </p:par>
+    </p:tnLst>
+    <p:bldLst>
+      <p:bldP spid="3" grpId="0" build="p"/>
+    </p:bldLst>
+  </p:timing>
+</p:sld>
+</file>
+
+<file path=ppt/slides/slide8.xml><?xml version="1.0" encoding="utf-8"?>
+<p:sld xmlns:a="http://schemas.openxmlformats.org/drawingml/2006/main" xmlns:r="http://schemas.openxmlformats.org/officeDocument/2006/relationships" xmlns:p="http://schemas.openxmlformats.org/presentationml/2006/main">
+  <p:cSld>
+    <p:spTree>
+      <p:nvGrpSpPr>
+        <p:cNvPr id="1" name=""/>
+        <p:cNvGrpSpPr/>
+        <p:nvPr/>
+      </p:nvGrpSpPr>
+      <p:grpSpPr>
+        <a:xfrm>
+          <a:off x="0" y="0"/>
+          <a:ext cx="0" cy="0"/>
+          <a:chOff x="0" y="0"/>
+          <a:chExt cx="0" cy="0"/>
+        </a:xfrm>
+      </p:grpSpPr>
+      <p:sp>
+        <p:nvSpPr>
+          <p:cNvPr id="2" name="Titre 1"/>
+          <p:cNvSpPr>
+            <a:spLocks noGrp="1"/>
+          </p:cNvSpPr>
+          <p:nvPr>
+            <p:ph type="ctrTitle"/>
+          </p:nvPr>
+        </p:nvSpPr>
+        <p:spPr/>
+        <p:txBody>
+          <a:bodyPr/>
+          <a:lstStyle/>
+          <a:p>
+            <a:pPr algn="ctr"/>
+            <a:r>
+              <a:rPr lang="fr-FR" dirty="0" smtClean="0"/>
+              <a:t>Fin</a:t>
+            </a:r>
+            <a:endParaRPr lang="fr-FR" dirty="0"/>
+          </a:p>
+        </p:txBody>
+      </p:sp>
+      <p:sp>
+        <p:nvSpPr>
+          <p:cNvPr id="3" name="Sous-titre 2"/>
+          <p:cNvSpPr>
+            <a:spLocks noGrp="1"/>
+          </p:cNvSpPr>
+          <p:nvPr>
+            <p:ph type="subTitle" idx="1"/>
+          </p:nvPr>
+        </p:nvSpPr>
+        <p:spPr/>
+        <p:txBody>
+          <a:bodyPr/>
+          <a:lstStyle/>
+          <a:p>
+            <a:pPr algn="ctr"/>
+            <a:r>
+              <a:rPr lang="fr-FR" dirty="0" smtClean="0"/>
+              <a:t>Merci de votre attention</a:t>
+            </a:r>
+            <a:endParaRPr lang="fr-FR" dirty="0"/>
+          </a:p>
+        </p:txBody>
+      </p:sp>
+    </p:spTree>
+    <p:extLst>
+      <p:ext uri="{BB962C8B-B14F-4D97-AF65-F5344CB8AC3E}">
+        <p14:creationId xmlns:p14="http://schemas.microsoft.com/office/powerpoint/2010/main" val="1029544792"/>
+      </p:ext>
+    </p:extLst>
+  </p:cSld>
+  <p:clrMapOvr>
+    <a:masterClrMapping/>
+  </p:clrMapOvr>
+  <p:timing>
+    <p:tnLst>
+      <p:par>
+        <p:cTn id="1" dur="indefinite" restart="never" nodeType="tmRoot"/>
+      </p:par>
+    </p:tnLst>
+  </p:timing>
+</p:sld>
+</file>
+
 <file path=ppt/theme/theme1.xml><?xml version="1.0" encoding="utf-8"?>
 <a:theme xmlns:a="http://schemas.openxmlformats.org/drawingml/2006/main" name="Circuit">
   <a:themeElements>

</xml_diff>